<commit_message>
TAU-u and PND added
</commit_message>
<xml_diff>
--- a/visual_analysis.pptx
+++ b/visual_analysis.pptx
@@ -7,11 +7,14 @@
   <p:sldIdLst>
     <p:sldId id="256" r:id="rId2"/>
     <p:sldId id="257" r:id="rId3"/>
-    <p:sldId id="258" r:id="rId4"/>
-    <p:sldId id="259" r:id="rId5"/>
-    <p:sldId id="260" r:id="rId6"/>
-    <p:sldId id="261" r:id="rId7"/>
-    <p:sldId id="262" r:id="rId8"/>
+    <p:sldId id="263" r:id="rId4"/>
+    <p:sldId id="258" r:id="rId5"/>
+    <p:sldId id="259" r:id="rId6"/>
+    <p:sldId id="264" r:id="rId7"/>
+    <p:sldId id="260" r:id="rId8"/>
+    <p:sldId id="261" r:id="rId9"/>
+    <p:sldId id="265" r:id="rId10"/>
+    <p:sldId id="262" r:id="rId11"/>
   </p:sldIdLst>
   <p:sldSz cx="12192000" cy="12188825"/>
   <p:notesSz cx="6858000" cy="9144000"/>
@@ -3453,6 +3456,239 @@
 </p:sld>
 </file>
 
+<file path=ppt/slides/slide10.xml><?xml version="1.0" encoding="utf-8"?>
+<p:sld xmlns:a="http://schemas.openxmlformats.org/drawingml/2006/main" xmlns:r="http://schemas.openxmlformats.org/officeDocument/2006/relationships" xmlns:p="http://schemas.openxmlformats.org/presentationml/2006/main">
+  <p:cSld>
+    <p:spTree>
+      <p:nvGrpSpPr>
+        <p:cNvPr id="1" name=""/>
+        <p:cNvGrpSpPr/>
+        <p:nvPr/>
+      </p:nvGrpSpPr>
+      <p:grpSpPr>
+        <a:xfrm>
+          <a:off x="0" y="0"/>
+          <a:ext cx="0" cy="0"/>
+          <a:chOff x="0" y="0"/>
+          <a:chExt cx="0" cy="0"/>
+        </a:xfrm>
+      </p:grpSpPr>
+      <p:pic>
+        <p:nvPicPr>
+          <p:cNvPr id="2" name="Picture 1">
+            <a:extLst>
+              <a:ext uri="{FF2B5EF4-FFF2-40B4-BE49-F238E27FC236}">
+                <a16:creationId xmlns:a16="http://schemas.microsoft.com/office/drawing/2014/main" id="{C47D1A46-B64C-2B4E-908C-B30F7411D87B}"/>
+              </a:ext>
+            </a:extLst>
+          </p:cNvPr>
+          <p:cNvPicPr>
+            <a:picLocks noChangeAspect="1"/>
+          </p:cNvPicPr>
+          <p:nvPr/>
+        </p:nvPicPr>
+        <p:blipFill>
+          <a:blip r:embed="rId2"/>
+          <a:stretch>
+            <a:fillRect/>
+          </a:stretch>
+        </p:blipFill>
+        <p:spPr>
+          <a:xfrm>
+            <a:off x="1295400" y="1293812"/>
+            <a:ext cx="8991600" cy="8991600"/>
+          </a:xfrm>
+          <a:prstGeom prst="rect">
+            <a:avLst/>
+          </a:prstGeom>
+        </p:spPr>
+      </p:pic>
+      <p:cxnSp>
+        <p:nvCxnSpPr>
+          <p:cNvPr id="3" name="Straight Connector 2">
+            <a:extLst>
+              <a:ext uri="{FF2B5EF4-FFF2-40B4-BE49-F238E27FC236}">
+                <a16:creationId xmlns:a16="http://schemas.microsoft.com/office/drawing/2014/main" id="{C2CA1BF8-15FB-D54E-8921-42AA2BDC02CA}"/>
+              </a:ext>
+            </a:extLst>
+          </p:cNvPr>
+          <p:cNvCxnSpPr>
+            <a:cxnSpLocks/>
+          </p:cNvCxnSpPr>
+          <p:nvPr/>
+        </p:nvCxnSpPr>
+        <p:spPr>
+          <a:xfrm>
+            <a:off x="7391400" y="1714500"/>
+            <a:ext cx="0" cy="7715250"/>
+          </a:xfrm>
+          <a:prstGeom prst="line">
+            <a:avLst/>
+          </a:prstGeom>
+          <a:ln w="25400">
+            <a:solidFill>
+              <a:schemeClr val="tx1"/>
+            </a:solidFill>
+            <a:prstDash val="dash"/>
+          </a:ln>
+        </p:spPr>
+        <p:style>
+          <a:lnRef idx="1">
+            <a:schemeClr val="accent1"/>
+          </a:lnRef>
+          <a:fillRef idx="0">
+            <a:schemeClr val="accent1"/>
+          </a:fillRef>
+          <a:effectRef idx="0">
+            <a:schemeClr val="accent1"/>
+          </a:effectRef>
+          <a:fontRef idx="minor">
+            <a:schemeClr val="tx1"/>
+          </a:fontRef>
+        </p:style>
+      </p:cxnSp>
+      <p:sp>
+        <p:nvSpPr>
+          <p:cNvPr id="4" name="TextBox 3">
+            <a:extLst>
+              <a:ext uri="{FF2B5EF4-FFF2-40B4-BE49-F238E27FC236}">
+                <a16:creationId xmlns:a16="http://schemas.microsoft.com/office/drawing/2014/main" id="{D610A2DF-8409-D44E-8983-FE42B872E0A0}"/>
+              </a:ext>
+            </a:extLst>
+          </p:cNvPr>
+          <p:cNvSpPr txBox="1"/>
+          <p:nvPr/>
+        </p:nvSpPr>
+        <p:spPr>
+          <a:xfrm>
+            <a:off x="4007076" y="1516360"/>
+            <a:ext cx="1298753" cy="461665"/>
+          </a:xfrm>
+          <a:prstGeom prst="rect">
+            <a:avLst/>
+          </a:prstGeom>
+          <a:solidFill>
+            <a:schemeClr val="bg1"/>
+          </a:solidFill>
+          <a:ln w="19050">
+            <a:solidFill>
+              <a:schemeClr val="tx1"/>
+            </a:solidFill>
+          </a:ln>
+        </p:spPr>
+        <p:txBody>
+          <a:bodyPr wrap="none" rtlCol="0">
+            <a:spAutoFit/>
+          </a:bodyPr>
+          <a:lstStyle/>
+          <a:p>
+            <a:pPr algn="ctr"/>
+            <a:r>
+              <a:rPr lang="en-US" sz="2400" dirty="0"/>
+              <a:t>Baseline </a:t>
+            </a:r>
+          </a:p>
+        </p:txBody>
+      </p:sp>
+      <p:sp>
+        <p:nvSpPr>
+          <p:cNvPr id="5" name="TextBox 4">
+            <a:extLst>
+              <a:ext uri="{FF2B5EF4-FFF2-40B4-BE49-F238E27FC236}">
+                <a16:creationId xmlns:a16="http://schemas.microsoft.com/office/drawing/2014/main" id="{7326254C-C8E0-8F47-BC8D-99B8E151E71B}"/>
+              </a:ext>
+            </a:extLst>
+          </p:cNvPr>
+          <p:cNvSpPr txBox="1"/>
+          <p:nvPr/>
+        </p:nvSpPr>
+        <p:spPr>
+          <a:xfrm>
+            <a:off x="8697275" y="1516360"/>
+            <a:ext cx="1799275" cy="461665"/>
+          </a:xfrm>
+          <a:prstGeom prst="rect">
+            <a:avLst/>
+          </a:prstGeom>
+          <a:solidFill>
+            <a:schemeClr val="bg1"/>
+          </a:solidFill>
+          <a:ln w="19050">
+            <a:solidFill>
+              <a:schemeClr val="tx1"/>
+            </a:solidFill>
+          </a:ln>
+        </p:spPr>
+        <p:txBody>
+          <a:bodyPr wrap="none" rtlCol="0">
+            <a:spAutoFit/>
+          </a:bodyPr>
+          <a:lstStyle/>
+          <a:p>
+            <a:pPr algn="ctr"/>
+            <a:r>
+              <a:rPr lang="en-US" sz="2400" dirty="0"/>
+              <a:t>Intervention </a:t>
+            </a:r>
+          </a:p>
+        </p:txBody>
+      </p:sp>
+      <p:sp>
+        <p:nvSpPr>
+          <p:cNvPr id="6" name="TextBox 5">
+            <a:extLst>
+              <a:ext uri="{FF2B5EF4-FFF2-40B4-BE49-F238E27FC236}">
+                <a16:creationId xmlns:a16="http://schemas.microsoft.com/office/drawing/2014/main" id="{98EF10D7-C236-5F49-B4DB-3E1633C2BFCC}"/>
+              </a:ext>
+            </a:extLst>
+          </p:cNvPr>
+          <p:cNvSpPr txBox="1"/>
+          <p:nvPr/>
+        </p:nvSpPr>
+        <p:spPr>
+          <a:xfrm>
+            <a:off x="9604959" y="6407220"/>
+            <a:ext cx="891591" cy="461665"/>
+          </a:xfrm>
+          <a:prstGeom prst="rect">
+            <a:avLst/>
+          </a:prstGeom>
+          <a:solidFill>
+            <a:schemeClr val="bg1"/>
+          </a:solidFill>
+          <a:ln w="19050">
+            <a:solidFill>
+              <a:schemeClr val="tx1"/>
+            </a:solidFill>
+          </a:ln>
+        </p:spPr>
+        <p:txBody>
+          <a:bodyPr wrap="none" rtlCol="0">
+            <a:spAutoFit/>
+          </a:bodyPr>
+          <a:lstStyle/>
+          <a:p>
+            <a:pPr algn="ctr"/>
+            <a:r>
+              <a:rPr lang="en-US" sz="2400" dirty="0"/>
+              <a:t>GIAD </a:t>
+            </a:r>
+          </a:p>
+        </p:txBody>
+      </p:sp>
+    </p:spTree>
+    <p:extLst>
+      <p:ext uri="{BB962C8B-B14F-4D97-AF65-F5344CB8AC3E}">
+        <p14:creationId xmlns:p14="http://schemas.microsoft.com/office/powerpoint/2010/main" val="2933611349"/>
+      </p:ext>
+    </p:extLst>
+  </p:cSld>
+  <p:clrMapOvr>
+    <a:masterClrMapping/>
+  </p:clrMapOvr>
+</p:sld>
+</file>
+
 <file path=ppt/slides/slide2.xml><?xml version="1.0" encoding="utf-8"?>
 <p:sld xmlns:a="http://schemas.openxmlformats.org/drawingml/2006/main" xmlns:r="http://schemas.openxmlformats.org/officeDocument/2006/relationships" xmlns:p="http://schemas.openxmlformats.org/presentationml/2006/main">
   <p:cSld>
@@ -3705,10 +3941,10 @@
       </p:grpSpPr>
       <p:pic>
         <p:nvPicPr>
-          <p:cNvPr id="3" name="Picture 2">
-            <a:extLst>
-              <a:ext uri="{FF2B5EF4-FFF2-40B4-BE49-F238E27FC236}">
-                <a16:creationId xmlns:a16="http://schemas.microsoft.com/office/drawing/2014/main" id="{1A2CFFA7-08A9-D04B-BC47-5EDE4266B19E}"/>
+          <p:cNvPr id="2" name="Picture 1">
+            <a:extLst>
+              <a:ext uri="{FF2B5EF4-FFF2-40B4-BE49-F238E27FC236}">
+                <a16:creationId xmlns:a16="http://schemas.microsoft.com/office/drawing/2014/main" id="{7F6C9A95-A8C4-6C4B-93CE-D32F17B77BCB}"/>
               </a:ext>
             </a:extLst>
           </p:cNvPr>
@@ -3725,8 +3961,8 @@
         </p:blipFill>
         <p:spPr>
           <a:xfrm>
-            <a:off x="1532731" y="1531143"/>
-            <a:ext cx="9126538" cy="9126538"/>
+            <a:off x="1428750" y="1427162"/>
+            <a:ext cx="9202738" cy="9202738"/>
           </a:xfrm>
           <a:prstGeom prst="rect">
             <a:avLst/>
@@ -3738,7 +3974,7 @@
           <p:cNvPr id="4" name="Straight Connector 3">
             <a:extLst>
               <a:ext uri="{FF2B5EF4-FFF2-40B4-BE49-F238E27FC236}">
-                <a16:creationId xmlns:a16="http://schemas.microsoft.com/office/drawing/2014/main" id="{D863B2F0-C5CB-7747-BC19-895CD6AC27F3}"/>
+                <a16:creationId xmlns:a16="http://schemas.microsoft.com/office/drawing/2014/main" id="{D0B662A9-C388-0A4E-AA76-7AF0BA453145}"/>
               </a:ext>
             </a:extLst>
           </p:cNvPr>
@@ -3779,10 +4015,10 @@
       </p:cxnSp>
       <p:sp>
         <p:nvSpPr>
-          <p:cNvPr id="8" name="TextBox 7">
-            <a:extLst>
-              <a:ext uri="{FF2B5EF4-FFF2-40B4-BE49-F238E27FC236}">
-                <a16:creationId xmlns:a16="http://schemas.microsoft.com/office/drawing/2014/main" id="{78019C8B-DFC1-324D-B759-A9BA1F3FE691}"/>
+          <p:cNvPr id="9" name="TextBox 8">
+            <a:extLst>
+              <a:ext uri="{FF2B5EF4-FFF2-40B4-BE49-F238E27FC236}">
+                <a16:creationId xmlns:a16="http://schemas.microsoft.com/office/drawing/2014/main" id="{A59A2F91-854C-0F47-A364-B4292FFBCDB8}"/>
               </a:ext>
             </a:extLst>
           </p:cNvPr>
@@ -3822,10 +4058,10 @@
       </p:sp>
       <p:sp>
         <p:nvSpPr>
-          <p:cNvPr id="9" name="TextBox 8">
-            <a:extLst>
-              <a:ext uri="{FF2B5EF4-FFF2-40B4-BE49-F238E27FC236}">
-                <a16:creationId xmlns:a16="http://schemas.microsoft.com/office/drawing/2014/main" id="{D4FDB220-E6D1-AF44-9025-B731472B6C57}"/>
+          <p:cNvPr id="10" name="TextBox 9">
+            <a:extLst>
+              <a:ext uri="{FF2B5EF4-FFF2-40B4-BE49-F238E27FC236}">
+                <a16:creationId xmlns:a16="http://schemas.microsoft.com/office/drawing/2014/main" id="{C7D43EB0-B2C7-5A47-A7C1-645E15463F2B}"/>
               </a:ext>
             </a:extLst>
           </p:cNvPr>
@@ -3865,10 +4101,10 @@
       </p:sp>
       <p:sp>
         <p:nvSpPr>
-          <p:cNvPr id="10" name="TextBox 9">
-            <a:extLst>
-              <a:ext uri="{FF2B5EF4-FFF2-40B4-BE49-F238E27FC236}">
-                <a16:creationId xmlns:a16="http://schemas.microsoft.com/office/drawing/2014/main" id="{63762FC2-0A43-564C-B005-A1A96E754961}"/>
+          <p:cNvPr id="11" name="TextBox 10">
+            <a:extLst>
+              <a:ext uri="{FF2B5EF4-FFF2-40B4-BE49-F238E27FC236}">
+                <a16:creationId xmlns:a16="http://schemas.microsoft.com/office/drawing/2014/main" id="{399D5F7F-F12B-1D4C-BF40-F06874DF3292}"/>
               </a:ext>
             </a:extLst>
           </p:cNvPr>
@@ -3906,10 +4142,254 @@
           </a:p>
         </p:txBody>
       </p:sp>
+      <p:sp>
+        <p:nvSpPr>
+          <p:cNvPr id="3" name="Oval 2">
+            <a:extLst>
+              <a:ext uri="{FF2B5EF4-FFF2-40B4-BE49-F238E27FC236}">
+                <a16:creationId xmlns:a16="http://schemas.microsoft.com/office/drawing/2014/main" id="{9CE5CCD1-EBEE-A846-8702-DE59C33AAA55}"/>
+              </a:ext>
+            </a:extLst>
+          </p:cNvPr>
+          <p:cNvSpPr/>
+          <p:nvPr/>
+        </p:nvSpPr>
+        <p:spPr>
+          <a:xfrm>
+            <a:off x="3732212" y="6629400"/>
+            <a:ext cx="534986" cy="476250"/>
+          </a:xfrm>
+          <a:prstGeom prst="ellipse">
+            <a:avLst/>
+          </a:prstGeom>
+          <a:solidFill>
+            <a:srgbClr val="FF0000"/>
+          </a:solidFill>
+          <a:ln>
+            <a:noFill/>
+          </a:ln>
+        </p:spPr>
+        <p:style>
+          <a:lnRef idx="2">
+            <a:schemeClr val="accent1">
+              <a:shade val="50000"/>
+            </a:schemeClr>
+          </a:lnRef>
+          <a:fillRef idx="1">
+            <a:schemeClr val="accent1"/>
+          </a:fillRef>
+          <a:effectRef idx="0">
+            <a:schemeClr val="accent1"/>
+          </a:effectRef>
+          <a:fontRef idx="minor">
+            <a:schemeClr val="lt1"/>
+          </a:fontRef>
+        </p:style>
+        <p:txBody>
+          <a:bodyPr rtlCol="0" anchor="ctr"/>
+          <a:lstStyle/>
+          <a:p>
+            <a:pPr algn="ctr"/>
+            <a:endParaRPr lang="en-US"/>
+          </a:p>
+        </p:txBody>
+      </p:sp>
+      <p:cxnSp>
+        <p:nvCxnSpPr>
+          <p:cNvPr id="6" name="Straight Connector 5">
+            <a:extLst>
+              <a:ext uri="{FF2B5EF4-FFF2-40B4-BE49-F238E27FC236}">
+                <a16:creationId xmlns:a16="http://schemas.microsoft.com/office/drawing/2014/main" id="{727A67FE-02F7-0B4A-B1AF-DAD8373CC05C}"/>
+              </a:ext>
+            </a:extLst>
+          </p:cNvPr>
+          <p:cNvCxnSpPr/>
+          <p:nvPr/>
+        </p:nvCxnSpPr>
+        <p:spPr>
+          <a:xfrm>
+            <a:off x="4267198" y="6867525"/>
+            <a:ext cx="6364290" cy="0"/>
+          </a:xfrm>
+          <a:prstGeom prst="line">
+            <a:avLst/>
+          </a:prstGeom>
+          <a:ln w="63500">
+            <a:solidFill>
+              <a:srgbClr val="FF0000"/>
+            </a:solidFill>
+          </a:ln>
+        </p:spPr>
+        <p:style>
+          <a:lnRef idx="1">
+            <a:schemeClr val="accent1"/>
+          </a:lnRef>
+          <a:fillRef idx="0">
+            <a:schemeClr val="accent1"/>
+          </a:fillRef>
+          <a:effectRef idx="0">
+            <a:schemeClr val="accent1"/>
+          </a:effectRef>
+          <a:fontRef idx="minor">
+            <a:schemeClr val="tx1"/>
+          </a:fontRef>
+        </p:style>
+      </p:cxnSp>
+      <p:sp>
+        <p:nvSpPr>
+          <p:cNvPr id="12" name="Google Shape;209;p27">
+            <a:extLst>
+              <a:ext uri="{FF2B5EF4-FFF2-40B4-BE49-F238E27FC236}">
+                <a16:creationId xmlns:a16="http://schemas.microsoft.com/office/drawing/2014/main" id="{FC79F8D2-46B0-9147-9014-1934F74BEA20}"/>
+              </a:ext>
+            </a:extLst>
+          </p:cNvPr>
+          <p:cNvSpPr txBox="1"/>
+          <p:nvPr/>
+        </p:nvSpPr>
+        <p:spPr>
+          <a:xfrm>
+            <a:off x="8763000" y="8058152"/>
+            <a:ext cx="1868478" cy="914397"/>
+          </a:xfrm>
+          <a:prstGeom prst="rect">
+            <a:avLst/>
+          </a:prstGeom>
+          <a:noFill/>
+          <a:ln w="9525" cap="flat" cmpd="sng">
+            <a:solidFill>
+              <a:srgbClr val="000000"/>
+            </a:solidFill>
+            <a:prstDash val="solid"/>
+            <a:round/>
+            <a:headEnd type="none" w="sm" len="sm"/>
+            <a:tailEnd type="none" w="sm" len="sm"/>
+          </a:ln>
+        </p:spPr>
+        <p:txBody>
+          <a:bodyPr spcFirstLastPara="1" wrap="square" lIns="91425" tIns="91425" rIns="91425" bIns="91425" anchor="t" anchorCtr="0">
+            <a:noAutofit/>
+          </a:bodyPr>
+          <a:lstStyle/>
+          <a:p>
+            <a:pPr marL="0" lvl="0" indent="0" algn="ctr" rtl="0">
+              <a:spcBef>
+                <a:spcPts val="0"/>
+              </a:spcBef>
+              <a:spcAft>
+                <a:spcPts val="0"/>
+              </a:spcAft>
+              <a:buNone/>
+            </a:pPr>
+            <a:r>
+              <a:rPr lang="en" sz="1600" dirty="0">
+                <a:latin typeface="Lato"/>
+                <a:ea typeface="Lato"/>
+                <a:cs typeface="Lato"/>
+                <a:sym typeface="Lato"/>
+              </a:rPr>
+              <a:t>Above line = 3</a:t>
+            </a:r>
+            <a:endParaRPr sz="1600" dirty="0">
+              <a:latin typeface="Lato"/>
+              <a:ea typeface="Lato"/>
+              <a:cs typeface="Lato"/>
+              <a:sym typeface="Lato"/>
+            </a:endParaRPr>
+          </a:p>
+          <a:p>
+            <a:pPr marL="0" lvl="0" indent="0" algn="ctr" rtl="0">
+              <a:spcBef>
+                <a:spcPts val="0"/>
+              </a:spcBef>
+              <a:spcAft>
+                <a:spcPts val="0"/>
+              </a:spcAft>
+              <a:buNone/>
+            </a:pPr>
+            <a:r>
+              <a:rPr lang="en" sz="1600" dirty="0">
+                <a:latin typeface="Lato"/>
+                <a:ea typeface="Lato"/>
+                <a:cs typeface="Lato"/>
+                <a:sym typeface="Lato"/>
+              </a:rPr>
+              <a:t>Phase N = 3</a:t>
+            </a:r>
+            <a:endParaRPr sz="1600" dirty="0">
+              <a:latin typeface="Lato"/>
+              <a:ea typeface="Lato"/>
+              <a:cs typeface="Lato"/>
+              <a:sym typeface="Lato"/>
+            </a:endParaRPr>
+          </a:p>
+          <a:p>
+            <a:pPr marL="0" lvl="0" indent="0" algn="ctr" rtl="0">
+              <a:spcBef>
+                <a:spcPts val="0"/>
+              </a:spcBef>
+              <a:spcAft>
+                <a:spcPts val="0"/>
+              </a:spcAft>
+              <a:buNone/>
+            </a:pPr>
+            <a:r>
+              <a:rPr lang="en" sz="1600" dirty="0">
+                <a:latin typeface="Lato"/>
+                <a:ea typeface="Lato"/>
+                <a:cs typeface="Lato"/>
+                <a:sym typeface="Lato"/>
+              </a:rPr>
+              <a:t>PND= 3/3 = 1</a:t>
+            </a:r>
+            <a:endParaRPr sz="1600" dirty="0">
+              <a:latin typeface="Lato"/>
+              <a:ea typeface="Lato"/>
+              <a:cs typeface="Lato"/>
+              <a:sym typeface="Lato"/>
+            </a:endParaRPr>
+          </a:p>
+        </p:txBody>
+      </p:sp>
+      <p:sp>
+        <p:nvSpPr>
+          <p:cNvPr id="7" name="TextBox 6">
+            <a:extLst>
+              <a:ext uri="{FF2B5EF4-FFF2-40B4-BE49-F238E27FC236}">
+                <a16:creationId xmlns:a16="http://schemas.microsoft.com/office/drawing/2014/main" id="{DE15F3DB-F561-744C-9007-00D9FCC9D607}"/>
+              </a:ext>
+            </a:extLst>
+          </p:cNvPr>
+          <p:cNvSpPr txBox="1"/>
+          <p:nvPr/>
+        </p:nvSpPr>
+        <p:spPr>
+          <a:xfrm>
+            <a:off x="9399721" y="7665304"/>
+            <a:ext cx="595035" cy="369332"/>
+          </a:xfrm>
+          <a:prstGeom prst="rect">
+            <a:avLst/>
+          </a:prstGeom>
+          <a:noFill/>
+        </p:spPr>
+        <p:txBody>
+          <a:bodyPr wrap="none" rtlCol="0">
+            <a:spAutoFit/>
+          </a:bodyPr>
+          <a:lstStyle/>
+          <a:p>
+            <a:r>
+              <a:rPr lang="en-US" dirty="0"/>
+              <a:t>PND</a:t>
+            </a:r>
+          </a:p>
+        </p:txBody>
+      </p:sp>
     </p:spTree>
     <p:extLst>
       <p:ext uri="{BB962C8B-B14F-4D97-AF65-F5344CB8AC3E}">
-        <p14:creationId xmlns:p14="http://schemas.microsoft.com/office/powerpoint/2010/main" val="835203040"/>
+        <p14:creationId xmlns:p14="http://schemas.microsoft.com/office/powerpoint/2010/main" val="3435715881"/>
       </p:ext>
     </p:extLst>
   </p:cSld>
@@ -3938,10 +4418,10 @@
       </p:grpSpPr>
       <p:pic>
         <p:nvPicPr>
-          <p:cNvPr id="2" name="Picture 1">
-            <a:extLst>
-              <a:ext uri="{FF2B5EF4-FFF2-40B4-BE49-F238E27FC236}">
-                <a16:creationId xmlns:a16="http://schemas.microsoft.com/office/drawing/2014/main" id="{6A4F5A39-719C-C845-8525-AEAA93E851D1}"/>
+          <p:cNvPr id="3" name="Picture 2">
+            <a:extLst>
+              <a:ext uri="{FF2B5EF4-FFF2-40B4-BE49-F238E27FC236}">
+                <a16:creationId xmlns:a16="http://schemas.microsoft.com/office/drawing/2014/main" id="{1A2CFFA7-08A9-D04B-BC47-5EDE4266B19E}"/>
               </a:ext>
             </a:extLst>
           </p:cNvPr>
@@ -3958,8 +4438,8 @@
         </p:blipFill>
         <p:spPr>
           <a:xfrm>
-            <a:off x="1601788" y="1600200"/>
-            <a:ext cx="8896350" cy="8896350"/>
+            <a:off x="1532731" y="1531143"/>
+            <a:ext cx="9126538" cy="9126538"/>
           </a:xfrm>
           <a:prstGeom prst="rect">
             <a:avLst/>
@@ -3968,10 +4448,10 @@
       </p:pic>
       <p:cxnSp>
         <p:nvCxnSpPr>
-          <p:cNvPr id="3" name="Straight Connector 2">
-            <a:extLst>
-              <a:ext uri="{FF2B5EF4-FFF2-40B4-BE49-F238E27FC236}">
-                <a16:creationId xmlns:a16="http://schemas.microsoft.com/office/drawing/2014/main" id="{DED530BB-A92F-B340-A873-6269AA4DC51C}"/>
+          <p:cNvPr id="4" name="Straight Connector 3">
+            <a:extLst>
+              <a:ext uri="{FF2B5EF4-FFF2-40B4-BE49-F238E27FC236}">
+                <a16:creationId xmlns:a16="http://schemas.microsoft.com/office/drawing/2014/main" id="{D863B2F0-C5CB-7747-BC19-895CD6AC27F3}"/>
               </a:ext>
             </a:extLst>
           </p:cNvPr>
@@ -3982,8 +4462,8 @@
         </p:nvCxnSpPr>
         <p:spPr>
           <a:xfrm>
-            <a:off x="7772400" y="1885950"/>
-            <a:ext cx="0" cy="7810500"/>
+            <a:off x="7181850" y="1427162"/>
+            <a:ext cx="0" cy="8402638"/>
           </a:xfrm>
           <a:prstGeom prst="line">
             <a:avLst/>
@@ -4012,10 +4492,10 @@
       </p:cxnSp>
       <p:sp>
         <p:nvSpPr>
-          <p:cNvPr id="6" name="TextBox 5">
-            <a:extLst>
-              <a:ext uri="{FF2B5EF4-FFF2-40B4-BE49-F238E27FC236}">
-                <a16:creationId xmlns:a16="http://schemas.microsoft.com/office/drawing/2014/main" id="{71C571E4-3DE8-5F4D-BBD4-497EB5B6785D}"/>
+          <p:cNvPr id="8" name="TextBox 7">
+            <a:extLst>
+              <a:ext uri="{FF2B5EF4-FFF2-40B4-BE49-F238E27FC236}">
+                <a16:creationId xmlns:a16="http://schemas.microsoft.com/office/drawing/2014/main" id="{78019C8B-DFC1-324D-B759-A9BA1F3FE691}"/>
               </a:ext>
             </a:extLst>
           </p:cNvPr>
@@ -4024,8 +4504,8 @@
         </p:nvSpPr>
         <p:spPr>
           <a:xfrm>
-            <a:off x="4008664" y="1138535"/>
-            <a:ext cx="1298753" cy="461665"/>
+            <a:off x="9809212" y="5797698"/>
+            <a:ext cx="822276" cy="461665"/>
           </a:xfrm>
           <a:prstGeom prst="rect">
             <a:avLst/>
@@ -4048,17 +4528,17 @@
             <a:pPr algn="ctr"/>
             <a:r>
               <a:rPr lang="en-US" sz="2400" dirty="0"/>
-              <a:t>Baseline </a:t>
-            </a:r>
-          </a:p>
-        </p:txBody>
-      </p:sp>
-      <p:sp>
-        <p:nvSpPr>
-          <p:cNvPr id="7" name="TextBox 6">
-            <a:extLst>
-              <a:ext uri="{FF2B5EF4-FFF2-40B4-BE49-F238E27FC236}">
-                <a16:creationId xmlns:a16="http://schemas.microsoft.com/office/drawing/2014/main" id="{71A47A2F-0E1A-BE4F-B6F5-8D846CFAB5B8}"/>
+              <a:t>SAJE </a:t>
+            </a:r>
+          </a:p>
+        </p:txBody>
+      </p:sp>
+      <p:sp>
+        <p:nvSpPr>
+          <p:cNvPr id="9" name="TextBox 8">
+            <a:extLst>
+              <a:ext uri="{FF2B5EF4-FFF2-40B4-BE49-F238E27FC236}">
+                <a16:creationId xmlns:a16="http://schemas.microsoft.com/office/drawing/2014/main" id="{D4FDB220-E6D1-AF44-9025-B731472B6C57}"/>
               </a:ext>
             </a:extLst>
           </p:cNvPr>
@@ -4067,8 +4547,8 @@
         </p:nvSpPr>
         <p:spPr>
           <a:xfrm>
-            <a:off x="8698863" y="1138535"/>
-            <a:ext cx="1799275" cy="461665"/>
+            <a:off x="4008664" y="629941"/>
+            <a:ext cx="1298753" cy="461665"/>
           </a:xfrm>
           <a:prstGeom prst="rect">
             <a:avLst/>
@@ -4091,17 +4571,17 @@
             <a:pPr algn="ctr"/>
             <a:r>
               <a:rPr lang="en-US" sz="2400" dirty="0"/>
-              <a:t>Intervention </a:t>
-            </a:r>
-          </a:p>
-        </p:txBody>
-      </p:sp>
-      <p:sp>
-        <p:nvSpPr>
-          <p:cNvPr id="8" name="TextBox 7">
-            <a:extLst>
-              <a:ext uri="{FF2B5EF4-FFF2-40B4-BE49-F238E27FC236}">
-                <a16:creationId xmlns:a16="http://schemas.microsoft.com/office/drawing/2014/main" id="{607C4830-460E-8C4C-9593-FBB585E80623}"/>
+              <a:t>Baseline </a:t>
+            </a:r>
+          </a:p>
+        </p:txBody>
+      </p:sp>
+      <p:sp>
+        <p:nvSpPr>
+          <p:cNvPr id="10" name="TextBox 9">
+            <a:extLst>
+              <a:ext uri="{FF2B5EF4-FFF2-40B4-BE49-F238E27FC236}">
+                <a16:creationId xmlns:a16="http://schemas.microsoft.com/office/drawing/2014/main" id="{63762FC2-0A43-564C-B005-A1A96E754961}"/>
               </a:ext>
             </a:extLst>
           </p:cNvPr>
@@ -4110,8 +4590,8 @@
         </p:nvSpPr>
         <p:spPr>
           <a:xfrm>
-            <a:off x="9598500" y="6509657"/>
-            <a:ext cx="740908" cy="461665"/>
+            <a:off x="8009937" y="629941"/>
+            <a:ext cx="1799275" cy="461665"/>
           </a:xfrm>
           <a:prstGeom prst="rect">
             <a:avLst/>
@@ -4134,7 +4614,7 @@
             <a:pPr algn="ctr"/>
             <a:r>
               <a:rPr lang="en-US" sz="2400" dirty="0"/>
-              <a:t>LELI </a:t>
+              <a:t>Intervention </a:t>
             </a:r>
           </a:p>
         </p:txBody>
@@ -4142,7 +4622,7 @@
     </p:spTree>
     <p:extLst>
       <p:ext uri="{BB962C8B-B14F-4D97-AF65-F5344CB8AC3E}">
-        <p14:creationId xmlns:p14="http://schemas.microsoft.com/office/powerpoint/2010/main" val="347268497"/>
+        <p14:creationId xmlns:p14="http://schemas.microsoft.com/office/powerpoint/2010/main" val="835203040"/>
       </p:ext>
     </p:extLst>
   </p:cSld>
@@ -4174,7 +4654,7 @@
           <p:cNvPr id="2" name="Picture 1">
             <a:extLst>
               <a:ext uri="{FF2B5EF4-FFF2-40B4-BE49-F238E27FC236}">
-                <a16:creationId xmlns:a16="http://schemas.microsoft.com/office/drawing/2014/main" id="{B82A7E28-EBD6-5245-956F-9B55A13A2CA1}"/>
+                <a16:creationId xmlns:a16="http://schemas.microsoft.com/office/drawing/2014/main" id="{6A4F5A39-719C-C845-8525-AEAA93E851D1}"/>
               </a:ext>
             </a:extLst>
           </p:cNvPr>
@@ -4191,8 +4671,8 @@
         </p:blipFill>
         <p:spPr>
           <a:xfrm>
-            <a:off x="1562100" y="1560512"/>
-            <a:ext cx="8783638" cy="8783638"/>
+            <a:off x="1601788" y="1600200"/>
+            <a:ext cx="8896350" cy="8896350"/>
           </a:xfrm>
           <a:prstGeom prst="rect">
             <a:avLst/>
@@ -4204,7 +4684,7 @@
           <p:cNvPr id="3" name="Straight Connector 2">
             <a:extLst>
               <a:ext uri="{FF2B5EF4-FFF2-40B4-BE49-F238E27FC236}">
-                <a16:creationId xmlns:a16="http://schemas.microsoft.com/office/drawing/2014/main" id="{8654862C-D09E-E745-99D5-A58ED318449C}"/>
+                <a16:creationId xmlns:a16="http://schemas.microsoft.com/office/drawing/2014/main" id="{DED530BB-A92F-B340-A873-6269AA4DC51C}"/>
               </a:ext>
             </a:extLst>
           </p:cNvPr>
@@ -4216,7 +4696,7 @@
         <p:spPr>
           <a:xfrm>
             <a:off x="7772400" y="1885950"/>
-            <a:ext cx="0" cy="7734300"/>
+            <a:ext cx="0" cy="7810500"/>
           </a:xfrm>
           <a:prstGeom prst="line">
             <a:avLst/>
@@ -4245,10 +4725,10 @@
       </p:cxnSp>
       <p:sp>
         <p:nvSpPr>
-          <p:cNvPr id="4" name="TextBox 3">
-            <a:extLst>
-              <a:ext uri="{FF2B5EF4-FFF2-40B4-BE49-F238E27FC236}">
-                <a16:creationId xmlns:a16="http://schemas.microsoft.com/office/drawing/2014/main" id="{732B55F4-8E20-334D-BA15-A9751D1BD869}"/>
+          <p:cNvPr id="6" name="TextBox 5">
+            <a:extLst>
+              <a:ext uri="{FF2B5EF4-FFF2-40B4-BE49-F238E27FC236}">
+                <a16:creationId xmlns:a16="http://schemas.microsoft.com/office/drawing/2014/main" id="{71C571E4-3DE8-5F4D-BBD4-497EB5B6785D}"/>
               </a:ext>
             </a:extLst>
           </p:cNvPr>
@@ -4288,10 +4768,10 @@
       </p:sp>
       <p:sp>
         <p:nvSpPr>
-          <p:cNvPr id="5" name="TextBox 4">
-            <a:extLst>
-              <a:ext uri="{FF2B5EF4-FFF2-40B4-BE49-F238E27FC236}">
-                <a16:creationId xmlns:a16="http://schemas.microsoft.com/office/drawing/2014/main" id="{0923DEA1-028F-B143-90EF-9C8CAEF61D7C}"/>
+          <p:cNvPr id="7" name="TextBox 6">
+            <a:extLst>
+              <a:ext uri="{FF2B5EF4-FFF2-40B4-BE49-F238E27FC236}">
+                <a16:creationId xmlns:a16="http://schemas.microsoft.com/office/drawing/2014/main" id="{71A47A2F-0E1A-BE4F-B6F5-8D846CFAB5B8}"/>
               </a:ext>
             </a:extLst>
           </p:cNvPr>
@@ -4331,10 +4811,10 @@
       </p:sp>
       <p:sp>
         <p:nvSpPr>
-          <p:cNvPr id="6" name="TextBox 5">
-            <a:extLst>
-              <a:ext uri="{FF2B5EF4-FFF2-40B4-BE49-F238E27FC236}">
-                <a16:creationId xmlns:a16="http://schemas.microsoft.com/office/drawing/2014/main" id="{F590D664-FB5A-CD41-A841-10936BDDDCB0}"/>
+          <p:cNvPr id="8" name="TextBox 7">
+            <a:extLst>
+              <a:ext uri="{FF2B5EF4-FFF2-40B4-BE49-F238E27FC236}">
+                <a16:creationId xmlns:a16="http://schemas.microsoft.com/office/drawing/2014/main" id="{607C4830-460E-8C4C-9593-FBB585E80623}"/>
               </a:ext>
             </a:extLst>
           </p:cNvPr>
@@ -4375,7 +4855,7 @@
     </p:spTree>
     <p:extLst>
       <p:ext uri="{BB962C8B-B14F-4D97-AF65-F5344CB8AC3E}">
-        <p14:creationId xmlns:p14="http://schemas.microsoft.com/office/powerpoint/2010/main" val="112324768"/>
+        <p14:creationId xmlns:p14="http://schemas.microsoft.com/office/powerpoint/2010/main" val="347268497"/>
       </p:ext>
     </p:extLst>
   </p:cSld>
@@ -4407,7 +4887,7 @@
           <p:cNvPr id="2" name="Picture 1">
             <a:extLst>
               <a:ext uri="{FF2B5EF4-FFF2-40B4-BE49-F238E27FC236}">
-                <a16:creationId xmlns:a16="http://schemas.microsoft.com/office/drawing/2014/main" id="{8C4FA7A0-8A41-9D47-BDC2-5A9382CF77FD}"/>
+                <a16:creationId xmlns:a16="http://schemas.microsoft.com/office/drawing/2014/main" id="{6A4F5A39-719C-C845-8525-AEAA93E851D1}"/>
               </a:ext>
             </a:extLst>
           </p:cNvPr>
@@ -4424,8 +4904,8 @@
         </p:blipFill>
         <p:spPr>
           <a:xfrm>
-            <a:off x="1695450" y="1693862"/>
-            <a:ext cx="8516938" cy="8516938"/>
+            <a:off x="1601788" y="1600200"/>
+            <a:ext cx="8896350" cy="8896350"/>
           </a:xfrm>
           <a:prstGeom prst="rect">
             <a:avLst/>
@@ -4437,7 +4917,7 @@
           <p:cNvPr id="3" name="Straight Connector 2">
             <a:extLst>
               <a:ext uri="{FF2B5EF4-FFF2-40B4-BE49-F238E27FC236}">
-                <a16:creationId xmlns:a16="http://schemas.microsoft.com/office/drawing/2014/main" id="{089666BC-C288-E24D-9920-E37CAB9FE5BD}"/>
+                <a16:creationId xmlns:a16="http://schemas.microsoft.com/office/drawing/2014/main" id="{DED530BB-A92F-B340-A873-6269AA4DC51C}"/>
               </a:ext>
             </a:extLst>
           </p:cNvPr>
@@ -4448,8 +4928,8 @@
         </p:nvCxnSpPr>
         <p:spPr>
           <a:xfrm>
-            <a:off x="7391400" y="1978025"/>
-            <a:ext cx="0" cy="7451725"/>
+            <a:off x="7772400" y="1885950"/>
+            <a:ext cx="0" cy="7810500"/>
           </a:xfrm>
           <a:prstGeom prst="line">
             <a:avLst/>
@@ -4478,10 +4958,10 @@
       </p:cxnSp>
       <p:sp>
         <p:nvSpPr>
-          <p:cNvPr id="4" name="TextBox 3">
-            <a:extLst>
-              <a:ext uri="{FF2B5EF4-FFF2-40B4-BE49-F238E27FC236}">
-                <a16:creationId xmlns:a16="http://schemas.microsoft.com/office/drawing/2014/main" id="{CEE893A0-18AE-4E4D-9E8F-C9AAACEFD1F3}"/>
+          <p:cNvPr id="6" name="TextBox 5">
+            <a:extLst>
+              <a:ext uri="{FF2B5EF4-FFF2-40B4-BE49-F238E27FC236}">
+                <a16:creationId xmlns:a16="http://schemas.microsoft.com/office/drawing/2014/main" id="{71C571E4-3DE8-5F4D-BBD4-497EB5B6785D}"/>
               </a:ext>
             </a:extLst>
           </p:cNvPr>
@@ -4490,7 +4970,7 @@
         </p:nvSpPr>
         <p:spPr>
           <a:xfrm>
-            <a:off x="4007076" y="1516360"/>
+            <a:off x="4008664" y="1138535"/>
             <a:ext cx="1298753" cy="461665"/>
           </a:xfrm>
           <a:prstGeom prst="rect">
@@ -4521,10 +5001,10 @@
       </p:sp>
       <p:sp>
         <p:nvSpPr>
-          <p:cNvPr id="5" name="TextBox 4">
-            <a:extLst>
-              <a:ext uri="{FF2B5EF4-FFF2-40B4-BE49-F238E27FC236}">
-                <a16:creationId xmlns:a16="http://schemas.microsoft.com/office/drawing/2014/main" id="{2FFA95F5-08F0-0A44-97F6-BC6F0774C63A}"/>
+          <p:cNvPr id="7" name="TextBox 6">
+            <a:extLst>
+              <a:ext uri="{FF2B5EF4-FFF2-40B4-BE49-F238E27FC236}">
+                <a16:creationId xmlns:a16="http://schemas.microsoft.com/office/drawing/2014/main" id="{71A47A2F-0E1A-BE4F-B6F5-8D846CFAB5B8}"/>
               </a:ext>
             </a:extLst>
           </p:cNvPr>
@@ -4533,7 +5013,7 @@
         </p:nvSpPr>
         <p:spPr>
           <a:xfrm>
-            <a:off x="8697275" y="1516360"/>
+            <a:off x="8698863" y="1138535"/>
             <a:ext cx="1799275" cy="461665"/>
           </a:xfrm>
           <a:prstGeom prst="rect">
@@ -4564,10 +5044,10 @@
       </p:sp>
       <p:sp>
         <p:nvSpPr>
-          <p:cNvPr id="10" name="TextBox 9">
-            <a:extLst>
-              <a:ext uri="{FF2B5EF4-FFF2-40B4-BE49-F238E27FC236}">
-                <a16:creationId xmlns:a16="http://schemas.microsoft.com/office/drawing/2014/main" id="{72C2152D-D543-5046-9F92-509FA694384F}"/>
+          <p:cNvPr id="8" name="TextBox 7">
+            <a:extLst>
+              <a:ext uri="{FF2B5EF4-FFF2-40B4-BE49-F238E27FC236}">
+                <a16:creationId xmlns:a16="http://schemas.microsoft.com/office/drawing/2014/main" id="{607C4830-460E-8C4C-9593-FBB585E80623}"/>
               </a:ext>
             </a:extLst>
           </p:cNvPr>
@@ -4576,8 +5056,8 @@
         </p:nvSpPr>
         <p:spPr>
           <a:xfrm>
-            <a:off x="9604959" y="6407220"/>
-            <a:ext cx="891591" cy="461665"/>
+            <a:off x="9598500" y="5608082"/>
+            <a:ext cx="740908" cy="461665"/>
           </a:xfrm>
           <a:prstGeom prst="rect">
             <a:avLst/>
@@ -4600,7 +5080,253 @@
             <a:pPr algn="ctr"/>
             <a:r>
               <a:rPr lang="en-US" sz="2400" dirty="0"/>
-              <a:t>GIAD </a:t>
+              <a:t>LELI </a:t>
+            </a:r>
+          </a:p>
+        </p:txBody>
+      </p:sp>
+      <p:sp>
+        <p:nvSpPr>
+          <p:cNvPr id="9" name="Oval 8">
+            <a:extLst>
+              <a:ext uri="{FF2B5EF4-FFF2-40B4-BE49-F238E27FC236}">
+                <a16:creationId xmlns:a16="http://schemas.microsoft.com/office/drawing/2014/main" id="{1DAA6A6C-DCA3-AC47-8967-9E14A0FD383C}"/>
+              </a:ext>
+            </a:extLst>
+          </p:cNvPr>
+          <p:cNvSpPr/>
+          <p:nvPr/>
+        </p:nvSpPr>
+        <p:spPr>
+          <a:xfrm>
+            <a:off x="4283076" y="6324600"/>
+            <a:ext cx="534986" cy="476250"/>
+          </a:xfrm>
+          <a:prstGeom prst="ellipse">
+            <a:avLst/>
+          </a:prstGeom>
+          <a:solidFill>
+            <a:srgbClr val="FF0000"/>
+          </a:solidFill>
+          <a:ln>
+            <a:noFill/>
+          </a:ln>
+        </p:spPr>
+        <p:style>
+          <a:lnRef idx="2">
+            <a:schemeClr val="accent1">
+              <a:shade val="50000"/>
+            </a:schemeClr>
+          </a:lnRef>
+          <a:fillRef idx="1">
+            <a:schemeClr val="accent1"/>
+          </a:fillRef>
+          <a:effectRef idx="0">
+            <a:schemeClr val="accent1"/>
+          </a:effectRef>
+          <a:fontRef idx="minor">
+            <a:schemeClr val="lt1"/>
+          </a:fontRef>
+        </p:style>
+        <p:txBody>
+          <a:bodyPr rtlCol="0" anchor="ctr"/>
+          <a:lstStyle/>
+          <a:p>
+            <a:pPr algn="ctr"/>
+            <a:endParaRPr lang="en-US"/>
+          </a:p>
+        </p:txBody>
+      </p:sp>
+      <p:cxnSp>
+        <p:nvCxnSpPr>
+          <p:cNvPr id="10" name="Straight Connector 9">
+            <a:extLst>
+              <a:ext uri="{FF2B5EF4-FFF2-40B4-BE49-F238E27FC236}">
+                <a16:creationId xmlns:a16="http://schemas.microsoft.com/office/drawing/2014/main" id="{AC4E402C-DD19-C842-817C-8687C2BD1607}"/>
+              </a:ext>
+            </a:extLst>
+          </p:cNvPr>
+          <p:cNvCxnSpPr>
+            <a:cxnSpLocks/>
+          </p:cNvCxnSpPr>
+          <p:nvPr/>
+        </p:nvCxnSpPr>
+        <p:spPr>
+          <a:xfrm>
+            <a:off x="4818062" y="6562725"/>
+            <a:ext cx="5813416" cy="0"/>
+          </a:xfrm>
+          <a:prstGeom prst="line">
+            <a:avLst/>
+          </a:prstGeom>
+          <a:ln w="63500">
+            <a:solidFill>
+              <a:srgbClr val="FF0000"/>
+            </a:solidFill>
+          </a:ln>
+        </p:spPr>
+        <p:style>
+          <a:lnRef idx="1">
+            <a:schemeClr val="accent1"/>
+          </a:lnRef>
+          <a:fillRef idx="0">
+            <a:schemeClr val="accent1"/>
+          </a:fillRef>
+          <a:effectRef idx="0">
+            <a:schemeClr val="accent1"/>
+          </a:effectRef>
+          <a:fontRef idx="minor">
+            <a:schemeClr val="tx1"/>
+          </a:fontRef>
+        </p:style>
+      </p:cxnSp>
+      <p:sp>
+        <p:nvSpPr>
+          <p:cNvPr id="11" name="Google Shape;209;p27">
+            <a:extLst>
+              <a:ext uri="{FF2B5EF4-FFF2-40B4-BE49-F238E27FC236}">
+                <a16:creationId xmlns:a16="http://schemas.microsoft.com/office/drawing/2014/main" id="{A1C996F6-E7BB-0648-9E00-2F050095810B}"/>
+              </a:ext>
+            </a:extLst>
+          </p:cNvPr>
+          <p:cNvSpPr txBox="1"/>
+          <p:nvPr/>
+        </p:nvSpPr>
+        <p:spPr>
+          <a:xfrm>
+            <a:off x="8763000" y="8058152"/>
+            <a:ext cx="1868478" cy="914397"/>
+          </a:xfrm>
+          <a:prstGeom prst="rect">
+            <a:avLst/>
+          </a:prstGeom>
+          <a:noFill/>
+          <a:ln w="9525" cap="flat" cmpd="sng">
+            <a:solidFill>
+              <a:srgbClr val="000000"/>
+            </a:solidFill>
+            <a:prstDash val="solid"/>
+            <a:round/>
+            <a:headEnd type="none" w="sm" len="sm"/>
+            <a:tailEnd type="none" w="sm" len="sm"/>
+          </a:ln>
+        </p:spPr>
+        <p:txBody>
+          <a:bodyPr spcFirstLastPara="1" wrap="square" lIns="91425" tIns="91425" rIns="91425" bIns="91425" anchor="t" anchorCtr="0">
+            <a:noAutofit/>
+          </a:bodyPr>
+          <a:lstStyle/>
+          <a:p>
+            <a:pPr marL="0" lvl="0" indent="0" algn="ctr" rtl="0">
+              <a:spcBef>
+                <a:spcPts val="0"/>
+              </a:spcBef>
+              <a:spcAft>
+                <a:spcPts val="0"/>
+              </a:spcAft>
+              <a:buNone/>
+            </a:pPr>
+            <a:r>
+              <a:rPr lang="en" sz="1600" dirty="0">
+                <a:latin typeface="Lato"/>
+                <a:ea typeface="Lato"/>
+                <a:cs typeface="Lato"/>
+                <a:sym typeface="Lato"/>
+              </a:rPr>
+              <a:t>Above line = 3</a:t>
+            </a:r>
+            <a:endParaRPr sz="1600" dirty="0">
+              <a:latin typeface="Lato"/>
+              <a:ea typeface="Lato"/>
+              <a:cs typeface="Lato"/>
+              <a:sym typeface="Lato"/>
+            </a:endParaRPr>
+          </a:p>
+          <a:p>
+            <a:pPr marL="0" lvl="0" indent="0" algn="ctr" rtl="0">
+              <a:spcBef>
+                <a:spcPts val="0"/>
+              </a:spcBef>
+              <a:spcAft>
+                <a:spcPts val="0"/>
+              </a:spcAft>
+              <a:buNone/>
+            </a:pPr>
+            <a:r>
+              <a:rPr lang="en" sz="1600" dirty="0">
+                <a:latin typeface="Lato"/>
+                <a:ea typeface="Lato"/>
+                <a:cs typeface="Lato"/>
+                <a:sym typeface="Lato"/>
+              </a:rPr>
+              <a:t>Phase N = 3</a:t>
+            </a:r>
+            <a:endParaRPr sz="1600" dirty="0">
+              <a:latin typeface="Lato"/>
+              <a:ea typeface="Lato"/>
+              <a:cs typeface="Lato"/>
+              <a:sym typeface="Lato"/>
+            </a:endParaRPr>
+          </a:p>
+          <a:p>
+            <a:pPr marL="0" lvl="0" indent="0" algn="ctr" rtl="0">
+              <a:spcBef>
+                <a:spcPts val="0"/>
+              </a:spcBef>
+              <a:spcAft>
+                <a:spcPts val="0"/>
+              </a:spcAft>
+              <a:buNone/>
+            </a:pPr>
+            <a:r>
+              <a:rPr lang="en" sz="1600" dirty="0">
+                <a:latin typeface="Lato"/>
+                <a:ea typeface="Lato"/>
+                <a:cs typeface="Lato"/>
+                <a:sym typeface="Lato"/>
+              </a:rPr>
+              <a:t>PND= 3/3 = 1</a:t>
+            </a:r>
+            <a:endParaRPr sz="1600" dirty="0">
+              <a:latin typeface="Lato"/>
+              <a:ea typeface="Lato"/>
+              <a:cs typeface="Lato"/>
+              <a:sym typeface="Lato"/>
+            </a:endParaRPr>
+          </a:p>
+        </p:txBody>
+      </p:sp>
+      <p:sp>
+        <p:nvSpPr>
+          <p:cNvPr id="12" name="TextBox 11">
+            <a:extLst>
+              <a:ext uri="{FF2B5EF4-FFF2-40B4-BE49-F238E27FC236}">
+                <a16:creationId xmlns:a16="http://schemas.microsoft.com/office/drawing/2014/main" id="{23192C86-D09F-9A42-964E-07B43D8567C2}"/>
+              </a:ext>
+            </a:extLst>
+          </p:cNvPr>
+          <p:cNvSpPr txBox="1"/>
+          <p:nvPr/>
+        </p:nvSpPr>
+        <p:spPr>
+          <a:xfrm>
+            <a:off x="9399721" y="7665304"/>
+            <a:ext cx="595035" cy="369332"/>
+          </a:xfrm>
+          <a:prstGeom prst="rect">
+            <a:avLst/>
+          </a:prstGeom>
+          <a:noFill/>
+        </p:spPr>
+        <p:txBody>
+          <a:bodyPr wrap="none" rtlCol="0">
+            <a:spAutoFit/>
+          </a:bodyPr>
+          <a:lstStyle/>
+          <a:p>
+            <a:r>
+              <a:rPr lang="en-US" dirty="0"/>
+              <a:t>PND</a:t>
             </a:r>
           </a:p>
         </p:txBody>
@@ -4608,7 +5334,7 @@
     </p:spTree>
     <p:extLst>
       <p:ext uri="{BB962C8B-B14F-4D97-AF65-F5344CB8AC3E}">
-        <p14:creationId xmlns:p14="http://schemas.microsoft.com/office/powerpoint/2010/main" val="1182763670"/>
+        <p14:creationId xmlns:p14="http://schemas.microsoft.com/office/powerpoint/2010/main" val="711671355"/>
       </p:ext>
     </p:extLst>
   </p:cSld>
@@ -4640,7 +5366,7 @@
           <p:cNvPr id="2" name="Picture 1">
             <a:extLst>
               <a:ext uri="{FF2B5EF4-FFF2-40B4-BE49-F238E27FC236}">
-                <a16:creationId xmlns:a16="http://schemas.microsoft.com/office/drawing/2014/main" id="{C47D1A46-B64C-2B4E-908C-B30F7411D87B}"/>
+                <a16:creationId xmlns:a16="http://schemas.microsoft.com/office/drawing/2014/main" id="{B82A7E28-EBD6-5245-956F-9B55A13A2CA1}"/>
               </a:ext>
             </a:extLst>
           </p:cNvPr>
@@ -4657,8 +5383,8 @@
         </p:blipFill>
         <p:spPr>
           <a:xfrm>
-            <a:off x="1295400" y="1293812"/>
-            <a:ext cx="8991600" cy="8991600"/>
+            <a:off x="1562100" y="1560512"/>
+            <a:ext cx="8783638" cy="8783638"/>
           </a:xfrm>
           <a:prstGeom prst="rect">
             <a:avLst/>
@@ -4670,7 +5396,7 @@
           <p:cNvPr id="3" name="Straight Connector 2">
             <a:extLst>
               <a:ext uri="{FF2B5EF4-FFF2-40B4-BE49-F238E27FC236}">
-                <a16:creationId xmlns:a16="http://schemas.microsoft.com/office/drawing/2014/main" id="{C2CA1BF8-15FB-D54E-8921-42AA2BDC02CA}"/>
+                <a16:creationId xmlns:a16="http://schemas.microsoft.com/office/drawing/2014/main" id="{8654862C-D09E-E745-99D5-A58ED318449C}"/>
               </a:ext>
             </a:extLst>
           </p:cNvPr>
@@ -4681,8 +5407,8 @@
         </p:nvCxnSpPr>
         <p:spPr>
           <a:xfrm>
-            <a:off x="7391400" y="1714500"/>
-            <a:ext cx="0" cy="7715250"/>
+            <a:off x="7772400" y="1885950"/>
+            <a:ext cx="0" cy="7734300"/>
           </a:xfrm>
           <a:prstGeom prst="line">
             <a:avLst/>
@@ -4714,7 +5440,7 @@
           <p:cNvPr id="4" name="TextBox 3">
             <a:extLst>
               <a:ext uri="{FF2B5EF4-FFF2-40B4-BE49-F238E27FC236}">
-                <a16:creationId xmlns:a16="http://schemas.microsoft.com/office/drawing/2014/main" id="{D610A2DF-8409-D44E-8983-FE42B872E0A0}"/>
+                <a16:creationId xmlns:a16="http://schemas.microsoft.com/office/drawing/2014/main" id="{732B55F4-8E20-334D-BA15-A9751D1BD869}"/>
               </a:ext>
             </a:extLst>
           </p:cNvPr>
@@ -4723,7 +5449,7 @@
         </p:nvSpPr>
         <p:spPr>
           <a:xfrm>
-            <a:off x="4007076" y="1516360"/>
+            <a:off x="4008664" y="1138535"/>
             <a:ext cx="1298753" cy="461665"/>
           </a:xfrm>
           <a:prstGeom prst="rect">
@@ -4757,7 +5483,7 @@
           <p:cNvPr id="5" name="TextBox 4">
             <a:extLst>
               <a:ext uri="{FF2B5EF4-FFF2-40B4-BE49-F238E27FC236}">
-                <a16:creationId xmlns:a16="http://schemas.microsoft.com/office/drawing/2014/main" id="{7326254C-C8E0-8F47-BC8D-99B8E151E71B}"/>
+                <a16:creationId xmlns:a16="http://schemas.microsoft.com/office/drawing/2014/main" id="{0923DEA1-028F-B143-90EF-9C8CAEF61D7C}"/>
               </a:ext>
             </a:extLst>
           </p:cNvPr>
@@ -4766,7 +5492,7 @@
         </p:nvSpPr>
         <p:spPr>
           <a:xfrm>
-            <a:off x="8697275" y="1516360"/>
+            <a:off x="8698863" y="1138535"/>
             <a:ext cx="1799275" cy="461665"/>
           </a:xfrm>
           <a:prstGeom prst="rect">
@@ -4800,7 +5526,7 @@
           <p:cNvPr id="6" name="TextBox 5">
             <a:extLst>
               <a:ext uri="{FF2B5EF4-FFF2-40B4-BE49-F238E27FC236}">
-                <a16:creationId xmlns:a16="http://schemas.microsoft.com/office/drawing/2014/main" id="{98EF10D7-C236-5F49-B4DB-3E1633C2BFCC}"/>
+                <a16:creationId xmlns:a16="http://schemas.microsoft.com/office/drawing/2014/main" id="{F590D664-FB5A-CD41-A841-10936BDDDCB0}"/>
               </a:ext>
             </a:extLst>
           </p:cNvPr>
@@ -4809,8 +5535,8 @@
         </p:nvSpPr>
         <p:spPr>
           <a:xfrm>
-            <a:off x="9604959" y="6407220"/>
-            <a:ext cx="891591" cy="461665"/>
+            <a:off x="9598500" y="6509657"/>
+            <a:ext cx="740908" cy="461665"/>
           </a:xfrm>
           <a:prstGeom prst="rect">
             <a:avLst/>
@@ -4833,7 +5559,7 @@
             <a:pPr algn="ctr"/>
             <a:r>
               <a:rPr lang="en-US" sz="2400" dirty="0"/>
-              <a:t>GIAD </a:t>
+              <a:t>LELI </a:t>
             </a:r>
           </a:p>
         </p:txBody>
@@ -4841,7 +5567,717 @@
     </p:spTree>
     <p:extLst>
       <p:ext uri="{BB962C8B-B14F-4D97-AF65-F5344CB8AC3E}">
-        <p14:creationId xmlns:p14="http://schemas.microsoft.com/office/powerpoint/2010/main" val="2933611349"/>
+        <p14:creationId xmlns:p14="http://schemas.microsoft.com/office/powerpoint/2010/main" val="112324768"/>
+      </p:ext>
+    </p:extLst>
+  </p:cSld>
+  <p:clrMapOvr>
+    <a:masterClrMapping/>
+  </p:clrMapOvr>
+</p:sld>
+</file>
+
+<file path=ppt/slides/slide8.xml><?xml version="1.0" encoding="utf-8"?>
+<p:sld xmlns:a="http://schemas.openxmlformats.org/drawingml/2006/main" xmlns:r="http://schemas.openxmlformats.org/officeDocument/2006/relationships" xmlns:p="http://schemas.openxmlformats.org/presentationml/2006/main">
+  <p:cSld>
+    <p:spTree>
+      <p:nvGrpSpPr>
+        <p:cNvPr id="1" name=""/>
+        <p:cNvGrpSpPr/>
+        <p:nvPr/>
+      </p:nvGrpSpPr>
+      <p:grpSpPr>
+        <a:xfrm>
+          <a:off x="0" y="0"/>
+          <a:ext cx="0" cy="0"/>
+          <a:chOff x="0" y="0"/>
+          <a:chExt cx="0" cy="0"/>
+        </a:xfrm>
+      </p:grpSpPr>
+      <p:pic>
+        <p:nvPicPr>
+          <p:cNvPr id="2" name="Picture 1">
+            <a:extLst>
+              <a:ext uri="{FF2B5EF4-FFF2-40B4-BE49-F238E27FC236}">
+                <a16:creationId xmlns:a16="http://schemas.microsoft.com/office/drawing/2014/main" id="{8C4FA7A0-8A41-9D47-BDC2-5A9382CF77FD}"/>
+              </a:ext>
+            </a:extLst>
+          </p:cNvPr>
+          <p:cNvPicPr>
+            <a:picLocks noChangeAspect="1"/>
+          </p:cNvPicPr>
+          <p:nvPr/>
+        </p:nvPicPr>
+        <p:blipFill>
+          <a:blip r:embed="rId2"/>
+          <a:stretch>
+            <a:fillRect/>
+          </a:stretch>
+        </p:blipFill>
+        <p:spPr>
+          <a:xfrm>
+            <a:off x="1695450" y="1693862"/>
+            <a:ext cx="8516938" cy="8516938"/>
+          </a:xfrm>
+          <a:prstGeom prst="rect">
+            <a:avLst/>
+          </a:prstGeom>
+        </p:spPr>
+      </p:pic>
+      <p:cxnSp>
+        <p:nvCxnSpPr>
+          <p:cNvPr id="3" name="Straight Connector 2">
+            <a:extLst>
+              <a:ext uri="{FF2B5EF4-FFF2-40B4-BE49-F238E27FC236}">
+                <a16:creationId xmlns:a16="http://schemas.microsoft.com/office/drawing/2014/main" id="{089666BC-C288-E24D-9920-E37CAB9FE5BD}"/>
+              </a:ext>
+            </a:extLst>
+          </p:cNvPr>
+          <p:cNvCxnSpPr>
+            <a:cxnSpLocks/>
+          </p:cNvCxnSpPr>
+          <p:nvPr/>
+        </p:nvCxnSpPr>
+        <p:spPr>
+          <a:xfrm>
+            <a:off x="7391400" y="1978025"/>
+            <a:ext cx="0" cy="7451725"/>
+          </a:xfrm>
+          <a:prstGeom prst="line">
+            <a:avLst/>
+          </a:prstGeom>
+          <a:ln w="25400">
+            <a:solidFill>
+              <a:schemeClr val="tx1"/>
+            </a:solidFill>
+            <a:prstDash val="dash"/>
+          </a:ln>
+        </p:spPr>
+        <p:style>
+          <a:lnRef idx="1">
+            <a:schemeClr val="accent1"/>
+          </a:lnRef>
+          <a:fillRef idx="0">
+            <a:schemeClr val="accent1"/>
+          </a:fillRef>
+          <a:effectRef idx="0">
+            <a:schemeClr val="accent1"/>
+          </a:effectRef>
+          <a:fontRef idx="minor">
+            <a:schemeClr val="tx1"/>
+          </a:fontRef>
+        </p:style>
+      </p:cxnSp>
+      <p:sp>
+        <p:nvSpPr>
+          <p:cNvPr id="4" name="TextBox 3">
+            <a:extLst>
+              <a:ext uri="{FF2B5EF4-FFF2-40B4-BE49-F238E27FC236}">
+                <a16:creationId xmlns:a16="http://schemas.microsoft.com/office/drawing/2014/main" id="{CEE893A0-18AE-4E4D-9E8F-C9AAACEFD1F3}"/>
+              </a:ext>
+            </a:extLst>
+          </p:cNvPr>
+          <p:cNvSpPr txBox="1"/>
+          <p:nvPr/>
+        </p:nvSpPr>
+        <p:spPr>
+          <a:xfrm>
+            <a:off x="4007076" y="1516360"/>
+            <a:ext cx="1298753" cy="461665"/>
+          </a:xfrm>
+          <a:prstGeom prst="rect">
+            <a:avLst/>
+          </a:prstGeom>
+          <a:solidFill>
+            <a:schemeClr val="bg1"/>
+          </a:solidFill>
+          <a:ln w="19050">
+            <a:solidFill>
+              <a:schemeClr val="tx1"/>
+            </a:solidFill>
+          </a:ln>
+        </p:spPr>
+        <p:txBody>
+          <a:bodyPr wrap="none" rtlCol="0">
+            <a:spAutoFit/>
+          </a:bodyPr>
+          <a:lstStyle/>
+          <a:p>
+            <a:pPr algn="ctr"/>
+            <a:r>
+              <a:rPr lang="en-US" sz="2400" dirty="0"/>
+              <a:t>Baseline </a:t>
+            </a:r>
+          </a:p>
+        </p:txBody>
+      </p:sp>
+      <p:sp>
+        <p:nvSpPr>
+          <p:cNvPr id="5" name="TextBox 4">
+            <a:extLst>
+              <a:ext uri="{FF2B5EF4-FFF2-40B4-BE49-F238E27FC236}">
+                <a16:creationId xmlns:a16="http://schemas.microsoft.com/office/drawing/2014/main" id="{2FFA95F5-08F0-0A44-97F6-BC6F0774C63A}"/>
+              </a:ext>
+            </a:extLst>
+          </p:cNvPr>
+          <p:cNvSpPr txBox="1"/>
+          <p:nvPr/>
+        </p:nvSpPr>
+        <p:spPr>
+          <a:xfrm>
+            <a:off x="8697275" y="1516360"/>
+            <a:ext cx="1799275" cy="461665"/>
+          </a:xfrm>
+          <a:prstGeom prst="rect">
+            <a:avLst/>
+          </a:prstGeom>
+          <a:solidFill>
+            <a:schemeClr val="bg1"/>
+          </a:solidFill>
+          <a:ln w="19050">
+            <a:solidFill>
+              <a:schemeClr val="tx1"/>
+            </a:solidFill>
+          </a:ln>
+        </p:spPr>
+        <p:txBody>
+          <a:bodyPr wrap="none" rtlCol="0">
+            <a:spAutoFit/>
+          </a:bodyPr>
+          <a:lstStyle/>
+          <a:p>
+            <a:pPr algn="ctr"/>
+            <a:r>
+              <a:rPr lang="en-US" sz="2400" dirty="0"/>
+              <a:t>Intervention </a:t>
+            </a:r>
+          </a:p>
+        </p:txBody>
+      </p:sp>
+      <p:sp>
+        <p:nvSpPr>
+          <p:cNvPr id="10" name="TextBox 9">
+            <a:extLst>
+              <a:ext uri="{FF2B5EF4-FFF2-40B4-BE49-F238E27FC236}">
+                <a16:creationId xmlns:a16="http://schemas.microsoft.com/office/drawing/2014/main" id="{72C2152D-D543-5046-9F92-509FA694384F}"/>
+              </a:ext>
+            </a:extLst>
+          </p:cNvPr>
+          <p:cNvSpPr txBox="1"/>
+          <p:nvPr/>
+        </p:nvSpPr>
+        <p:spPr>
+          <a:xfrm>
+            <a:off x="9604959" y="6407220"/>
+            <a:ext cx="891591" cy="461665"/>
+          </a:xfrm>
+          <a:prstGeom prst="rect">
+            <a:avLst/>
+          </a:prstGeom>
+          <a:solidFill>
+            <a:schemeClr val="bg1"/>
+          </a:solidFill>
+          <a:ln w="19050">
+            <a:solidFill>
+              <a:schemeClr val="tx1"/>
+            </a:solidFill>
+          </a:ln>
+        </p:spPr>
+        <p:txBody>
+          <a:bodyPr wrap="none" rtlCol="0">
+            <a:spAutoFit/>
+          </a:bodyPr>
+          <a:lstStyle/>
+          <a:p>
+            <a:pPr algn="ctr"/>
+            <a:r>
+              <a:rPr lang="en-US" sz="2400" dirty="0"/>
+              <a:t>GIAD </a:t>
+            </a:r>
+          </a:p>
+        </p:txBody>
+      </p:sp>
+    </p:spTree>
+    <p:extLst>
+      <p:ext uri="{BB962C8B-B14F-4D97-AF65-F5344CB8AC3E}">
+        <p14:creationId xmlns:p14="http://schemas.microsoft.com/office/powerpoint/2010/main" val="1182763670"/>
+      </p:ext>
+    </p:extLst>
+  </p:cSld>
+  <p:clrMapOvr>
+    <a:masterClrMapping/>
+  </p:clrMapOvr>
+</p:sld>
+</file>
+
+<file path=ppt/slides/slide9.xml><?xml version="1.0" encoding="utf-8"?>
+<p:sld xmlns:a="http://schemas.openxmlformats.org/drawingml/2006/main" xmlns:r="http://schemas.openxmlformats.org/officeDocument/2006/relationships" xmlns:p="http://schemas.openxmlformats.org/presentationml/2006/main">
+  <p:cSld>
+    <p:spTree>
+      <p:nvGrpSpPr>
+        <p:cNvPr id="1" name=""/>
+        <p:cNvGrpSpPr/>
+        <p:nvPr/>
+      </p:nvGrpSpPr>
+      <p:grpSpPr>
+        <a:xfrm>
+          <a:off x="0" y="0"/>
+          <a:ext cx="0" cy="0"/>
+          <a:chOff x="0" y="0"/>
+          <a:chExt cx="0" cy="0"/>
+        </a:xfrm>
+      </p:grpSpPr>
+      <p:pic>
+        <p:nvPicPr>
+          <p:cNvPr id="2" name="Picture 1">
+            <a:extLst>
+              <a:ext uri="{FF2B5EF4-FFF2-40B4-BE49-F238E27FC236}">
+                <a16:creationId xmlns:a16="http://schemas.microsoft.com/office/drawing/2014/main" id="{8C4FA7A0-8A41-9D47-BDC2-5A9382CF77FD}"/>
+              </a:ext>
+            </a:extLst>
+          </p:cNvPr>
+          <p:cNvPicPr>
+            <a:picLocks noChangeAspect="1"/>
+          </p:cNvPicPr>
+          <p:nvPr/>
+        </p:nvPicPr>
+        <p:blipFill>
+          <a:blip r:embed="rId2"/>
+          <a:stretch>
+            <a:fillRect/>
+          </a:stretch>
+        </p:blipFill>
+        <p:spPr>
+          <a:xfrm>
+            <a:off x="1695450" y="1693862"/>
+            <a:ext cx="8516938" cy="8516938"/>
+          </a:xfrm>
+          <a:prstGeom prst="rect">
+            <a:avLst/>
+          </a:prstGeom>
+        </p:spPr>
+      </p:pic>
+      <p:cxnSp>
+        <p:nvCxnSpPr>
+          <p:cNvPr id="3" name="Straight Connector 2">
+            <a:extLst>
+              <a:ext uri="{FF2B5EF4-FFF2-40B4-BE49-F238E27FC236}">
+                <a16:creationId xmlns:a16="http://schemas.microsoft.com/office/drawing/2014/main" id="{089666BC-C288-E24D-9920-E37CAB9FE5BD}"/>
+              </a:ext>
+            </a:extLst>
+          </p:cNvPr>
+          <p:cNvCxnSpPr>
+            <a:cxnSpLocks/>
+          </p:cNvCxnSpPr>
+          <p:nvPr/>
+        </p:nvCxnSpPr>
+        <p:spPr>
+          <a:xfrm>
+            <a:off x="7391400" y="1978025"/>
+            <a:ext cx="0" cy="7451725"/>
+          </a:xfrm>
+          <a:prstGeom prst="line">
+            <a:avLst/>
+          </a:prstGeom>
+          <a:ln w="25400">
+            <a:solidFill>
+              <a:schemeClr val="tx1"/>
+            </a:solidFill>
+            <a:prstDash val="dash"/>
+          </a:ln>
+        </p:spPr>
+        <p:style>
+          <a:lnRef idx="1">
+            <a:schemeClr val="accent1"/>
+          </a:lnRef>
+          <a:fillRef idx="0">
+            <a:schemeClr val="accent1"/>
+          </a:fillRef>
+          <a:effectRef idx="0">
+            <a:schemeClr val="accent1"/>
+          </a:effectRef>
+          <a:fontRef idx="minor">
+            <a:schemeClr val="tx1"/>
+          </a:fontRef>
+        </p:style>
+      </p:cxnSp>
+      <p:sp>
+        <p:nvSpPr>
+          <p:cNvPr id="4" name="TextBox 3">
+            <a:extLst>
+              <a:ext uri="{FF2B5EF4-FFF2-40B4-BE49-F238E27FC236}">
+                <a16:creationId xmlns:a16="http://schemas.microsoft.com/office/drawing/2014/main" id="{CEE893A0-18AE-4E4D-9E8F-C9AAACEFD1F3}"/>
+              </a:ext>
+            </a:extLst>
+          </p:cNvPr>
+          <p:cNvSpPr txBox="1"/>
+          <p:nvPr/>
+        </p:nvSpPr>
+        <p:spPr>
+          <a:xfrm>
+            <a:off x="4007076" y="1516360"/>
+            <a:ext cx="1298753" cy="461665"/>
+          </a:xfrm>
+          <a:prstGeom prst="rect">
+            <a:avLst/>
+          </a:prstGeom>
+          <a:solidFill>
+            <a:schemeClr val="bg1"/>
+          </a:solidFill>
+          <a:ln w="19050">
+            <a:solidFill>
+              <a:schemeClr val="tx1"/>
+            </a:solidFill>
+          </a:ln>
+        </p:spPr>
+        <p:txBody>
+          <a:bodyPr wrap="none" rtlCol="0">
+            <a:spAutoFit/>
+          </a:bodyPr>
+          <a:lstStyle/>
+          <a:p>
+            <a:pPr algn="ctr"/>
+            <a:r>
+              <a:rPr lang="en-US" sz="2400" dirty="0"/>
+              <a:t>Baseline </a:t>
+            </a:r>
+          </a:p>
+        </p:txBody>
+      </p:sp>
+      <p:sp>
+        <p:nvSpPr>
+          <p:cNvPr id="5" name="TextBox 4">
+            <a:extLst>
+              <a:ext uri="{FF2B5EF4-FFF2-40B4-BE49-F238E27FC236}">
+                <a16:creationId xmlns:a16="http://schemas.microsoft.com/office/drawing/2014/main" id="{2FFA95F5-08F0-0A44-97F6-BC6F0774C63A}"/>
+              </a:ext>
+            </a:extLst>
+          </p:cNvPr>
+          <p:cNvSpPr txBox="1"/>
+          <p:nvPr/>
+        </p:nvSpPr>
+        <p:spPr>
+          <a:xfrm>
+            <a:off x="8697275" y="1516360"/>
+            <a:ext cx="1799275" cy="461665"/>
+          </a:xfrm>
+          <a:prstGeom prst="rect">
+            <a:avLst/>
+          </a:prstGeom>
+          <a:solidFill>
+            <a:schemeClr val="bg1"/>
+          </a:solidFill>
+          <a:ln w="19050">
+            <a:solidFill>
+              <a:schemeClr val="tx1"/>
+            </a:solidFill>
+          </a:ln>
+        </p:spPr>
+        <p:txBody>
+          <a:bodyPr wrap="none" rtlCol="0">
+            <a:spAutoFit/>
+          </a:bodyPr>
+          <a:lstStyle/>
+          <a:p>
+            <a:pPr algn="ctr"/>
+            <a:r>
+              <a:rPr lang="en-US" sz="2400" dirty="0"/>
+              <a:t>Intervention </a:t>
+            </a:r>
+          </a:p>
+        </p:txBody>
+      </p:sp>
+      <p:sp>
+        <p:nvSpPr>
+          <p:cNvPr id="10" name="TextBox 9">
+            <a:extLst>
+              <a:ext uri="{FF2B5EF4-FFF2-40B4-BE49-F238E27FC236}">
+                <a16:creationId xmlns:a16="http://schemas.microsoft.com/office/drawing/2014/main" id="{72C2152D-D543-5046-9F92-509FA694384F}"/>
+              </a:ext>
+            </a:extLst>
+          </p:cNvPr>
+          <p:cNvSpPr txBox="1"/>
+          <p:nvPr/>
+        </p:nvSpPr>
+        <p:spPr>
+          <a:xfrm>
+            <a:off x="9604959" y="6407220"/>
+            <a:ext cx="891591" cy="461665"/>
+          </a:xfrm>
+          <a:prstGeom prst="rect">
+            <a:avLst/>
+          </a:prstGeom>
+          <a:solidFill>
+            <a:schemeClr val="bg1"/>
+          </a:solidFill>
+          <a:ln w="19050">
+            <a:solidFill>
+              <a:schemeClr val="tx1"/>
+            </a:solidFill>
+          </a:ln>
+        </p:spPr>
+        <p:txBody>
+          <a:bodyPr wrap="none" rtlCol="0">
+            <a:spAutoFit/>
+          </a:bodyPr>
+          <a:lstStyle/>
+          <a:p>
+            <a:pPr algn="ctr"/>
+            <a:r>
+              <a:rPr lang="en-US" sz="2400" dirty="0"/>
+              <a:t>GIAD </a:t>
+            </a:r>
+          </a:p>
+        </p:txBody>
+      </p:sp>
+      <p:sp>
+        <p:nvSpPr>
+          <p:cNvPr id="7" name="Oval 6">
+            <a:extLst>
+              <a:ext uri="{FF2B5EF4-FFF2-40B4-BE49-F238E27FC236}">
+                <a16:creationId xmlns:a16="http://schemas.microsoft.com/office/drawing/2014/main" id="{ABB05E02-A457-024A-97E4-033E7E04FA3C}"/>
+              </a:ext>
+            </a:extLst>
+          </p:cNvPr>
+          <p:cNvSpPr/>
+          <p:nvPr/>
+        </p:nvSpPr>
+        <p:spPr>
+          <a:xfrm>
+            <a:off x="3698556" y="5219700"/>
+            <a:ext cx="534986" cy="476250"/>
+          </a:xfrm>
+          <a:prstGeom prst="ellipse">
+            <a:avLst/>
+          </a:prstGeom>
+          <a:solidFill>
+            <a:srgbClr val="FF0000"/>
+          </a:solidFill>
+          <a:ln>
+            <a:noFill/>
+          </a:ln>
+        </p:spPr>
+        <p:style>
+          <a:lnRef idx="2">
+            <a:schemeClr val="accent1">
+              <a:shade val="50000"/>
+            </a:schemeClr>
+          </a:lnRef>
+          <a:fillRef idx="1">
+            <a:schemeClr val="accent1"/>
+          </a:fillRef>
+          <a:effectRef idx="0">
+            <a:schemeClr val="accent1"/>
+          </a:effectRef>
+          <a:fontRef idx="minor">
+            <a:schemeClr val="lt1"/>
+          </a:fontRef>
+        </p:style>
+        <p:txBody>
+          <a:bodyPr rtlCol="0" anchor="ctr"/>
+          <a:lstStyle/>
+          <a:p>
+            <a:pPr algn="ctr"/>
+            <a:endParaRPr lang="en-US"/>
+          </a:p>
+        </p:txBody>
+      </p:sp>
+      <p:cxnSp>
+        <p:nvCxnSpPr>
+          <p:cNvPr id="8" name="Straight Connector 7">
+            <a:extLst>
+              <a:ext uri="{FF2B5EF4-FFF2-40B4-BE49-F238E27FC236}">
+                <a16:creationId xmlns:a16="http://schemas.microsoft.com/office/drawing/2014/main" id="{DCD088CF-F6B6-B643-88B4-823FF4707789}"/>
+              </a:ext>
+            </a:extLst>
+          </p:cNvPr>
+          <p:cNvCxnSpPr/>
+          <p:nvPr/>
+        </p:nvCxnSpPr>
+        <p:spPr>
+          <a:xfrm>
+            <a:off x="4233542" y="5457825"/>
+            <a:ext cx="6364290" cy="0"/>
+          </a:xfrm>
+          <a:prstGeom prst="line">
+            <a:avLst/>
+          </a:prstGeom>
+          <a:ln w="63500">
+            <a:solidFill>
+              <a:srgbClr val="FF0000"/>
+            </a:solidFill>
+          </a:ln>
+        </p:spPr>
+        <p:style>
+          <a:lnRef idx="1">
+            <a:schemeClr val="accent1"/>
+          </a:lnRef>
+          <a:fillRef idx="0">
+            <a:schemeClr val="accent1"/>
+          </a:fillRef>
+          <a:effectRef idx="0">
+            <a:schemeClr val="accent1"/>
+          </a:effectRef>
+          <a:fontRef idx="minor">
+            <a:schemeClr val="tx1"/>
+          </a:fontRef>
+        </p:style>
+      </p:cxnSp>
+      <p:sp>
+        <p:nvSpPr>
+          <p:cNvPr id="9" name="Google Shape;209;p27">
+            <a:extLst>
+              <a:ext uri="{FF2B5EF4-FFF2-40B4-BE49-F238E27FC236}">
+                <a16:creationId xmlns:a16="http://schemas.microsoft.com/office/drawing/2014/main" id="{8A8F912F-8D30-D541-9348-1B34F44D6DA9}"/>
+              </a:ext>
+            </a:extLst>
+          </p:cNvPr>
+          <p:cNvSpPr txBox="1"/>
+          <p:nvPr/>
+        </p:nvSpPr>
+        <p:spPr>
+          <a:xfrm>
+            <a:off x="8763000" y="8058152"/>
+            <a:ext cx="1868478" cy="914397"/>
+          </a:xfrm>
+          <a:prstGeom prst="rect">
+            <a:avLst/>
+          </a:prstGeom>
+          <a:noFill/>
+          <a:ln w="9525" cap="flat" cmpd="sng">
+            <a:solidFill>
+              <a:srgbClr val="000000"/>
+            </a:solidFill>
+            <a:prstDash val="solid"/>
+            <a:round/>
+            <a:headEnd type="none" w="sm" len="sm"/>
+            <a:tailEnd type="none" w="sm" len="sm"/>
+          </a:ln>
+        </p:spPr>
+        <p:txBody>
+          <a:bodyPr spcFirstLastPara="1" wrap="square" lIns="91425" tIns="91425" rIns="91425" bIns="91425" anchor="t" anchorCtr="0">
+            <a:noAutofit/>
+          </a:bodyPr>
+          <a:lstStyle/>
+          <a:p>
+            <a:pPr marL="0" lvl="0" indent="0" algn="ctr" rtl="0">
+              <a:spcBef>
+                <a:spcPts val="0"/>
+              </a:spcBef>
+              <a:spcAft>
+                <a:spcPts val="0"/>
+              </a:spcAft>
+              <a:buNone/>
+            </a:pPr>
+            <a:r>
+              <a:rPr lang="en" sz="1600" dirty="0">
+                <a:latin typeface="Lato"/>
+                <a:ea typeface="Lato"/>
+                <a:cs typeface="Lato"/>
+                <a:sym typeface="Lato"/>
+              </a:rPr>
+              <a:t>Above line = 3</a:t>
+            </a:r>
+            <a:endParaRPr sz="1600" dirty="0">
+              <a:latin typeface="Lato"/>
+              <a:ea typeface="Lato"/>
+              <a:cs typeface="Lato"/>
+              <a:sym typeface="Lato"/>
+            </a:endParaRPr>
+          </a:p>
+          <a:p>
+            <a:pPr marL="0" lvl="0" indent="0" algn="ctr" rtl="0">
+              <a:spcBef>
+                <a:spcPts val="0"/>
+              </a:spcBef>
+              <a:spcAft>
+                <a:spcPts val="0"/>
+              </a:spcAft>
+              <a:buNone/>
+            </a:pPr>
+            <a:r>
+              <a:rPr lang="en" sz="1600" dirty="0">
+                <a:latin typeface="Lato"/>
+                <a:ea typeface="Lato"/>
+                <a:cs typeface="Lato"/>
+                <a:sym typeface="Lato"/>
+              </a:rPr>
+              <a:t>Phase N = 3</a:t>
+            </a:r>
+            <a:endParaRPr sz="1600" dirty="0">
+              <a:latin typeface="Lato"/>
+              <a:ea typeface="Lato"/>
+              <a:cs typeface="Lato"/>
+              <a:sym typeface="Lato"/>
+            </a:endParaRPr>
+          </a:p>
+          <a:p>
+            <a:pPr marL="0" lvl="0" indent="0" algn="ctr" rtl="0">
+              <a:spcBef>
+                <a:spcPts val="0"/>
+              </a:spcBef>
+              <a:spcAft>
+                <a:spcPts val="0"/>
+              </a:spcAft>
+              <a:buNone/>
+            </a:pPr>
+            <a:r>
+              <a:rPr lang="en" sz="1600" dirty="0">
+                <a:latin typeface="Lato"/>
+                <a:ea typeface="Lato"/>
+                <a:cs typeface="Lato"/>
+                <a:sym typeface="Lato"/>
+              </a:rPr>
+              <a:t>PND= 3/3 = 1</a:t>
+            </a:r>
+            <a:endParaRPr sz="1600" dirty="0">
+              <a:latin typeface="Lato"/>
+              <a:ea typeface="Lato"/>
+              <a:cs typeface="Lato"/>
+              <a:sym typeface="Lato"/>
+            </a:endParaRPr>
+          </a:p>
+        </p:txBody>
+      </p:sp>
+      <p:sp>
+        <p:nvSpPr>
+          <p:cNvPr id="11" name="TextBox 10">
+            <a:extLst>
+              <a:ext uri="{FF2B5EF4-FFF2-40B4-BE49-F238E27FC236}">
+                <a16:creationId xmlns:a16="http://schemas.microsoft.com/office/drawing/2014/main" id="{FE780CB7-CE1A-784A-B752-97FD13B6C378}"/>
+              </a:ext>
+            </a:extLst>
+          </p:cNvPr>
+          <p:cNvSpPr txBox="1"/>
+          <p:nvPr/>
+        </p:nvSpPr>
+        <p:spPr>
+          <a:xfrm>
+            <a:off x="9399721" y="7665304"/>
+            <a:ext cx="595035" cy="369332"/>
+          </a:xfrm>
+          <a:prstGeom prst="rect">
+            <a:avLst/>
+          </a:prstGeom>
+          <a:noFill/>
+        </p:spPr>
+        <p:txBody>
+          <a:bodyPr wrap="none" rtlCol="0">
+            <a:spAutoFit/>
+          </a:bodyPr>
+          <a:lstStyle/>
+          <a:p>
+            <a:r>
+              <a:rPr lang="en-US" dirty="0"/>
+              <a:t>PND</a:t>
+            </a:r>
+          </a:p>
+        </p:txBody>
+      </p:sp>
+    </p:spTree>
+    <p:extLst>
+      <p:ext uri="{BB962C8B-B14F-4D97-AF65-F5344CB8AC3E}">
+        <p14:creationId xmlns:p14="http://schemas.microsoft.com/office/powerpoint/2010/main" val="3347350271"/>
       </p:ext>
     </p:extLst>
   </p:cSld>

</xml_diff>

<commit_message>
site updated with new data
</commit_message>
<xml_diff>
--- a/visual_analysis.pptx
+++ b/visual_analysis.pptx
@@ -15,6 +15,12 @@
     <p:sldId id="261" r:id="rId9"/>
     <p:sldId id="265" r:id="rId10"/>
     <p:sldId id="262" r:id="rId11"/>
+    <p:sldId id="266" r:id="rId12"/>
+    <p:sldId id="267" r:id="rId13"/>
+    <p:sldId id="268" r:id="rId14"/>
+    <p:sldId id="269" r:id="rId15"/>
+    <p:sldId id="270" r:id="rId16"/>
+    <p:sldId id="271" r:id="rId17"/>
   </p:sldIdLst>
   <p:sldSz cx="12192000" cy="12188825"/>
   <p:notesSz cx="6858000" cy="9144000"/>
@@ -252,7 +258,7 @@
           <a:p>
             <a:fld id="{C0F591A4-A496-F649-9D1E-A72CB8E70ADD}" type="datetimeFigureOut">
               <a:rPr lang="en-US" smtClean="0"/>
-              <a:t>1/31/22</a:t>
+              <a:t>2/9/22</a:t>
             </a:fld>
             <a:endParaRPr lang="en-US"/>
           </a:p>
@@ -422,7 +428,7 @@
           <a:p>
             <a:fld id="{C0F591A4-A496-F649-9D1E-A72CB8E70ADD}" type="datetimeFigureOut">
               <a:rPr lang="en-US" smtClean="0"/>
-              <a:t>1/31/22</a:t>
+              <a:t>2/9/22</a:t>
             </a:fld>
             <a:endParaRPr lang="en-US"/>
           </a:p>
@@ -602,7 +608,7 @@
           <a:p>
             <a:fld id="{C0F591A4-A496-F649-9D1E-A72CB8E70ADD}" type="datetimeFigureOut">
               <a:rPr lang="en-US" smtClean="0"/>
-              <a:t>1/31/22</a:t>
+              <a:t>2/9/22</a:t>
             </a:fld>
             <a:endParaRPr lang="en-US"/>
           </a:p>
@@ -772,7 +778,7 @@
           <a:p>
             <a:fld id="{C0F591A4-A496-F649-9D1E-A72CB8E70ADD}" type="datetimeFigureOut">
               <a:rPr lang="en-US" smtClean="0"/>
-              <a:t>1/31/22</a:t>
+              <a:t>2/9/22</a:t>
             </a:fld>
             <a:endParaRPr lang="en-US"/>
           </a:p>
@@ -1016,7 +1022,7 @@
           <a:p>
             <a:fld id="{C0F591A4-A496-F649-9D1E-A72CB8E70ADD}" type="datetimeFigureOut">
               <a:rPr lang="en-US" smtClean="0"/>
-              <a:t>1/31/22</a:t>
+              <a:t>2/9/22</a:t>
             </a:fld>
             <a:endParaRPr lang="en-US"/>
           </a:p>
@@ -1248,7 +1254,7 @@
           <a:p>
             <a:fld id="{C0F591A4-A496-F649-9D1E-A72CB8E70ADD}" type="datetimeFigureOut">
               <a:rPr lang="en-US" smtClean="0"/>
-              <a:t>1/31/22</a:t>
+              <a:t>2/9/22</a:t>
             </a:fld>
             <a:endParaRPr lang="en-US"/>
           </a:p>
@@ -1615,7 +1621,7 @@
           <a:p>
             <a:fld id="{C0F591A4-A496-F649-9D1E-A72CB8E70ADD}" type="datetimeFigureOut">
               <a:rPr lang="en-US" smtClean="0"/>
-              <a:t>1/31/22</a:t>
+              <a:t>2/9/22</a:t>
             </a:fld>
             <a:endParaRPr lang="en-US"/>
           </a:p>
@@ -1733,7 +1739,7 @@
           <a:p>
             <a:fld id="{C0F591A4-A496-F649-9D1E-A72CB8E70ADD}" type="datetimeFigureOut">
               <a:rPr lang="en-US" smtClean="0"/>
-              <a:t>1/31/22</a:t>
+              <a:t>2/9/22</a:t>
             </a:fld>
             <a:endParaRPr lang="en-US"/>
           </a:p>
@@ -1828,7 +1834,7 @@
           <a:p>
             <a:fld id="{C0F591A4-A496-F649-9D1E-A72CB8E70ADD}" type="datetimeFigureOut">
               <a:rPr lang="en-US" smtClean="0"/>
-              <a:t>1/31/22</a:t>
+              <a:t>2/9/22</a:t>
             </a:fld>
             <a:endParaRPr lang="en-US"/>
           </a:p>
@@ -2105,7 +2111,7 @@
           <a:p>
             <a:fld id="{C0F591A4-A496-F649-9D1E-A72CB8E70ADD}" type="datetimeFigureOut">
               <a:rPr lang="en-US" smtClean="0"/>
-              <a:t>1/31/22</a:t>
+              <a:t>2/9/22</a:t>
             </a:fld>
             <a:endParaRPr lang="en-US"/>
           </a:p>
@@ -2362,7 +2368,7 @@
           <a:p>
             <a:fld id="{C0F591A4-A496-F649-9D1E-A72CB8E70ADD}" type="datetimeFigureOut">
               <a:rPr lang="en-US" smtClean="0"/>
-              <a:t>1/31/22</a:t>
+              <a:t>2/9/22</a:t>
             </a:fld>
             <a:endParaRPr lang="en-US"/>
           </a:p>
@@ -2575,7 +2581,7 @@
           <a:p>
             <a:fld id="{C0F591A4-A496-F649-9D1E-A72CB8E70ADD}" type="datetimeFigureOut">
               <a:rPr lang="en-US" smtClean="0"/>
-              <a:t>1/31/22</a:t>
+              <a:t>2/9/22</a:t>
             </a:fld>
             <a:endParaRPr lang="en-US"/>
           </a:p>
@@ -3689,6 +3695,2872 @@
 </p:sld>
 </file>
 
+<file path=ppt/slides/slide11.xml><?xml version="1.0" encoding="utf-8"?>
+<p:sld xmlns:a="http://schemas.openxmlformats.org/drawingml/2006/main" xmlns:r="http://schemas.openxmlformats.org/officeDocument/2006/relationships" xmlns:p="http://schemas.openxmlformats.org/presentationml/2006/main">
+  <p:cSld>
+    <p:spTree>
+      <p:nvGrpSpPr>
+        <p:cNvPr id="1" name=""/>
+        <p:cNvGrpSpPr/>
+        <p:nvPr/>
+      </p:nvGrpSpPr>
+      <p:grpSpPr>
+        <a:xfrm>
+          <a:off x="0" y="0"/>
+          <a:ext cx="0" cy="0"/>
+          <a:chOff x="0" y="0"/>
+          <a:chExt cx="0" cy="0"/>
+        </a:xfrm>
+      </p:grpSpPr>
+      <p:pic>
+        <p:nvPicPr>
+          <p:cNvPr id="2" name="Picture 1">
+            <a:extLst>
+              <a:ext uri="{FF2B5EF4-FFF2-40B4-BE49-F238E27FC236}">
+                <a16:creationId xmlns:a16="http://schemas.microsoft.com/office/drawing/2014/main" id="{D1B550B6-DA6B-D742-815E-C65449C230D3}"/>
+              </a:ext>
+            </a:extLst>
+          </p:cNvPr>
+          <p:cNvPicPr>
+            <a:picLocks noChangeAspect="1"/>
+          </p:cNvPicPr>
+          <p:nvPr/>
+        </p:nvPicPr>
+        <p:blipFill>
+          <a:blip r:embed="rId2"/>
+          <a:stretch>
+            <a:fillRect/>
+          </a:stretch>
+        </p:blipFill>
+        <p:spPr>
+          <a:xfrm>
+            <a:off x="978195" y="1167993"/>
+            <a:ext cx="9824484" cy="9824484"/>
+          </a:xfrm>
+          <a:prstGeom prst="rect">
+            <a:avLst/>
+          </a:prstGeom>
+        </p:spPr>
+      </p:pic>
+      <p:sp>
+        <p:nvSpPr>
+          <p:cNvPr id="3" name="TextBox 2">
+            <a:extLst>
+              <a:ext uri="{FF2B5EF4-FFF2-40B4-BE49-F238E27FC236}">
+                <a16:creationId xmlns:a16="http://schemas.microsoft.com/office/drawing/2014/main" id="{9B03E512-5271-D841-9D3E-A622AABF9E6B}"/>
+              </a:ext>
+            </a:extLst>
+          </p:cNvPr>
+          <p:cNvSpPr txBox="1"/>
+          <p:nvPr/>
+        </p:nvSpPr>
+        <p:spPr>
+          <a:xfrm>
+            <a:off x="9172631" y="4931883"/>
+            <a:ext cx="822276" cy="461665"/>
+          </a:xfrm>
+          <a:prstGeom prst="rect">
+            <a:avLst/>
+          </a:prstGeom>
+          <a:solidFill>
+            <a:schemeClr val="bg1"/>
+          </a:solidFill>
+          <a:ln w="19050">
+            <a:solidFill>
+              <a:schemeClr val="tx1"/>
+            </a:solidFill>
+          </a:ln>
+        </p:spPr>
+        <p:txBody>
+          <a:bodyPr wrap="none" rtlCol="0">
+            <a:spAutoFit/>
+          </a:bodyPr>
+          <a:lstStyle/>
+          <a:p>
+            <a:pPr algn="ctr"/>
+            <a:r>
+              <a:rPr lang="en-US" sz="2400" dirty="0"/>
+              <a:t>SAJE </a:t>
+            </a:r>
+          </a:p>
+        </p:txBody>
+      </p:sp>
+      <p:sp>
+        <p:nvSpPr>
+          <p:cNvPr id="4" name="TextBox 3">
+            <a:extLst>
+              <a:ext uri="{FF2B5EF4-FFF2-40B4-BE49-F238E27FC236}">
+                <a16:creationId xmlns:a16="http://schemas.microsoft.com/office/drawing/2014/main" id="{A850B29B-6D11-D940-B20D-1736957A6BFA}"/>
+              </a:ext>
+            </a:extLst>
+          </p:cNvPr>
+          <p:cNvSpPr txBox="1"/>
+          <p:nvPr/>
+        </p:nvSpPr>
+        <p:spPr>
+          <a:xfrm>
+            <a:off x="4008664" y="1430928"/>
+            <a:ext cx="1298753" cy="461665"/>
+          </a:xfrm>
+          <a:prstGeom prst="rect">
+            <a:avLst/>
+          </a:prstGeom>
+          <a:solidFill>
+            <a:schemeClr val="bg1"/>
+          </a:solidFill>
+          <a:ln w="19050">
+            <a:solidFill>
+              <a:schemeClr val="tx1"/>
+            </a:solidFill>
+          </a:ln>
+        </p:spPr>
+        <p:txBody>
+          <a:bodyPr wrap="none" rtlCol="0">
+            <a:spAutoFit/>
+          </a:bodyPr>
+          <a:lstStyle/>
+          <a:p>
+            <a:pPr algn="ctr"/>
+            <a:r>
+              <a:rPr lang="en-US" sz="2400" dirty="0"/>
+              <a:t>Baseline </a:t>
+            </a:r>
+          </a:p>
+        </p:txBody>
+      </p:sp>
+      <p:sp>
+        <p:nvSpPr>
+          <p:cNvPr id="5" name="TextBox 4">
+            <a:extLst>
+              <a:ext uri="{FF2B5EF4-FFF2-40B4-BE49-F238E27FC236}">
+                <a16:creationId xmlns:a16="http://schemas.microsoft.com/office/drawing/2014/main" id="{019F466E-7D3A-0244-927F-1D0D35E3E2C7}"/>
+              </a:ext>
+            </a:extLst>
+          </p:cNvPr>
+          <p:cNvSpPr txBox="1"/>
+          <p:nvPr/>
+        </p:nvSpPr>
+        <p:spPr>
+          <a:xfrm>
+            <a:off x="8009937" y="1430928"/>
+            <a:ext cx="1799275" cy="461665"/>
+          </a:xfrm>
+          <a:prstGeom prst="rect">
+            <a:avLst/>
+          </a:prstGeom>
+          <a:solidFill>
+            <a:schemeClr val="bg1"/>
+          </a:solidFill>
+          <a:ln w="19050">
+            <a:solidFill>
+              <a:schemeClr val="tx1"/>
+            </a:solidFill>
+          </a:ln>
+        </p:spPr>
+        <p:txBody>
+          <a:bodyPr wrap="none" rtlCol="0">
+            <a:spAutoFit/>
+          </a:bodyPr>
+          <a:lstStyle/>
+          <a:p>
+            <a:pPr algn="ctr"/>
+            <a:r>
+              <a:rPr lang="en-US" sz="2400" dirty="0"/>
+              <a:t>Intervention </a:t>
+            </a:r>
+          </a:p>
+        </p:txBody>
+      </p:sp>
+      <p:sp>
+        <p:nvSpPr>
+          <p:cNvPr id="6" name="Oval 5">
+            <a:extLst>
+              <a:ext uri="{FF2B5EF4-FFF2-40B4-BE49-F238E27FC236}">
+                <a16:creationId xmlns:a16="http://schemas.microsoft.com/office/drawing/2014/main" id="{DC60DDFB-0709-E343-BE7F-5F4D7B223C92}"/>
+              </a:ext>
+            </a:extLst>
+          </p:cNvPr>
+          <p:cNvSpPr/>
+          <p:nvPr/>
+        </p:nvSpPr>
+        <p:spPr>
+          <a:xfrm>
+            <a:off x="3473678" y="6259363"/>
+            <a:ext cx="534986" cy="476250"/>
+          </a:xfrm>
+          <a:prstGeom prst="ellipse">
+            <a:avLst/>
+          </a:prstGeom>
+          <a:solidFill>
+            <a:srgbClr val="FF0000"/>
+          </a:solidFill>
+          <a:ln>
+            <a:noFill/>
+          </a:ln>
+        </p:spPr>
+        <p:style>
+          <a:lnRef idx="2">
+            <a:schemeClr val="accent1">
+              <a:shade val="50000"/>
+            </a:schemeClr>
+          </a:lnRef>
+          <a:fillRef idx="1">
+            <a:schemeClr val="accent1"/>
+          </a:fillRef>
+          <a:effectRef idx="0">
+            <a:schemeClr val="accent1"/>
+          </a:effectRef>
+          <a:fontRef idx="minor">
+            <a:schemeClr val="lt1"/>
+          </a:fontRef>
+        </p:style>
+        <p:txBody>
+          <a:bodyPr rtlCol="0" anchor="ctr"/>
+          <a:lstStyle/>
+          <a:p>
+            <a:pPr algn="ctr"/>
+            <a:endParaRPr lang="en-US"/>
+          </a:p>
+        </p:txBody>
+      </p:sp>
+      <p:cxnSp>
+        <p:nvCxnSpPr>
+          <p:cNvPr id="7" name="Straight Connector 6">
+            <a:extLst>
+              <a:ext uri="{FF2B5EF4-FFF2-40B4-BE49-F238E27FC236}">
+                <a16:creationId xmlns:a16="http://schemas.microsoft.com/office/drawing/2014/main" id="{882C945E-DDB8-614D-B4AA-4B01E3677F21}"/>
+              </a:ext>
+            </a:extLst>
+          </p:cNvPr>
+          <p:cNvCxnSpPr/>
+          <p:nvPr/>
+        </p:nvCxnSpPr>
+        <p:spPr>
+          <a:xfrm>
+            <a:off x="4008664" y="6497488"/>
+            <a:ext cx="6364290" cy="0"/>
+          </a:xfrm>
+          <a:prstGeom prst="line">
+            <a:avLst/>
+          </a:prstGeom>
+          <a:ln w="63500">
+            <a:solidFill>
+              <a:srgbClr val="FF0000"/>
+            </a:solidFill>
+          </a:ln>
+        </p:spPr>
+        <p:style>
+          <a:lnRef idx="1">
+            <a:schemeClr val="accent1"/>
+          </a:lnRef>
+          <a:fillRef idx="0">
+            <a:schemeClr val="accent1"/>
+          </a:fillRef>
+          <a:effectRef idx="0">
+            <a:schemeClr val="accent1"/>
+          </a:effectRef>
+          <a:fontRef idx="minor">
+            <a:schemeClr val="tx1"/>
+          </a:fontRef>
+        </p:style>
+      </p:cxnSp>
+      <p:sp>
+        <p:nvSpPr>
+          <p:cNvPr id="8" name="Google Shape;209;p27">
+            <a:extLst>
+              <a:ext uri="{FF2B5EF4-FFF2-40B4-BE49-F238E27FC236}">
+                <a16:creationId xmlns:a16="http://schemas.microsoft.com/office/drawing/2014/main" id="{91E1AF84-D90B-3945-B92A-6C8BFB13D585}"/>
+              </a:ext>
+            </a:extLst>
+          </p:cNvPr>
+          <p:cNvSpPr txBox="1"/>
+          <p:nvPr/>
+        </p:nvSpPr>
+        <p:spPr>
+          <a:xfrm>
+            <a:off x="8763000" y="8058152"/>
+            <a:ext cx="1868478" cy="914397"/>
+          </a:xfrm>
+          <a:prstGeom prst="rect">
+            <a:avLst/>
+          </a:prstGeom>
+          <a:noFill/>
+          <a:ln w="9525" cap="flat" cmpd="sng">
+            <a:solidFill>
+              <a:srgbClr val="000000"/>
+            </a:solidFill>
+            <a:prstDash val="solid"/>
+            <a:round/>
+            <a:headEnd type="none" w="sm" len="sm"/>
+            <a:tailEnd type="none" w="sm" len="sm"/>
+          </a:ln>
+        </p:spPr>
+        <p:txBody>
+          <a:bodyPr spcFirstLastPara="1" wrap="square" lIns="91425" tIns="91425" rIns="91425" bIns="91425" anchor="t" anchorCtr="0">
+            <a:noAutofit/>
+          </a:bodyPr>
+          <a:lstStyle/>
+          <a:p>
+            <a:pPr marL="0" lvl="0" indent="0" algn="ctr" rtl="0">
+              <a:spcBef>
+                <a:spcPts val="0"/>
+              </a:spcBef>
+              <a:spcAft>
+                <a:spcPts val="0"/>
+              </a:spcAft>
+              <a:buNone/>
+            </a:pPr>
+            <a:r>
+              <a:rPr lang="en" sz="1600" dirty="0">
+                <a:latin typeface="Lato"/>
+                <a:ea typeface="Lato"/>
+                <a:cs typeface="Lato"/>
+                <a:sym typeface="Lato"/>
+              </a:rPr>
+              <a:t>Above line = 3</a:t>
+            </a:r>
+            <a:endParaRPr sz="1600" dirty="0">
+              <a:latin typeface="Lato"/>
+              <a:ea typeface="Lato"/>
+              <a:cs typeface="Lato"/>
+              <a:sym typeface="Lato"/>
+            </a:endParaRPr>
+          </a:p>
+          <a:p>
+            <a:pPr marL="0" lvl="0" indent="0" algn="ctr" rtl="0">
+              <a:spcBef>
+                <a:spcPts val="0"/>
+              </a:spcBef>
+              <a:spcAft>
+                <a:spcPts val="0"/>
+              </a:spcAft>
+              <a:buNone/>
+            </a:pPr>
+            <a:r>
+              <a:rPr lang="en" sz="1600" dirty="0">
+                <a:latin typeface="Lato"/>
+                <a:ea typeface="Lato"/>
+                <a:cs typeface="Lato"/>
+                <a:sym typeface="Lato"/>
+              </a:rPr>
+              <a:t>Phase N = 3</a:t>
+            </a:r>
+            <a:endParaRPr sz="1600" dirty="0">
+              <a:latin typeface="Lato"/>
+              <a:ea typeface="Lato"/>
+              <a:cs typeface="Lato"/>
+              <a:sym typeface="Lato"/>
+            </a:endParaRPr>
+          </a:p>
+          <a:p>
+            <a:pPr marL="0" lvl="0" indent="0" algn="ctr" rtl="0">
+              <a:spcBef>
+                <a:spcPts val="0"/>
+              </a:spcBef>
+              <a:spcAft>
+                <a:spcPts val="0"/>
+              </a:spcAft>
+              <a:buNone/>
+            </a:pPr>
+            <a:r>
+              <a:rPr lang="en" sz="1600" dirty="0">
+                <a:latin typeface="Lato"/>
+                <a:ea typeface="Lato"/>
+                <a:cs typeface="Lato"/>
+                <a:sym typeface="Lato"/>
+              </a:rPr>
+              <a:t>PND= 3/3 = 1</a:t>
+            </a:r>
+            <a:endParaRPr sz="1600" dirty="0">
+              <a:latin typeface="Lato"/>
+              <a:ea typeface="Lato"/>
+              <a:cs typeface="Lato"/>
+              <a:sym typeface="Lato"/>
+            </a:endParaRPr>
+          </a:p>
+        </p:txBody>
+      </p:sp>
+      <p:sp>
+        <p:nvSpPr>
+          <p:cNvPr id="9" name="TextBox 8">
+            <a:extLst>
+              <a:ext uri="{FF2B5EF4-FFF2-40B4-BE49-F238E27FC236}">
+                <a16:creationId xmlns:a16="http://schemas.microsoft.com/office/drawing/2014/main" id="{0FDCE21E-1619-F04F-89DC-22C811241097}"/>
+              </a:ext>
+            </a:extLst>
+          </p:cNvPr>
+          <p:cNvSpPr txBox="1"/>
+          <p:nvPr/>
+        </p:nvSpPr>
+        <p:spPr>
+          <a:xfrm>
+            <a:off x="9399721" y="7665304"/>
+            <a:ext cx="595035" cy="369332"/>
+          </a:xfrm>
+          <a:prstGeom prst="rect">
+            <a:avLst/>
+          </a:prstGeom>
+          <a:noFill/>
+        </p:spPr>
+        <p:txBody>
+          <a:bodyPr wrap="none" rtlCol="0">
+            <a:spAutoFit/>
+          </a:bodyPr>
+          <a:lstStyle/>
+          <a:p>
+            <a:r>
+              <a:rPr lang="en-US" dirty="0"/>
+              <a:t>PND</a:t>
+            </a:r>
+          </a:p>
+        </p:txBody>
+      </p:sp>
+      <p:cxnSp>
+        <p:nvCxnSpPr>
+          <p:cNvPr id="10" name="Straight Connector 9">
+            <a:extLst>
+              <a:ext uri="{FF2B5EF4-FFF2-40B4-BE49-F238E27FC236}">
+                <a16:creationId xmlns:a16="http://schemas.microsoft.com/office/drawing/2014/main" id="{8EBA6B2B-0CD3-EC4F-A5E4-CAFA7E1E0854}"/>
+              </a:ext>
+            </a:extLst>
+          </p:cNvPr>
+          <p:cNvCxnSpPr>
+            <a:cxnSpLocks/>
+          </p:cNvCxnSpPr>
+          <p:nvPr/>
+        </p:nvCxnSpPr>
+        <p:spPr>
+          <a:xfrm>
+            <a:off x="6944833" y="1167993"/>
+            <a:ext cx="0" cy="8932937"/>
+          </a:xfrm>
+          <a:prstGeom prst="line">
+            <a:avLst/>
+          </a:prstGeom>
+          <a:ln w="25400">
+            <a:solidFill>
+              <a:schemeClr val="tx1"/>
+            </a:solidFill>
+            <a:prstDash val="dash"/>
+          </a:ln>
+        </p:spPr>
+        <p:style>
+          <a:lnRef idx="1">
+            <a:schemeClr val="accent1"/>
+          </a:lnRef>
+          <a:fillRef idx="0">
+            <a:schemeClr val="accent1"/>
+          </a:fillRef>
+          <a:effectRef idx="0">
+            <a:schemeClr val="accent1"/>
+          </a:effectRef>
+          <a:fontRef idx="minor">
+            <a:schemeClr val="tx1"/>
+          </a:fontRef>
+        </p:style>
+      </p:cxnSp>
+    </p:spTree>
+    <p:extLst>
+      <p:ext uri="{BB962C8B-B14F-4D97-AF65-F5344CB8AC3E}">
+        <p14:creationId xmlns:p14="http://schemas.microsoft.com/office/powerpoint/2010/main" val="778061377"/>
+      </p:ext>
+    </p:extLst>
+  </p:cSld>
+  <p:clrMapOvr>
+    <a:masterClrMapping/>
+  </p:clrMapOvr>
+</p:sld>
+</file>
+
+<file path=ppt/slides/slide12.xml><?xml version="1.0" encoding="utf-8"?>
+<p:sld xmlns:a="http://schemas.openxmlformats.org/drawingml/2006/main" xmlns:r="http://schemas.openxmlformats.org/officeDocument/2006/relationships" xmlns:p="http://schemas.openxmlformats.org/presentationml/2006/main">
+  <p:cSld>
+    <p:spTree>
+      <p:nvGrpSpPr>
+        <p:cNvPr id="1" name=""/>
+        <p:cNvGrpSpPr/>
+        <p:nvPr/>
+      </p:nvGrpSpPr>
+      <p:grpSpPr>
+        <a:xfrm>
+          <a:off x="0" y="0"/>
+          <a:ext cx="0" cy="0"/>
+          <a:chOff x="0" y="0"/>
+          <a:chExt cx="0" cy="0"/>
+        </a:xfrm>
+      </p:grpSpPr>
+      <p:pic>
+        <p:nvPicPr>
+          <p:cNvPr id="2" name="Picture 1">
+            <a:extLst>
+              <a:ext uri="{FF2B5EF4-FFF2-40B4-BE49-F238E27FC236}">
+                <a16:creationId xmlns:a16="http://schemas.microsoft.com/office/drawing/2014/main" id="{DFCC8341-6919-0B44-9C3A-0BF76ABADCE6}"/>
+              </a:ext>
+            </a:extLst>
+          </p:cNvPr>
+          <p:cNvPicPr>
+            <a:picLocks noChangeAspect="1"/>
+          </p:cNvPicPr>
+          <p:nvPr/>
+        </p:nvPicPr>
+        <p:blipFill>
+          <a:blip r:embed="rId2"/>
+          <a:stretch>
+            <a:fillRect/>
+          </a:stretch>
+        </p:blipFill>
+        <p:spPr>
+          <a:xfrm>
+            <a:off x="1076638" y="1075050"/>
+            <a:ext cx="10038723" cy="10038723"/>
+          </a:xfrm>
+          <a:prstGeom prst="rect">
+            <a:avLst/>
+          </a:prstGeom>
+        </p:spPr>
+      </p:pic>
+      <p:sp>
+        <p:nvSpPr>
+          <p:cNvPr id="3" name="TextBox 2">
+            <a:extLst>
+              <a:ext uri="{FF2B5EF4-FFF2-40B4-BE49-F238E27FC236}">
+                <a16:creationId xmlns:a16="http://schemas.microsoft.com/office/drawing/2014/main" id="{9482BD74-4E62-1047-81D9-8BAD67D72136}"/>
+              </a:ext>
+            </a:extLst>
+          </p:cNvPr>
+          <p:cNvSpPr txBox="1"/>
+          <p:nvPr/>
+        </p:nvSpPr>
+        <p:spPr>
+          <a:xfrm>
+            <a:off x="4008664" y="1430928"/>
+            <a:ext cx="1298753" cy="461665"/>
+          </a:xfrm>
+          <a:prstGeom prst="rect">
+            <a:avLst/>
+          </a:prstGeom>
+          <a:solidFill>
+            <a:schemeClr val="bg1"/>
+          </a:solidFill>
+          <a:ln w="19050">
+            <a:solidFill>
+              <a:schemeClr val="tx1"/>
+            </a:solidFill>
+          </a:ln>
+        </p:spPr>
+        <p:txBody>
+          <a:bodyPr wrap="none" rtlCol="0">
+            <a:spAutoFit/>
+          </a:bodyPr>
+          <a:lstStyle/>
+          <a:p>
+            <a:pPr algn="ctr"/>
+            <a:r>
+              <a:rPr lang="en-US" sz="2400" dirty="0"/>
+              <a:t>Baseline </a:t>
+            </a:r>
+          </a:p>
+        </p:txBody>
+      </p:sp>
+      <p:sp>
+        <p:nvSpPr>
+          <p:cNvPr id="4" name="TextBox 3">
+            <a:extLst>
+              <a:ext uri="{FF2B5EF4-FFF2-40B4-BE49-F238E27FC236}">
+                <a16:creationId xmlns:a16="http://schemas.microsoft.com/office/drawing/2014/main" id="{EDA20852-0AE1-6642-A55E-1A34B6F1EE9B}"/>
+              </a:ext>
+            </a:extLst>
+          </p:cNvPr>
+          <p:cNvSpPr txBox="1"/>
+          <p:nvPr/>
+        </p:nvSpPr>
+        <p:spPr>
+          <a:xfrm>
+            <a:off x="8009937" y="1430928"/>
+            <a:ext cx="1799275" cy="461665"/>
+          </a:xfrm>
+          <a:prstGeom prst="rect">
+            <a:avLst/>
+          </a:prstGeom>
+          <a:solidFill>
+            <a:schemeClr val="bg1"/>
+          </a:solidFill>
+          <a:ln w="19050">
+            <a:solidFill>
+              <a:schemeClr val="tx1"/>
+            </a:solidFill>
+          </a:ln>
+        </p:spPr>
+        <p:txBody>
+          <a:bodyPr wrap="none" rtlCol="0">
+            <a:spAutoFit/>
+          </a:bodyPr>
+          <a:lstStyle/>
+          <a:p>
+            <a:pPr algn="ctr"/>
+            <a:r>
+              <a:rPr lang="en-US" sz="2400" dirty="0"/>
+              <a:t>Intervention </a:t>
+            </a:r>
+          </a:p>
+        </p:txBody>
+      </p:sp>
+      <p:sp>
+        <p:nvSpPr>
+          <p:cNvPr id="5" name="Oval 4">
+            <a:extLst>
+              <a:ext uri="{FF2B5EF4-FFF2-40B4-BE49-F238E27FC236}">
+                <a16:creationId xmlns:a16="http://schemas.microsoft.com/office/drawing/2014/main" id="{D4AEE7A7-88EE-674C-AD24-9D87C02F9889}"/>
+              </a:ext>
+            </a:extLst>
+          </p:cNvPr>
+          <p:cNvSpPr/>
+          <p:nvPr/>
+        </p:nvSpPr>
+        <p:spPr>
+          <a:xfrm>
+            <a:off x="3732202" y="3218452"/>
+            <a:ext cx="534986" cy="476250"/>
+          </a:xfrm>
+          <a:prstGeom prst="ellipse">
+            <a:avLst/>
+          </a:prstGeom>
+          <a:solidFill>
+            <a:srgbClr val="FF0000"/>
+          </a:solidFill>
+          <a:ln>
+            <a:noFill/>
+          </a:ln>
+        </p:spPr>
+        <p:style>
+          <a:lnRef idx="2">
+            <a:schemeClr val="accent1">
+              <a:shade val="50000"/>
+            </a:schemeClr>
+          </a:lnRef>
+          <a:fillRef idx="1">
+            <a:schemeClr val="accent1"/>
+          </a:fillRef>
+          <a:effectRef idx="0">
+            <a:schemeClr val="accent1"/>
+          </a:effectRef>
+          <a:fontRef idx="minor">
+            <a:schemeClr val="lt1"/>
+          </a:fontRef>
+        </p:style>
+        <p:txBody>
+          <a:bodyPr rtlCol="0" anchor="ctr"/>
+          <a:lstStyle/>
+          <a:p>
+            <a:pPr algn="ctr"/>
+            <a:endParaRPr lang="en-US"/>
+          </a:p>
+        </p:txBody>
+      </p:sp>
+      <p:cxnSp>
+        <p:nvCxnSpPr>
+          <p:cNvPr id="6" name="Straight Connector 5">
+            <a:extLst>
+              <a:ext uri="{FF2B5EF4-FFF2-40B4-BE49-F238E27FC236}">
+                <a16:creationId xmlns:a16="http://schemas.microsoft.com/office/drawing/2014/main" id="{8994E967-C118-4447-9D81-D7BE8884751E}"/>
+              </a:ext>
+            </a:extLst>
+          </p:cNvPr>
+          <p:cNvCxnSpPr/>
+          <p:nvPr/>
+        </p:nvCxnSpPr>
+        <p:spPr>
+          <a:xfrm>
+            <a:off x="4267188" y="3456577"/>
+            <a:ext cx="6364290" cy="0"/>
+          </a:xfrm>
+          <a:prstGeom prst="line">
+            <a:avLst/>
+          </a:prstGeom>
+          <a:ln w="63500">
+            <a:solidFill>
+              <a:srgbClr val="FF0000"/>
+            </a:solidFill>
+          </a:ln>
+        </p:spPr>
+        <p:style>
+          <a:lnRef idx="1">
+            <a:schemeClr val="accent1"/>
+          </a:lnRef>
+          <a:fillRef idx="0">
+            <a:schemeClr val="accent1"/>
+          </a:fillRef>
+          <a:effectRef idx="0">
+            <a:schemeClr val="accent1"/>
+          </a:effectRef>
+          <a:fontRef idx="minor">
+            <a:schemeClr val="tx1"/>
+          </a:fontRef>
+        </p:style>
+      </p:cxnSp>
+      <p:sp>
+        <p:nvSpPr>
+          <p:cNvPr id="7" name="Google Shape;209;p27">
+            <a:extLst>
+              <a:ext uri="{FF2B5EF4-FFF2-40B4-BE49-F238E27FC236}">
+                <a16:creationId xmlns:a16="http://schemas.microsoft.com/office/drawing/2014/main" id="{AD81EFF6-585E-3344-AF95-9DBBBC185ABC}"/>
+              </a:ext>
+            </a:extLst>
+          </p:cNvPr>
+          <p:cNvSpPr txBox="1"/>
+          <p:nvPr/>
+        </p:nvSpPr>
+        <p:spPr>
+          <a:xfrm>
+            <a:off x="8763000" y="8058152"/>
+            <a:ext cx="1868478" cy="914397"/>
+          </a:xfrm>
+          <a:prstGeom prst="rect">
+            <a:avLst/>
+          </a:prstGeom>
+          <a:noFill/>
+          <a:ln w="9525" cap="flat" cmpd="sng">
+            <a:solidFill>
+              <a:srgbClr val="000000"/>
+            </a:solidFill>
+            <a:prstDash val="solid"/>
+            <a:round/>
+            <a:headEnd type="none" w="sm" len="sm"/>
+            <a:tailEnd type="none" w="sm" len="sm"/>
+          </a:ln>
+        </p:spPr>
+        <p:txBody>
+          <a:bodyPr spcFirstLastPara="1" wrap="square" lIns="91425" tIns="91425" rIns="91425" bIns="91425" anchor="t" anchorCtr="0">
+            <a:noAutofit/>
+          </a:bodyPr>
+          <a:lstStyle/>
+          <a:p>
+            <a:pPr marL="0" lvl="0" indent="0" algn="ctr" rtl="0">
+              <a:spcBef>
+                <a:spcPts val="0"/>
+              </a:spcBef>
+              <a:spcAft>
+                <a:spcPts val="0"/>
+              </a:spcAft>
+              <a:buNone/>
+            </a:pPr>
+            <a:r>
+              <a:rPr lang="en" sz="1600" dirty="0">
+                <a:latin typeface="Lato"/>
+                <a:ea typeface="Lato"/>
+                <a:cs typeface="Lato"/>
+                <a:sym typeface="Lato"/>
+              </a:rPr>
+              <a:t>Above line = 3</a:t>
+            </a:r>
+            <a:endParaRPr sz="1600" dirty="0">
+              <a:latin typeface="Lato"/>
+              <a:ea typeface="Lato"/>
+              <a:cs typeface="Lato"/>
+              <a:sym typeface="Lato"/>
+            </a:endParaRPr>
+          </a:p>
+          <a:p>
+            <a:pPr marL="0" lvl="0" indent="0" algn="ctr" rtl="0">
+              <a:spcBef>
+                <a:spcPts val="0"/>
+              </a:spcBef>
+              <a:spcAft>
+                <a:spcPts val="0"/>
+              </a:spcAft>
+              <a:buNone/>
+            </a:pPr>
+            <a:r>
+              <a:rPr lang="en" sz="1600" dirty="0">
+                <a:latin typeface="Lato"/>
+                <a:ea typeface="Lato"/>
+                <a:cs typeface="Lato"/>
+                <a:sym typeface="Lato"/>
+              </a:rPr>
+              <a:t>Phase N = 3</a:t>
+            </a:r>
+            <a:endParaRPr sz="1600" dirty="0">
+              <a:latin typeface="Lato"/>
+              <a:ea typeface="Lato"/>
+              <a:cs typeface="Lato"/>
+              <a:sym typeface="Lato"/>
+            </a:endParaRPr>
+          </a:p>
+          <a:p>
+            <a:pPr marL="0" lvl="0" indent="0" algn="ctr" rtl="0">
+              <a:spcBef>
+                <a:spcPts val="0"/>
+              </a:spcBef>
+              <a:spcAft>
+                <a:spcPts val="0"/>
+              </a:spcAft>
+              <a:buNone/>
+            </a:pPr>
+            <a:r>
+              <a:rPr lang="en" sz="1600" dirty="0">
+                <a:latin typeface="Lato"/>
+                <a:ea typeface="Lato"/>
+                <a:cs typeface="Lato"/>
+                <a:sym typeface="Lato"/>
+              </a:rPr>
+              <a:t>PND= 3/3 = 1</a:t>
+            </a:r>
+            <a:endParaRPr sz="1600" dirty="0">
+              <a:latin typeface="Lato"/>
+              <a:ea typeface="Lato"/>
+              <a:cs typeface="Lato"/>
+              <a:sym typeface="Lato"/>
+            </a:endParaRPr>
+          </a:p>
+        </p:txBody>
+      </p:sp>
+      <p:sp>
+        <p:nvSpPr>
+          <p:cNvPr id="8" name="TextBox 7">
+            <a:extLst>
+              <a:ext uri="{FF2B5EF4-FFF2-40B4-BE49-F238E27FC236}">
+                <a16:creationId xmlns:a16="http://schemas.microsoft.com/office/drawing/2014/main" id="{54105301-63D1-4049-8A3E-D81B4574C231}"/>
+              </a:ext>
+            </a:extLst>
+          </p:cNvPr>
+          <p:cNvSpPr txBox="1"/>
+          <p:nvPr/>
+        </p:nvSpPr>
+        <p:spPr>
+          <a:xfrm>
+            <a:off x="9399721" y="7665304"/>
+            <a:ext cx="595035" cy="369332"/>
+          </a:xfrm>
+          <a:prstGeom prst="rect">
+            <a:avLst/>
+          </a:prstGeom>
+          <a:noFill/>
+        </p:spPr>
+        <p:txBody>
+          <a:bodyPr wrap="none" rtlCol="0">
+            <a:spAutoFit/>
+          </a:bodyPr>
+          <a:lstStyle/>
+          <a:p>
+            <a:r>
+              <a:rPr lang="en-US" dirty="0"/>
+              <a:t>PND</a:t>
+            </a:r>
+          </a:p>
+        </p:txBody>
+      </p:sp>
+      <p:cxnSp>
+        <p:nvCxnSpPr>
+          <p:cNvPr id="9" name="Straight Connector 8">
+            <a:extLst>
+              <a:ext uri="{FF2B5EF4-FFF2-40B4-BE49-F238E27FC236}">
+                <a16:creationId xmlns:a16="http://schemas.microsoft.com/office/drawing/2014/main" id="{6CBC2C18-A680-F541-9E2C-E1EBB23B17D4}"/>
+              </a:ext>
+            </a:extLst>
+          </p:cNvPr>
+          <p:cNvCxnSpPr>
+            <a:cxnSpLocks/>
+          </p:cNvCxnSpPr>
+          <p:nvPr/>
+        </p:nvCxnSpPr>
+        <p:spPr>
+          <a:xfrm>
+            <a:off x="6944833" y="1167993"/>
+            <a:ext cx="0" cy="8996733"/>
+          </a:xfrm>
+          <a:prstGeom prst="line">
+            <a:avLst/>
+          </a:prstGeom>
+          <a:ln w="25400">
+            <a:solidFill>
+              <a:schemeClr val="tx1"/>
+            </a:solidFill>
+            <a:prstDash val="dash"/>
+          </a:ln>
+        </p:spPr>
+        <p:style>
+          <a:lnRef idx="1">
+            <a:schemeClr val="accent1"/>
+          </a:lnRef>
+          <a:fillRef idx="0">
+            <a:schemeClr val="accent1"/>
+          </a:fillRef>
+          <a:effectRef idx="0">
+            <a:schemeClr val="accent1"/>
+          </a:effectRef>
+          <a:fontRef idx="minor">
+            <a:schemeClr val="tx1"/>
+          </a:fontRef>
+        </p:style>
+      </p:cxnSp>
+      <p:sp>
+        <p:nvSpPr>
+          <p:cNvPr id="10" name="TextBox 9">
+            <a:extLst>
+              <a:ext uri="{FF2B5EF4-FFF2-40B4-BE49-F238E27FC236}">
+                <a16:creationId xmlns:a16="http://schemas.microsoft.com/office/drawing/2014/main" id="{8A2FF58B-4213-A040-9E3A-8D80700A3E75}"/>
+              </a:ext>
+            </a:extLst>
+          </p:cNvPr>
+          <p:cNvSpPr txBox="1"/>
+          <p:nvPr/>
+        </p:nvSpPr>
+        <p:spPr>
+          <a:xfrm>
+            <a:off x="9172631" y="4931883"/>
+            <a:ext cx="822276" cy="461665"/>
+          </a:xfrm>
+          <a:prstGeom prst="rect">
+            <a:avLst/>
+          </a:prstGeom>
+          <a:solidFill>
+            <a:schemeClr val="bg1"/>
+          </a:solidFill>
+          <a:ln w="19050">
+            <a:solidFill>
+              <a:schemeClr val="tx1"/>
+            </a:solidFill>
+          </a:ln>
+        </p:spPr>
+        <p:txBody>
+          <a:bodyPr wrap="none" rtlCol="0">
+            <a:spAutoFit/>
+          </a:bodyPr>
+          <a:lstStyle/>
+          <a:p>
+            <a:pPr algn="ctr"/>
+            <a:r>
+              <a:rPr lang="en-US" sz="2400" dirty="0"/>
+              <a:t>SAJE </a:t>
+            </a:r>
+          </a:p>
+        </p:txBody>
+      </p:sp>
+    </p:spTree>
+    <p:extLst>
+      <p:ext uri="{BB962C8B-B14F-4D97-AF65-F5344CB8AC3E}">
+        <p14:creationId xmlns:p14="http://schemas.microsoft.com/office/powerpoint/2010/main" val="3546070944"/>
+      </p:ext>
+    </p:extLst>
+  </p:cSld>
+  <p:clrMapOvr>
+    <a:masterClrMapping/>
+  </p:clrMapOvr>
+</p:sld>
+</file>
+
+<file path=ppt/slides/slide13.xml><?xml version="1.0" encoding="utf-8"?>
+<p:sld xmlns:a="http://schemas.openxmlformats.org/drawingml/2006/main" xmlns:r="http://schemas.openxmlformats.org/officeDocument/2006/relationships" xmlns:p="http://schemas.openxmlformats.org/presentationml/2006/main">
+  <p:cSld>
+    <p:spTree>
+      <p:nvGrpSpPr>
+        <p:cNvPr id="1" name=""/>
+        <p:cNvGrpSpPr/>
+        <p:nvPr/>
+      </p:nvGrpSpPr>
+      <p:grpSpPr>
+        <a:xfrm>
+          <a:off x="0" y="0"/>
+          <a:ext cx="0" cy="0"/>
+          <a:chOff x="0" y="0"/>
+          <a:chExt cx="0" cy="0"/>
+        </a:xfrm>
+      </p:grpSpPr>
+      <p:pic>
+        <p:nvPicPr>
+          <p:cNvPr id="2" name="Picture 1">
+            <a:extLst>
+              <a:ext uri="{FF2B5EF4-FFF2-40B4-BE49-F238E27FC236}">
+                <a16:creationId xmlns:a16="http://schemas.microsoft.com/office/drawing/2014/main" id="{2A438FA7-2130-D849-9185-8D6D79A7535F}"/>
+              </a:ext>
+            </a:extLst>
+          </p:cNvPr>
+          <p:cNvPicPr>
+            <a:picLocks noChangeAspect="1"/>
+          </p:cNvPicPr>
+          <p:nvPr/>
+        </p:nvPicPr>
+        <p:blipFill>
+          <a:blip r:embed="rId2"/>
+          <a:stretch>
+            <a:fillRect/>
+          </a:stretch>
+        </p:blipFill>
+        <p:spPr>
+          <a:xfrm>
+            <a:off x="1344040" y="1339702"/>
+            <a:ext cx="9695305" cy="9695305"/>
+          </a:xfrm>
+          <a:prstGeom prst="rect">
+            <a:avLst/>
+          </a:prstGeom>
+        </p:spPr>
+      </p:pic>
+      <p:cxnSp>
+        <p:nvCxnSpPr>
+          <p:cNvPr id="3" name="Straight Connector 2">
+            <a:extLst>
+              <a:ext uri="{FF2B5EF4-FFF2-40B4-BE49-F238E27FC236}">
+                <a16:creationId xmlns:a16="http://schemas.microsoft.com/office/drawing/2014/main" id="{DDAF5D2F-C5EA-8143-BAEB-29E8A20FFA42}"/>
+              </a:ext>
+            </a:extLst>
+          </p:cNvPr>
+          <p:cNvCxnSpPr>
+            <a:cxnSpLocks/>
+          </p:cNvCxnSpPr>
+          <p:nvPr/>
+        </p:nvCxnSpPr>
+        <p:spPr>
+          <a:xfrm>
+            <a:off x="8006316" y="1852319"/>
+            <a:ext cx="0" cy="8291141"/>
+          </a:xfrm>
+          <a:prstGeom prst="line">
+            <a:avLst/>
+          </a:prstGeom>
+          <a:ln w="25400">
+            <a:solidFill>
+              <a:schemeClr val="tx1"/>
+            </a:solidFill>
+            <a:prstDash val="dash"/>
+          </a:ln>
+        </p:spPr>
+        <p:style>
+          <a:lnRef idx="1">
+            <a:schemeClr val="accent1"/>
+          </a:lnRef>
+          <a:fillRef idx="0">
+            <a:schemeClr val="accent1"/>
+          </a:fillRef>
+          <a:effectRef idx="0">
+            <a:schemeClr val="accent1"/>
+          </a:effectRef>
+          <a:fontRef idx="minor">
+            <a:schemeClr val="tx1"/>
+          </a:fontRef>
+        </p:style>
+      </p:cxnSp>
+      <p:sp>
+        <p:nvSpPr>
+          <p:cNvPr id="4" name="TextBox 3">
+            <a:extLst>
+              <a:ext uri="{FF2B5EF4-FFF2-40B4-BE49-F238E27FC236}">
+                <a16:creationId xmlns:a16="http://schemas.microsoft.com/office/drawing/2014/main" id="{099F4F65-9BE1-8543-A480-A1753A3CC246}"/>
+              </a:ext>
+            </a:extLst>
+          </p:cNvPr>
+          <p:cNvSpPr txBox="1"/>
+          <p:nvPr/>
+        </p:nvSpPr>
+        <p:spPr>
+          <a:xfrm>
+            <a:off x="4142004" y="1852319"/>
+            <a:ext cx="1298753" cy="461665"/>
+          </a:xfrm>
+          <a:prstGeom prst="rect">
+            <a:avLst/>
+          </a:prstGeom>
+          <a:solidFill>
+            <a:schemeClr val="bg1"/>
+          </a:solidFill>
+          <a:ln w="19050">
+            <a:solidFill>
+              <a:schemeClr val="tx1"/>
+            </a:solidFill>
+          </a:ln>
+        </p:spPr>
+        <p:txBody>
+          <a:bodyPr wrap="none" rtlCol="0">
+            <a:spAutoFit/>
+          </a:bodyPr>
+          <a:lstStyle/>
+          <a:p>
+            <a:pPr algn="ctr"/>
+            <a:r>
+              <a:rPr lang="en-US" sz="2400" dirty="0"/>
+              <a:t>Baseline </a:t>
+            </a:r>
+          </a:p>
+        </p:txBody>
+      </p:sp>
+      <p:sp>
+        <p:nvSpPr>
+          <p:cNvPr id="5" name="TextBox 4">
+            <a:extLst>
+              <a:ext uri="{FF2B5EF4-FFF2-40B4-BE49-F238E27FC236}">
+                <a16:creationId xmlns:a16="http://schemas.microsoft.com/office/drawing/2014/main" id="{CAF09814-04F2-A343-8A6D-671616CDCCAB}"/>
+              </a:ext>
+            </a:extLst>
+          </p:cNvPr>
+          <p:cNvSpPr txBox="1"/>
+          <p:nvPr/>
+        </p:nvSpPr>
+        <p:spPr>
+          <a:xfrm>
+            <a:off x="8832203" y="1852319"/>
+            <a:ext cx="1799275" cy="461665"/>
+          </a:xfrm>
+          <a:prstGeom prst="rect">
+            <a:avLst/>
+          </a:prstGeom>
+          <a:solidFill>
+            <a:schemeClr val="bg1"/>
+          </a:solidFill>
+          <a:ln w="19050">
+            <a:solidFill>
+              <a:schemeClr val="tx1"/>
+            </a:solidFill>
+          </a:ln>
+        </p:spPr>
+        <p:txBody>
+          <a:bodyPr wrap="none" rtlCol="0">
+            <a:spAutoFit/>
+          </a:bodyPr>
+          <a:lstStyle/>
+          <a:p>
+            <a:pPr algn="ctr"/>
+            <a:r>
+              <a:rPr lang="en-US" sz="2400" dirty="0"/>
+              <a:t>Intervention </a:t>
+            </a:r>
+          </a:p>
+        </p:txBody>
+      </p:sp>
+      <p:sp>
+        <p:nvSpPr>
+          <p:cNvPr id="6" name="TextBox 5">
+            <a:extLst>
+              <a:ext uri="{FF2B5EF4-FFF2-40B4-BE49-F238E27FC236}">
+                <a16:creationId xmlns:a16="http://schemas.microsoft.com/office/drawing/2014/main" id="{9C25172A-4687-3B4B-81C9-FD0614A90E19}"/>
+              </a:ext>
+            </a:extLst>
+          </p:cNvPr>
+          <p:cNvSpPr txBox="1"/>
+          <p:nvPr/>
+        </p:nvSpPr>
+        <p:spPr>
+          <a:xfrm>
+            <a:off x="9598500" y="5608082"/>
+            <a:ext cx="740908" cy="461665"/>
+          </a:xfrm>
+          <a:prstGeom prst="rect">
+            <a:avLst/>
+          </a:prstGeom>
+          <a:solidFill>
+            <a:schemeClr val="bg1"/>
+          </a:solidFill>
+          <a:ln w="19050">
+            <a:solidFill>
+              <a:schemeClr val="tx1"/>
+            </a:solidFill>
+          </a:ln>
+        </p:spPr>
+        <p:txBody>
+          <a:bodyPr wrap="none" rtlCol="0">
+            <a:spAutoFit/>
+          </a:bodyPr>
+          <a:lstStyle/>
+          <a:p>
+            <a:pPr algn="ctr"/>
+            <a:r>
+              <a:rPr lang="en-US" sz="2400" dirty="0"/>
+              <a:t>LELI </a:t>
+            </a:r>
+          </a:p>
+        </p:txBody>
+      </p:sp>
+      <p:sp>
+        <p:nvSpPr>
+          <p:cNvPr id="7" name="Oval 6">
+            <a:extLst>
+              <a:ext uri="{FF2B5EF4-FFF2-40B4-BE49-F238E27FC236}">
+                <a16:creationId xmlns:a16="http://schemas.microsoft.com/office/drawing/2014/main" id="{EBBA0392-F3A7-D448-A1BF-49148300FF1E}"/>
+              </a:ext>
+            </a:extLst>
+          </p:cNvPr>
+          <p:cNvSpPr/>
+          <p:nvPr/>
+        </p:nvSpPr>
+        <p:spPr>
+          <a:xfrm>
+            <a:off x="4407685" y="6601047"/>
+            <a:ext cx="534986" cy="476250"/>
+          </a:xfrm>
+          <a:prstGeom prst="ellipse">
+            <a:avLst/>
+          </a:prstGeom>
+          <a:solidFill>
+            <a:srgbClr val="FF0000"/>
+          </a:solidFill>
+          <a:ln>
+            <a:noFill/>
+          </a:ln>
+        </p:spPr>
+        <p:style>
+          <a:lnRef idx="2">
+            <a:schemeClr val="accent1">
+              <a:shade val="50000"/>
+            </a:schemeClr>
+          </a:lnRef>
+          <a:fillRef idx="1">
+            <a:schemeClr val="accent1"/>
+          </a:fillRef>
+          <a:effectRef idx="0">
+            <a:schemeClr val="accent1"/>
+          </a:effectRef>
+          <a:fontRef idx="minor">
+            <a:schemeClr val="lt1"/>
+          </a:fontRef>
+        </p:style>
+        <p:txBody>
+          <a:bodyPr rtlCol="0" anchor="ctr"/>
+          <a:lstStyle/>
+          <a:p>
+            <a:pPr algn="ctr"/>
+            <a:endParaRPr lang="en-US"/>
+          </a:p>
+        </p:txBody>
+      </p:sp>
+      <p:cxnSp>
+        <p:nvCxnSpPr>
+          <p:cNvPr id="8" name="Straight Connector 7">
+            <a:extLst>
+              <a:ext uri="{FF2B5EF4-FFF2-40B4-BE49-F238E27FC236}">
+                <a16:creationId xmlns:a16="http://schemas.microsoft.com/office/drawing/2014/main" id="{0CF58C0C-2225-234A-B097-CAD6C45E39B5}"/>
+              </a:ext>
+            </a:extLst>
+          </p:cNvPr>
+          <p:cNvCxnSpPr>
+            <a:cxnSpLocks/>
+          </p:cNvCxnSpPr>
+          <p:nvPr/>
+        </p:nvCxnSpPr>
+        <p:spPr>
+          <a:xfrm>
+            <a:off x="4942671" y="6839172"/>
+            <a:ext cx="5813416" cy="0"/>
+          </a:xfrm>
+          <a:prstGeom prst="line">
+            <a:avLst/>
+          </a:prstGeom>
+          <a:ln w="63500">
+            <a:solidFill>
+              <a:srgbClr val="FF0000"/>
+            </a:solidFill>
+          </a:ln>
+        </p:spPr>
+        <p:style>
+          <a:lnRef idx="1">
+            <a:schemeClr val="accent1"/>
+          </a:lnRef>
+          <a:fillRef idx="0">
+            <a:schemeClr val="accent1"/>
+          </a:fillRef>
+          <a:effectRef idx="0">
+            <a:schemeClr val="accent1"/>
+          </a:effectRef>
+          <a:fontRef idx="minor">
+            <a:schemeClr val="tx1"/>
+          </a:fontRef>
+        </p:style>
+      </p:cxnSp>
+      <p:sp>
+        <p:nvSpPr>
+          <p:cNvPr id="9" name="Google Shape;209;p27">
+            <a:extLst>
+              <a:ext uri="{FF2B5EF4-FFF2-40B4-BE49-F238E27FC236}">
+                <a16:creationId xmlns:a16="http://schemas.microsoft.com/office/drawing/2014/main" id="{F2D1C74D-80C2-5C44-BFCC-769E1B4F26CD}"/>
+              </a:ext>
+            </a:extLst>
+          </p:cNvPr>
+          <p:cNvSpPr txBox="1"/>
+          <p:nvPr/>
+        </p:nvSpPr>
+        <p:spPr>
+          <a:xfrm>
+            <a:off x="8763000" y="8058152"/>
+            <a:ext cx="1868478" cy="914397"/>
+          </a:xfrm>
+          <a:prstGeom prst="rect">
+            <a:avLst/>
+          </a:prstGeom>
+          <a:noFill/>
+          <a:ln w="9525" cap="flat" cmpd="sng">
+            <a:solidFill>
+              <a:srgbClr val="000000"/>
+            </a:solidFill>
+            <a:prstDash val="solid"/>
+            <a:round/>
+            <a:headEnd type="none" w="sm" len="sm"/>
+            <a:tailEnd type="none" w="sm" len="sm"/>
+          </a:ln>
+        </p:spPr>
+        <p:txBody>
+          <a:bodyPr spcFirstLastPara="1" wrap="square" lIns="91425" tIns="91425" rIns="91425" bIns="91425" anchor="t" anchorCtr="0">
+            <a:noAutofit/>
+          </a:bodyPr>
+          <a:lstStyle/>
+          <a:p>
+            <a:pPr marL="0" lvl="0" indent="0" algn="ctr" rtl="0">
+              <a:spcBef>
+                <a:spcPts val="0"/>
+              </a:spcBef>
+              <a:spcAft>
+                <a:spcPts val="0"/>
+              </a:spcAft>
+              <a:buNone/>
+            </a:pPr>
+            <a:r>
+              <a:rPr lang="en" sz="1600" dirty="0">
+                <a:latin typeface="Lato"/>
+                <a:ea typeface="Lato"/>
+                <a:cs typeface="Lato"/>
+                <a:sym typeface="Lato"/>
+              </a:rPr>
+              <a:t>Above line = 3</a:t>
+            </a:r>
+            <a:endParaRPr sz="1600" dirty="0">
+              <a:latin typeface="Lato"/>
+              <a:ea typeface="Lato"/>
+              <a:cs typeface="Lato"/>
+              <a:sym typeface="Lato"/>
+            </a:endParaRPr>
+          </a:p>
+          <a:p>
+            <a:pPr marL="0" lvl="0" indent="0" algn="ctr" rtl="0">
+              <a:spcBef>
+                <a:spcPts val="0"/>
+              </a:spcBef>
+              <a:spcAft>
+                <a:spcPts val="0"/>
+              </a:spcAft>
+              <a:buNone/>
+            </a:pPr>
+            <a:r>
+              <a:rPr lang="en" sz="1600" dirty="0">
+                <a:latin typeface="Lato"/>
+                <a:ea typeface="Lato"/>
+                <a:cs typeface="Lato"/>
+                <a:sym typeface="Lato"/>
+              </a:rPr>
+              <a:t>Phase N = 3</a:t>
+            </a:r>
+            <a:endParaRPr sz="1600" dirty="0">
+              <a:latin typeface="Lato"/>
+              <a:ea typeface="Lato"/>
+              <a:cs typeface="Lato"/>
+              <a:sym typeface="Lato"/>
+            </a:endParaRPr>
+          </a:p>
+          <a:p>
+            <a:pPr marL="0" lvl="0" indent="0" algn="ctr" rtl="0">
+              <a:spcBef>
+                <a:spcPts val="0"/>
+              </a:spcBef>
+              <a:spcAft>
+                <a:spcPts val="0"/>
+              </a:spcAft>
+              <a:buNone/>
+            </a:pPr>
+            <a:r>
+              <a:rPr lang="en" sz="1600" dirty="0">
+                <a:latin typeface="Lato"/>
+                <a:ea typeface="Lato"/>
+                <a:cs typeface="Lato"/>
+                <a:sym typeface="Lato"/>
+              </a:rPr>
+              <a:t>PND= 3/3 = 1</a:t>
+            </a:r>
+            <a:endParaRPr sz="1600" dirty="0">
+              <a:latin typeface="Lato"/>
+              <a:ea typeface="Lato"/>
+              <a:cs typeface="Lato"/>
+              <a:sym typeface="Lato"/>
+            </a:endParaRPr>
+          </a:p>
+        </p:txBody>
+      </p:sp>
+      <p:sp>
+        <p:nvSpPr>
+          <p:cNvPr id="10" name="TextBox 9">
+            <a:extLst>
+              <a:ext uri="{FF2B5EF4-FFF2-40B4-BE49-F238E27FC236}">
+                <a16:creationId xmlns:a16="http://schemas.microsoft.com/office/drawing/2014/main" id="{601E65BC-E3BF-B14F-B649-F3AD69057FA0}"/>
+              </a:ext>
+            </a:extLst>
+          </p:cNvPr>
+          <p:cNvSpPr txBox="1"/>
+          <p:nvPr/>
+        </p:nvSpPr>
+        <p:spPr>
+          <a:xfrm>
+            <a:off x="9399721" y="7665304"/>
+            <a:ext cx="595035" cy="369332"/>
+          </a:xfrm>
+          <a:prstGeom prst="rect">
+            <a:avLst/>
+          </a:prstGeom>
+          <a:noFill/>
+        </p:spPr>
+        <p:txBody>
+          <a:bodyPr wrap="none" rtlCol="0">
+            <a:spAutoFit/>
+          </a:bodyPr>
+          <a:lstStyle/>
+          <a:p>
+            <a:r>
+              <a:rPr lang="en-US" dirty="0"/>
+              <a:t>PND</a:t>
+            </a:r>
+          </a:p>
+        </p:txBody>
+      </p:sp>
+    </p:spTree>
+    <p:extLst>
+      <p:ext uri="{BB962C8B-B14F-4D97-AF65-F5344CB8AC3E}">
+        <p14:creationId xmlns:p14="http://schemas.microsoft.com/office/powerpoint/2010/main" val="3853665662"/>
+      </p:ext>
+    </p:extLst>
+  </p:cSld>
+  <p:clrMapOvr>
+    <a:masterClrMapping/>
+  </p:clrMapOvr>
+</p:sld>
+</file>
+
+<file path=ppt/slides/slide14.xml><?xml version="1.0" encoding="utf-8"?>
+<p:sld xmlns:a="http://schemas.openxmlformats.org/drawingml/2006/main" xmlns:r="http://schemas.openxmlformats.org/officeDocument/2006/relationships" xmlns:p="http://schemas.openxmlformats.org/presentationml/2006/main">
+  <p:cSld>
+    <p:spTree>
+      <p:nvGrpSpPr>
+        <p:cNvPr id="1" name=""/>
+        <p:cNvGrpSpPr/>
+        <p:nvPr/>
+      </p:nvGrpSpPr>
+      <p:grpSpPr>
+        <a:xfrm>
+          <a:off x="0" y="0"/>
+          <a:ext cx="0" cy="0"/>
+          <a:chOff x="0" y="0"/>
+          <a:chExt cx="0" cy="0"/>
+        </a:xfrm>
+      </p:grpSpPr>
+      <p:pic>
+        <p:nvPicPr>
+          <p:cNvPr id="2" name="Picture 1">
+            <a:extLst>
+              <a:ext uri="{FF2B5EF4-FFF2-40B4-BE49-F238E27FC236}">
+                <a16:creationId xmlns:a16="http://schemas.microsoft.com/office/drawing/2014/main" id="{0F81E28E-7185-F144-8B7D-F618A76CF943}"/>
+              </a:ext>
+            </a:extLst>
+          </p:cNvPr>
+          <p:cNvPicPr>
+            <a:picLocks noChangeAspect="1"/>
+          </p:cNvPicPr>
+          <p:nvPr/>
+        </p:nvPicPr>
+        <p:blipFill>
+          <a:blip r:embed="rId2"/>
+          <a:stretch>
+            <a:fillRect/>
+          </a:stretch>
+        </p:blipFill>
+        <p:spPr>
+          <a:xfrm>
+            <a:off x="956930" y="1063256"/>
+            <a:ext cx="10290728" cy="10290728"/>
+          </a:xfrm>
+          <a:prstGeom prst="rect">
+            <a:avLst/>
+          </a:prstGeom>
+        </p:spPr>
+      </p:pic>
+      <p:cxnSp>
+        <p:nvCxnSpPr>
+          <p:cNvPr id="3" name="Straight Connector 2">
+            <a:extLst>
+              <a:ext uri="{FF2B5EF4-FFF2-40B4-BE49-F238E27FC236}">
+                <a16:creationId xmlns:a16="http://schemas.microsoft.com/office/drawing/2014/main" id="{C47770EC-7CAF-504F-937D-AB520F14A046}"/>
+              </a:ext>
+            </a:extLst>
+          </p:cNvPr>
+          <p:cNvCxnSpPr>
+            <a:cxnSpLocks/>
+          </p:cNvCxnSpPr>
+          <p:nvPr/>
+        </p:nvCxnSpPr>
+        <p:spPr>
+          <a:xfrm>
+            <a:off x="8006316" y="1852319"/>
+            <a:ext cx="0" cy="8291141"/>
+          </a:xfrm>
+          <a:prstGeom prst="line">
+            <a:avLst/>
+          </a:prstGeom>
+          <a:ln w="25400">
+            <a:solidFill>
+              <a:schemeClr val="tx1"/>
+            </a:solidFill>
+            <a:prstDash val="dash"/>
+          </a:ln>
+        </p:spPr>
+        <p:style>
+          <a:lnRef idx="1">
+            <a:schemeClr val="accent1"/>
+          </a:lnRef>
+          <a:fillRef idx="0">
+            <a:schemeClr val="accent1"/>
+          </a:fillRef>
+          <a:effectRef idx="0">
+            <a:schemeClr val="accent1"/>
+          </a:effectRef>
+          <a:fontRef idx="minor">
+            <a:schemeClr val="tx1"/>
+          </a:fontRef>
+        </p:style>
+      </p:cxnSp>
+      <p:sp>
+        <p:nvSpPr>
+          <p:cNvPr id="4" name="TextBox 3">
+            <a:extLst>
+              <a:ext uri="{FF2B5EF4-FFF2-40B4-BE49-F238E27FC236}">
+                <a16:creationId xmlns:a16="http://schemas.microsoft.com/office/drawing/2014/main" id="{07D285B5-5A86-2F40-9521-3DE6FB2611BD}"/>
+              </a:ext>
+            </a:extLst>
+          </p:cNvPr>
+          <p:cNvSpPr txBox="1"/>
+          <p:nvPr/>
+        </p:nvSpPr>
+        <p:spPr>
+          <a:xfrm>
+            <a:off x="4142004" y="1852319"/>
+            <a:ext cx="1298753" cy="461665"/>
+          </a:xfrm>
+          <a:prstGeom prst="rect">
+            <a:avLst/>
+          </a:prstGeom>
+          <a:solidFill>
+            <a:schemeClr val="bg1"/>
+          </a:solidFill>
+          <a:ln w="19050">
+            <a:solidFill>
+              <a:schemeClr val="tx1"/>
+            </a:solidFill>
+          </a:ln>
+        </p:spPr>
+        <p:txBody>
+          <a:bodyPr wrap="none" rtlCol="0">
+            <a:spAutoFit/>
+          </a:bodyPr>
+          <a:lstStyle/>
+          <a:p>
+            <a:pPr algn="ctr"/>
+            <a:r>
+              <a:rPr lang="en-US" sz="2400" dirty="0"/>
+              <a:t>Baseline </a:t>
+            </a:r>
+          </a:p>
+        </p:txBody>
+      </p:sp>
+      <p:sp>
+        <p:nvSpPr>
+          <p:cNvPr id="5" name="TextBox 4">
+            <a:extLst>
+              <a:ext uri="{FF2B5EF4-FFF2-40B4-BE49-F238E27FC236}">
+                <a16:creationId xmlns:a16="http://schemas.microsoft.com/office/drawing/2014/main" id="{C401F021-2625-B94B-9019-C5DBD5132136}"/>
+              </a:ext>
+            </a:extLst>
+          </p:cNvPr>
+          <p:cNvSpPr txBox="1"/>
+          <p:nvPr/>
+        </p:nvSpPr>
+        <p:spPr>
+          <a:xfrm>
+            <a:off x="8832203" y="1852319"/>
+            <a:ext cx="1799275" cy="461665"/>
+          </a:xfrm>
+          <a:prstGeom prst="rect">
+            <a:avLst/>
+          </a:prstGeom>
+          <a:solidFill>
+            <a:schemeClr val="bg1"/>
+          </a:solidFill>
+          <a:ln w="19050">
+            <a:solidFill>
+              <a:schemeClr val="tx1"/>
+            </a:solidFill>
+          </a:ln>
+        </p:spPr>
+        <p:txBody>
+          <a:bodyPr wrap="none" rtlCol="0">
+            <a:spAutoFit/>
+          </a:bodyPr>
+          <a:lstStyle/>
+          <a:p>
+            <a:pPr algn="ctr"/>
+            <a:r>
+              <a:rPr lang="en-US" sz="2400" dirty="0"/>
+              <a:t>Intervention </a:t>
+            </a:r>
+          </a:p>
+        </p:txBody>
+      </p:sp>
+      <p:sp>
+        <p:nvSpPr>
+          <p:cNvPr id="6" name="TextBox 5">
+            <a:extLst>
+              <a:ext uri="{FF2B5EF4-FFF2-40B4-BE49-F238E27FC236}">
+                <a16:creationId xmlns:a16="http://schemas.microsoft.com/office/drawing/2014/main" id="{0E7235CB-6955-AC4D-A262-A2E12E10D6AF}"/>
+              </a:ext>
+            </a:extLst>
+          </p:cNvPr>
+          <p:cNvSpPr txBox="1"/>
+          <p:nvPr/>
+        </p:nvSpPr>
+        <p:spPr>
+          <a:xfrm>
+            <a:off x="9598500" y="5608082"/>
+            <a:ext cx="740908" cy="461665"/>
+          </a:xfrm>
+          <a:prstGeom prst="rect">
+            <a:avLst/>
+          </a:prstGeom>
+          <a:solidFill>
+            <a:schemeClr val="bg1"/>
+          </a:solidFill>
+          <a:ln w="19050">
+            <a:solidFill>
+              <a:schemeClr val="tx1"/>
+            </a:solidFill>
+          </a:ln>
+        </p:spPr>
+        <p:txBody>
+          <a:bodyPr wrap="none" rtlCol="0">
+            <a:spAutoFit/>
+          </a:bodyPr>
+          <a:lstStyle/>
+          <a:p>
+            <a:pPr algn="ctr"/>
+            <a:r>
+              <a:rPr lang="en-US" sz="2400" dirty="0"/>
+              <a:t>LELI </a:t>
+            </a:r>
+          </a:p>
+        </p:txBody>
+      </p:sp>
+      <p:sp>
+        <p:nvSpPr>
+          <p:cNvPr id="7" name="Oval 6">
+            <a:extLst>
+              <a:ext uri="{FF2B5EF4-FFF2-40B4-BE49-F238E27FC236}">
+                <a16:creationId xmlns:a16="http://schemas.microsoft.com/office/drawing/2014/main" id="{D2283424-D6F6-EC45-A8A9-7C0676C1CAA8}"/>
+              </a:ext>
+            </a:extLst>
+          </p:cNvPr>
+          <p:cNvSpPr/>
+          <p:nvPr/>
+        </p:nvSpPr>
+        <p:spPr>
+          <a:xfrm>
+            <a:off x="4564622" y="4687187"/>
+            <a:ext cx="534986" cy="476250"/>
+          </a:xfrm>
+          <a:prstGeom prst="ellipse">
+            <a:avLst/>
+          </a:prstGeom>
+          <a:solidFill>
+            <a:srgbClr val="FF0000"/>
+          </a:solidFill>
+          <a:ln>
+            <a:noFill/>
+          </a:ln>
+        </p:spPr>
+        <p:style>
+          <a:lnRef idx="2">
+            <a:schemeClr val="accent1">
+              <a:shade val="50000"/>
+            </a:schemeClr>
+          </a:lnRef>
+          <a:fillRef idx="1">
+            <a:schemeClr val="accent1"/>
+          </a:fillRef>
+          <a:effectRef idx="0">
+            <a:schemeClr val="accent1"/>
+          </a:effectRef>
+          <a:fontRef idx="minor">
+            <a:schemeClr val="lt1"/>
+          </a:fontRef>
+        </p:style>
+        <p:txBody>
+          <a:bodyPr rtlCol="0" anchor="ctr"/>
+          <a:lstStyle/>
+          <a:p>
+            <a:pPr algn="ctr"/>
+            <a:endParaRPr lang="en-US"/>
+          </a:p>
+        </p:txBody>
+      </p:sp>
+      <p:cxnSp>
+        <p:nvCxnSpPr>
+          <p:cNvPr id="8" name="Straight Connector 7">
+            <a:extLst>
+              <a:ext uri="{FF2B5EF4-FFF2-40B4-BE49-F238E27FC236}">
+                <a16:creationId xmlns:a16="http://schemas.microsoft.com/office/drawing/2014/main" id="{3A2AE792-5FF6-E74A-AC43-CFFB56400CFB}"/>
+              </a:ext>
+            </a:extLst>
+          </p:cNvPr>
+          <p:cNvCxnSpPr>
+            <a:cxnSpLocks/>
+          </p:cNvCxnSpPr>
+          <p:nvPr/>
+        </p:nvCxnSpPr>
+        <p:spPr>
+          <a:xfrm>
+            <a:off x="5099608" y="4925312"/>
+            <a:ext cx="5813416" cy="0"/>
+          </a:xfrm>
+          <a:prstGeom prst="line">
+            <a:avLst/>
+          </a:prstGeom>
+          <a:ln w="63500">
+            <a:solidFill>
+              <a:srgbClr val="FF0000"/>
+            </a:solidFill>
+          </a:ln>
+        </p:spPr>
+        <p:style>
+          <a:lnRef idx="1">
+            <a:schemeClr val="accent1"/>
+          </a:lnRef>
+          <a:fillRef idx="0">
+            <a:schemeClr val="accent1"/>
+          </a:fillRef>
+          <a:effectRef idx="0">
+            <a:schemeClr val="accent1"/>
+          </a:effectRef>
+          <a:fontRef idx="minor">
+            <a:schemeClr val="tx1"/>
+          </a:fontRef>
+        </p:style>
+      </p:cxnSp>
+      <p:sp>
+        <p:nvSpPr>
+          <p:cNvPr id="9" name="Google Shape;209;p27">
+            <a:extLst>
+              <a:ext uri="{FF2B5EF4-FFF2-40B4-BE49-F238E27FC236}">
+                <a16:creationId xmlns:a16="http://schemas.microsoft.com/office/drawing/2014/main" id="{DEFF866D-005C-6149-AD58-8586EAD5B2DE}"/>
+              </a:ext>
+            </a:extLst>
+          </p:cNvPr>
+          <p:cNvSpPr txBox="1"/>
+          <p:nvPr/>
+        </p:nvSpPr>
+        <p:spPr>
+          <a:xfrm>
+            <a:off x="8763000" y="8058152"/>
+            <a:ext cx="1868478" cy="914397"/>
+          </a:xfrm>
+          <a:prstGeom prst="rect">
+            <a:avLst/>
+          </a:prstGeom>
+          <a:noFill/>
+          <a:ln w="9525" cap="flat" cmpd="sng">
+            <a:solidFill>
+              <a:srgbClr val="000000"/>
+            </a:solidFill>
+            <a:prstDash val="solid"/>
+            <a:round/>
+            <a:headEnd type="none" w="sm" len="sm"/>
+            <a:tailEnd type="none" w="sm" len="sm"/>
+          </a:ln>
+        </p:spPr>
+        <p:txBody>
+          <a:bodyPr spcFirstLastPara="1" wrap="square" lIns="91425" tIns="91425" rIns="91425" bIns="91425" anchor="t" anchorCtr="0">
+            <a:noAutofit/>
+          </a:bodyPr>
+          <a:lstStyle/>
+          <a:p>
+            <a:pPr marL="0" lvl="0" indent="0" algn="ctr" rtl="0">
+              <a:spcBef>
+                <a:spcPts val="0"/>
+              </a:spcBef>
+              <a:spcAft>
+                <a:spcPts val="0"/>
+              </a:spcAft>
+              <a:buNone/>
+            </a:pPr>
+            <a:r>
+              <a:rPr lang="en" sz="1600" dirty="0">
+                <a:latin typeface="Lato"/>
+                <a:ea typeface="Lato"/>
+                <a:cs typeface="Lato"/>
+                <a:sym typeface="Lato"/>
+              </a:rPr>
+              <a:t>Above line = 3</a:t>
+            </a:r>
+            <a:endParaRPr sz="1600" dirty="0">
+              <a:latin typeface="Lato"/>
+              <a:ea typeface="Lato"/>
+              <a:cs typeface="Lato"/>
+              <a:sym typeface="Lato"/>
+            </a:endParaRPr>
+          </a:p>
+          <a:p>
+            <a:pPr marL="0" lvl="0" indent="0" algn="ctr" rtl="0">
+              <a:spcBef>
+                <a:spcPts val="0"/>
+              </a:spcBef>
+              <a:spcAft>
+                <a:spcPts val="0"/>
+              </a:spcAft>
+              <a:buNone/>
+            </a:pPr>
+            <a:r>
+              <a:rPr lang="en" sz="1600" dirty="0">
+                <a:latin typeface="Lato"/>
+                <a:ea typeface="Lato"/>
+                <a:cs typeface="Lato"/>
+                <a:sym typeface="Lato"/>
+              </a:rPr>
+              <a:t>Phase N = 3</a:t>
+            </a:r>
+            <a:endParaRPr sz="1600" dirty="0">
+              <a:latin typeface="Lato"/>
+              <a:ea typeface="Lato"/>
+              <a:cs typeface="Lato"/>
+              <a:sym typeface="Lato"/>
+            </a:endParaRPr>
+          </a:p>
+          <a:p>
+            <a:pPr marL="0" lvl="0" indent="0" algn="ctr" rtl="0">
+              <a:spcBef>
+                <a:spcPts val="0"/>
+              </a:spcBef>
+              <a:spcAft>
+                <a:spcPts val="0"/>
+              </a:spcAft>
+              <a:buNone/>
+            </a:pPr>
+            <a:r>
+              <a:rPr lang="en" sz="1600" dirty="0">
+                <a:latin typeface="Lato"/>
+                <a:ea typeface="Lato"/>
+                <a:cs typeface="Lato"/>
+                <a:sym typeface="Lato"/>
+              </a:rPr>
+              <a:t>PND= 3/3 = 1</a:t>
+            </a:r>
+            <a:endParaRPr sz="1600" dirty="0">
+              <a:latin typeface="Lato"/>
+              <a:ea typeface="Lato"/>
+              <a:cs typeface="Lato"/>
+              <a:sym typeface="Lato"/>
+            </a:endParaRPr>
+          </a:p>
+        </p:txBody>
+      </p:sp>
+      <p:sp>
+        <p:nvSpPr>
+          <p:cNvPr id="10" name="TextBox 9">
+            <a:extLst>
+              <a:ext uri="{FF2B5EF4-FFF2-40B4-BE49-F238E27FC236}">
+                <a16:creationId xmlns:a16="http://schemas.microsoft.com/office/drawing/2014/main" id="{AE005098-DE40-A742-8C00-C0E325D93D3F}"/>
+              </a:ext>
+            </a:extLst>
+          </p:cNvPr>
+          <p:cNvSpPr txBox="1"/>
+          <p:nvPr/>
+        </p:nvSpPr>
+        <p:spPr>
+          <a:xfrm>
+            <a:off x="9399721" y="7665304"/>
+            <a:ext cx="595035" cy="369332"/>
+          </a:xfrm>
+          <a:prstGeom prst="rect">
+            <a:avLst/>
+          </a:prstGeom>
+          <a:noFill/>
+        </p:spPr>
+        <p:txBody>
+          <a:bodyPr wrap="none" rtlCol="0">
+            <a:spAutoFit/>
+          </a:bodyPr>
+          <a:lstStyle/>
+          <a:p>
+            <a:r>
+              <a:rPr lang="en-US" dirty="0"/>
+              <a:t>PND</a:t>
+            </a:r>
+          </a:p>
+        </p:txBody>
+      </p:sp>
+    </p:spTree>
+    <p:extLst>
+      <p:ext uri="{BB962C8B-B14F-4D97-AF65-F5344CB8AC3E}">
+        <p14:creationId xmlns:p14="http://schemas.microsoft.com/office/powerpoint/2010/main" val="2692338548"/>
+      </p:ext>
+    </p:extLst>
+  </p:cSld>
+  <p:clrMapOvr>
+    <a:masterClrMapping/>
+  </p:clrMapOvr>
+</p:sld>
+</file>
+
+<file path=ppt/slides/slide15.xml><?xml version="1.0" encoding="utf-8"?>
+<p:sld xmlns:a="http://schemas.openxmlformats.org/drawingml/2006/main" xmlns:r="http://schemas.openxmlformats.org/officeDocument/2006/relationships" xmlns:p="http://schemas.openxmlformats.org/presentationml/2006/main">
+  <p:cSld>
+    <p:spTree>
+      <p:nvGrpSpPr>
+        <p:cNvPr id="1" name=""/>
+        <p:cNvGrpSpPr/>
+        <p:nvPr/>
+      </p:nvGrpSpPr>
+      <p:grpSpPr>
+        <a:xfrm>
+          <a:off x="0" y="0"/>
+          <a:ext cx="0" cy="0"/>
+          <a:chOff x="0" y="0"/>
+          <a:chExt cx="0" cy="0"/>
+        </a:xfrm>
+      </p:grpSpPr>
+      <p:pic>
+        <p:nvPicPr>
+          <p:cNvPr id="2" name="Picture 1">
+            <a:extLst>
+              <a:ext uri="{FF2B5EF4-FFF2-40B4-BE49-F238E27FC236}">
+                <a16:creationId xmlns:a16="http://schemas.microsoft.com/office/drawing/2014/main" id="{C58C283E-195E-DA41-B184-18BF96051F44}"/>
+              </a:ext>
+            </a:extLst>
+          </p:cNvPr>
+          <p:cNvPicPr>
+            <a:picLocks noChangeAspect="1"/>
+          </p:cNvPicPr>
+          <p:nvPr/>
+        </p:nvPicPr>
+        <p:blipFill>
+          <a:blip r:embed="rId2"/>
+          <a:stretch>
+            <a:fillRect/>
+          </a:stretch>
+        </p:blipFill>
+        <p:spPr>
+          <a:xfrm>
+            <a:off x="809663" y="1105785"/>
+            <a:ext cx="10207257" cy="10207257"/>
+          </a:xfrm>
+          <a:prstGeom prst="rect">
+            <a:avLst/>
+          </a:prstGeom>
+        </p:spPr>
+      </p:pic>
+      <p:cxnSp>
+        <p:nvCxnSpPr>
+          <p:cNvPr id="3" name="Straight Connector 2">
+            <a:extLst>
+              <a:ext uri="{FF2B5EF4-FFF2-40B4-BE49-F238E27FC236}">
+                <a16:creationId xmlns:a16="http://schemas.microsoft.com/office/drawing/2014/main" id="{F722CA76-08EC-004D-9311-7EE0A54AB554}"/>
+              </a:ext>
+            </a:extLst>
+          </p:cNvPr>
+          <p:cNvCxnSpPr>
+            <a:cxnSpLocks/>
+          </p:cNvCxnSpPr>
+          <p:nvPr/>
+        </p:nvCxnSpPr>
+        <p:spPr>
+          <a:xfrm>
+            <a:off x="7391400" y="1516360"/>
+            <a:ext cx="0" cy="8903547"/>
+          </a:xfrm>
+          <a:prstGeom prst="line">
+            <a:avLst/>
+          </a:prstGeom>
+          <a:ln w="25400">
+            <a:solidFill>
+              <a:schemeClr val="tx1"/>
+            </a:solidFill>
+            <a:prstDash val="dash"/>
+          </a:ln>
+        </p:spPr>
+        <p:style>
+          <a:lnRef idx="1">
+            <a:schemeClr val="accent1"/>
+          </a:lnRef>
+          <a:fillRef idx="0">
+            <a:schemeClr val="accent1"/>
+          </a:fillRef>
+          <a:effectRef idx="0">
+            <a:schemeClr val="accent1"/>
+          </a:effectRef>
+          <a:fontRef idx="minor">
+            <a:schemeClr val="tx1"/>
+          </a:fontRef>
+        </p:style>
+      </p:cxnSp>
+      <p:sp>
+        <p:nvSpPr>
+          <p:cNvPr id="4" name="TextBox 3">
+            <a:extLst>
+              <a:ext uri="{FF2B5EF4-FFF2-40B4-BE49-F238E27FC236}">
+                <a16:creationId xmlns:a16="http://schemas.microsoft.com/office/drawing/2014/main" id="{F09BB023-3F97-324E-8906-5CE0E76F7C0D}"/>
+              </a:ext>
+            </a:extLst>
+          </p:cNvPr>
+          <p:cNvSpPr txBox="1"/>
+          <p:nvPr/>
+        </p:nvSpPr>
+        <p:spPr>
+          <a:xfrm>
+            <a:off x="4007076" y="1168161"/>
+            <a:ext cx="1298753" cy="461665"/>
+          </a:xfrm>
+          <a:prstGeom prst="rect">
+            <a:avLst/>
+          </a:prstGeom>
+          <a:solidFill>
+            <a:schemeClr val="bg1"/>
+          </a:solidFill>
+          <a:ln w="19050">
+            <a:solidFill>
+              <a:schemeClr val="tx1"/>
+            </a:solidFill>
+          </a:ln>
+        </p:spPr>
+        <p:txBody>
+          <a:bodyPr wrap="none" rtlCol="0">
+            <a:spAutoFit/>
+          </a:bodyPr>
+          <a:lstStyle/>
+          <a:p>
+            <a:pPr algn="ctr"/>
+            <a:r>
+              <a:rPr lang="en-US" sz="2400" dirty="0"/>
+              <a:t>Baseline </a:t>
+            </a:r>
+          </a:p>
+        </p:txBody>
+      </p:sp>
+      <p:sp>
+        <p:nvSpPr>
+          <p:cNvPr id="5" name="TextBox 4">
+            <a:extLst>
+              <a:ext uri="{FF2B5EF4-FFF2-40B4-BE49-F238E27FC236}">
+                <a16:creationId xmlns:a16="http://schemas.microsoft.com/office/drawing/2014/main" id="{EAAA0DB0-B7F8-5A4E-A630-625B133F0B6E}"/>
+              </a:ext>
+            </a:extLst>
+          </p:cNvPr>
+          <p:cNvSpPr txBox="1"/>
+          <p:nvPr/>
+        </p:nvSpPr>
+        <p:spPr>
+          <a:xfrm>
+            <a:off x="8697275" y="1168161"/>
+            <a:ext cx="1799275" cy="461665"/>
+          </a:xfrm>
+          <a:prstGeom prst="rect">
+            <a:avLst/>
+          </a:prstGeom>
+          <a:solidFill>
+            <a:schemeClr val="bg1"/>
+          </a:solidFill>
+          <a:ln w="19050">
+            <a:solidFill>
+              <a:schemeClr val="tx1"/>
+            </a:solidFill>
+          </a:ln>
+        </p:spPr>
+        <p:txBody>
+          <a:bodyPr wrap="none" rtlCol="0">
+            <a:spAutoFit/>
+          </a:bodyPr>
+          <a:lstStyle/>
+          <a:p>
+            <a:pPr algn="ctr"/>
+            <a:r>
+              <a:rPr lang="en-US" sz="2400" dirty="0"/>
+              <a:t>Intervention </a:t>
+            </a:r>
+          </a:p>
+        </p:txBody>
+      </p:sp>
+      <p:sp>
+        <p:nvSpPr>
+          <p:cNvPr id="6" name="TextBox 5">
+            <a:extLst>
+              <a:ext uri="{FF2B5EF4-FFF2-40B4-BE49-F238E27FC236}">
+                <a16:creationId xmlns:a16="http://schemas.microsoft.com/office/drawing/2014/main" id="{027D0D2C-EF66-0A42-A1B6-3A596AE3375D}"/>
+              </a:ext>
+            </a:extLst>
+          </p:cNvPr>
+          <p:cNvSpPr txBox="1"/>
+          <p:nvPr/>
+        </p:nvSpPr>
+        <p:spPr>
+          <a:xfrm>
+            <a:off x="9604959" y="6407220"/>
+            <a:ext cx="891591" cy="461665"/>
+          </a:xfrm>
+          <a:prstGeom prst="rect">
+            <a:avLst/>
+          </a:prstGeom>
+          <a:solidFill>
+            <a:schemeClr val="bg1"/>
+          </a:solidFill>
+          <a:ln w="19050">
+            <a:solidFill>
+              <a:schemeClr val="tx1"/>
+            </a:solidFill>
+          </a:ln>
+        </p:spPr>
+        <p:txBody>
+          <a:bodyPr wrap="none" rtlCol="0">
+            <a:spAutoFit/>
+          </a:bodyPr>
+          <a:lstStyle/>
+          <a:p>
+            <a:pPr algn="ctr"/>
+            <a:r>
+              <a:rPr lang="en-US" sz="2400" dirty="0"/>
+              <a:t>GIAD </a:t>
+            </a:r>
+          </a:p>
+        </p:txBody>
+      </p:sp>
+      <p:sp>
+        <p:nvSpPr>
+          <p:cNvPr id="7" name="Oval 6">
+            <a:extLst>
+              <a:ext uri="{FF2B5EF4-FFF2-40B4-BE49-F238E27FC236}">
+                <a16:creationId xmlns:a16="http://schemas.microsoft.com/office/drawing/2014/main" id="{D623B380-7EC0-0A42-8D2F-93D34C34C0F6}"/>
+              </a:ext>
+            </a:extLst>
+          </p:cNvPr>
+          <p:cNvSpPr/>
+          <p:nvPr/>
+        </p:nvSpPr>
+        <p:spPr>
+          <a:xfrm>
+            <a:off x="3230895" y="5368556"/>
+            <a:ext cx="534986" cy="476250"/>
+          </a:xfrm>
+          <a:prstGeom prst="ellipse">
+            <a:avLst/>
+          </a:prstGeom>
+          <a:solidFill>
+            <a:srgbClr val="FF0000"/>
+          </a:solidFill>
+          <a:ln>
+            <a:noFill/>
+          </a:ln>
+        </p:spPr>
+        <p:style>
+          <a:lnRef idx="2">
+            <a:schemeClr val="accent1">
+              <a:shade val="50000"/>
+            </a:schemeClr>
+          </a:lnRef>
+          <a:fillRef idx="1">
+            <a:schemeClr val="accent1"/>
+          </a:fillRef>
+          <a:effectRef idx="0">
+            <a:schemeClr val="accent1"/>
+          </a:effectRef>
+          <a:fontRef idx="minor">
+            <a:schemeClr val="lt1"/>
+          </a:fontRef>
+        </p:style>
+        <p:txBody>
+          <a:bodyPr rtlCol="0" anchor="ctr"/>
+          <a:lstStyle/>
+          <a:p>
+            <a:pPr algn="ctr"/>
+            <a:endParaRPr lang="en-US"/>
+          </a:p>
+        </p:txBody>
+      </p:sp>
+      <p:cxnSp>
+        <p:nvCxnSpPr>
+          <p:cNvPr id="8" name="Straight Connector 7">
+            <a:extLst>
+              <a:ext uri="{FF2B5EF4-FFF2-40B4-BE49-F238E27FC236}">
+                <a16:creationId xmlns:a16="http://schemas.microsoft.com/office/drawing/2014/main" id="{3DEA7A93-9B35-AA4C-961C-DA18CF9E0F61}"/>
+              </a:ext>
+            </a:extLst>
+          </p:cNvPr>
+          <p:cNvCxnSpPr/>
+          <p:nvPr/>
+        </p:nvCxnSpPr>
+        <p:spPr>
+          <a:xfrm>
+            <a:off x="3765881" y="5606681"/>
+            <a:ext cx="6364290" cy="0"/>
+          </a:xfrm>
+          <a:prstGeom prst="line">
+            <a:avLst/>
+          </a:prstGeom>
+          <a:ln w="63500">
+            <a:solidFill>
+              <a:srgbClr val="FF0000"/>
+            </a:solidFill>
+          </a:ln>
+        </p:spPr>
+        <p:style>
+          <a:lnRef idx="1">
+            <a:schemeClr val="accent1"/>
+          </a:lnRef>
+          <a:fillRef idx="0">
+            <a:schemeClr val="accent1"/>
+          </a:fillRef>
+          <a:effectRef idx="0">
+            <a:schemeClr val="accent1"/>
+          </a:effectRef>
+          <a:fontRef idx="minor">
+            <a:schemeClr val="tx1"/>
+          </a:fontRef>
+        </p:style>
+      </p:cxnSp>
+      <p:sp>
+        <p:nvSpPr>
+          <p:cNvPr id="9" name="Google Shape;209;p27">
+            <a:extLst>
+              <a:ext uri="{FF2B5EF4-FFF2-40B4-BE49-F238E27FC236}">
+                <a16:creationId xmlns:a16="http://schemas.microsoft.com/office/drawing/2014/main" id="{7DBF59C5-FCF9-FB4B-BB3C-F23C89DABCAF}"/>
+              </a:ext>
+            </a:extLst>
+          </p:cNvPr>
+          <p:cNvSpPr txBox="1"/>
+          <p:nvPr/>
+        </p:nvSpPr>
+        <p:spPr>
+          <a:xfrm>
+            <a:off x="8763000" y="8058152"/>
+            <a:ext cx="1868478" cy="914397"/>
+          </a:xfrm>
+          <a:prstGeom prst="rect">
+            <a:avLst/>
+          </a:prstGeom>
+          <a:noFill/>
+          <a:ln w="9525" cap="flat" cmpd="sng">
+            <a:solidFill>
+              <a:srgbClr val="000000"/>
+            </a:solidFill>
+            <a:prstDash val="solid"/>
+            <a:round/>
+            <a:headEnd type="none" w="sm" len="sm"/>
+            <a:tailEnd type="none" w="sm" len="sm"/>
+          </a:ln>
+        </p:spPr>
+        <p:txBody>
+          <a:bodyPr spcFirstLastPara="1" wrap="square" lIns="91425" tIns="91425" rIns="91425" bIns="91425" anchor="t" anchorCtr="0">
+            <a:noAutofit/>
+          </a:bodyPr>
+          <a:lstStyle/>
+          <a:p>
+            <a:pPr marL="0" lvl="0" indent="0" algn="ctr" rtl="0">
+              <a:spcBef>
+                <a:spcPts val="0"/>
+              </a:spcBef>
+              <a:spcAft>
+                <a:spcPts val="0"/>
+              </a:spcAft>
+              <a:buNone/>
+            </a:pPr>
+            <a:r>
+              <a:rPr lang="en" sz="1600" dirty="0">
+                <a:latin typeface="Lato"/>
+                <a:ea typeface="Lato"/>
+                <a:cs typeface="Lato"/>
+                <a:sym typeface="Lato"/>
+              </a:rPr>
+              <a:t>Above line = 3</a:t>
+            </a:r>
+            <a:endParaRPr sz="1600" dirty="0">
+              <a:latin typeface="Lato"/>
+              <a:ea typeface="Lato"/>
+              <a:cs typeface="Lato"/>
+              <a:sym typeface="Lato"/>
+            </a:endParaRPr>
+          </a:p>
+          <a:p>
+            <a:pPr marL="0" lvl="0" indent="0" algn="ctr" rtl="0">
+              <a:spcBef>
+                <a:spcPts val="0"/>
+              </a:spcBef>
+              <a:spcAft>
+                <a:spcPts val="0"/>
+              </a:spcAft>
+              <a:buNone/>
+            </a:pPr>
+            <a:r>
+              <a:rPr lang="en" sz="1600" dirty="0">
+                <a:latin typeface="Lato"/>
+                <a:ea typeface="Lato"/>
+                <a:cs typeface="Lato"/>
+                <a:sym typeface="Lato"/>
+              </a:rPr>
+              <a:t>Phase N = 3</a:t>
+            </a:r>
+            <a:endParaRPr sz="1600" dirty="0">
+              <a:latin typeface="Lato"/>
+              <a:ea typeface="Lato"/>
+              <a:cs typeface="Lato"/>
+              <a:sym typeface="Lato"/>
+            </a:endParaRPr>
+          </a:p>
+          <a:p>
+            <a:pPr marL="0" lvl="0" indent="0" algn="ctr" rtl="0">
+              <a:spcBef>
+                <a:spcPts val="0"/>
+              </a:spcBef>
+              <a:spcAft>
+                <a:spcPts val="0"/>
+              </a:spcAft>
+              <a:buNone/>
+            </a:pPr>
+            <a:r>
+              <a:rPr lang="en" sz="1600" dirty="0">
+                <a:latin typeface="Lato"/>
+                <a:ea typeface="Lato"/>
+                <a:cs typeface="Lato"/>
+                <a:sym typeface="Lato"/>
+              </a:rPr>
+              <a:t>PND= 3/3 = 1</a:t>
+            </a:r>
+            <a:endParaRPr sz="1600" dirty="0">
+              <a:latin typeface="Lato"/>
+              <a:ea typeface="Lato"/>
+              <a:cs typeface="Lato"/>
+              <a:sym typeface="Lato"/>
+            </a:endParaRPr>
+          </a:p>
+        </p:txBody>
+      </p:sp>
+      <p:sp>
+        <p:nvSpPr>
+          <p:cNvPr id="10" name="TextBox 9">
+            <a:extLst>
+              <a:ext uri="{FF2B5EF4-FFF2-40B4-BE49-F238E27FC236}">
+                <a16:creationId xmlns:a16="http://schemas.microsoft.com/office/drawing/2014/main" id="{77141D93-B56A-3147-8C0C-35C0D549E629}"/>
+              </a:ext>
+            </a:extLst>
+          </p:cNvPr>
+          <p:cNvSpPr txBox="1"/>
+          <p:nvPr/>
+        </p:nvSpPr>
+        <p:spPr>
+          <a:xfrm>
+            <a:off x="9399721" y="7665304"/>
+            <a:ext cx="595035" cy="369332"/>
+          </a:xfrm>
+          <a:prstGeom prst="rect">
+            <a:avLst/>
+          </a:prstGeom>
+          <a:noFill/>
+        </p:spPr>
+        <p:txBody>
+          <a:bodyPr wrap="none" rtlCol="0">
+            <a:spAutoFit/>
+          </a:bodyPr>
+          <a:lstStyle/>
+          <a:p>
+            <a:r>
+              <a:rPr lang="en-US" dirty="0"/>
+              <a:t>PND</a:t>
+            </a:r>
+          </a:p>
+        </p:txBody>
+      </p:sp>
+    </p:spTree>
+    <p:extLst>
+      <p:ext uri="{BB962C8B-B14F-4D97-AF65-F5344CB8AC3E}">
+        <p14:creationId xmlns:p14="http://schemas.microsoft.com/office/powerpoint/2010/main" val="2437787811"/>
+      </p:ext>
+    </p:extLst>
+  </p:cSld>
+  <p:clrMapOvr>
+    <a:masterClrMapping/>
+  </p:clrMapOvr>
+</p:sld>
+</file>
+
+<file path=ppt/slides/slide16.xml><?xml version="1.0" encoding="utf-8"?>
+<p:sld xmlns:a="http://schemas.openxmlformats.org/drawingml/2006/main" xmlns:r="http://schemas.openxmlformats.org/officeDocument/2006/relationships" xmlns:p="http://schemas.openxmlformats.org/presentationml/2006/main">
+  <p:cSld>
+    <p:spTree>
+      <p:nvGrpSpPr>
+        <p:cNvPr id="1" name=""/>
+        <p:cNvGrpSpPr/>
+        <p:nvPr/>
+      </p:nvGrpSpPr>
+      <p:grpSpPr>
+        <a:xfrm>
+          <a:off x="0" y="0"/>
+          <a:ext cx="0" cy="0"/>
+          <a:chOff x="0" y="0"/>
+          <a:chExt cx="0" cy="0"/>
+        </a:xfrm>
+      </p:grpSpPr>
+      <p:pic>
+        <p:nvPicPr>
+          <p:cNvPr id="2" name="Picture 1">
+            <a:extLst>
+              <a:ext uri="{FF2B5EF4-FFF2-40B4-BE49-F238E27FC236}">
+                <a16:creationId xmlns:a16="http://schemas.microsoft.com/office/drawing/2014/main" id="{2CFB567F-E45A-BB49-9656-E9444B5E5C5D}"/>
+              </a:ext>
+            </a:extLst>
+          </p:cNvPr>
+          <p:cNvPicPr>
+            <a:picLocks noChangeAspect="1"/>
+          </p:cNvPicPr>
+          <p:nvPr/>
+        </p:nvPicPr>
+        <p:blipFill>
+          <a:blip r:embed="rId2"/>
+          <a:stretch>
+            <a:fillRect/>
+          </a:stretch>
+        </p:blipFill>
+        <p:spPr>
+          <a:xfrm>
+            <a:off x="1045534" y="1043946"/>
+            <a:ext cx="10100931" cy="10100931"/>
+          </a:xfrm>
+          <a:prstGeom prst="rect">
+            <a:avLst/>
+          </a:prstGeom>
+        </p:spPr>
+      </p:pic>
+      <p:cxnSp>
+        <p:nvCxnSpPr>
+          <p:cNvPr id="3" name="Straight Connector 2">
+            <a:extLst>
+              <a:ext uri="{FF2B5EF4-FFF2-40B4-BE49-F238E27FC236}">
+                <a16:creationId xmlns:a16="http://schemas.microsoft.com/office/drawing/2014/main" id="{79957BB6-B095-8642-BF5F-8EA5DBCC29A0}"/>
+              </a:ext>
+            </a:extLst>
+          </p:cNvPr>
+          <p:cNvCxnSpPr>
+            <a:cxnSpLocks/>
+          </p:cNvCxnSpPr>
+          <p:nvPr/>
+        </p:nvCxnSpPr>
+        <p:spPr>
+          <a:xfrm>
+            <a:off x="7391400" y="1516360"/>
+            <a:ext cx="0" cy="8903547"/>
+          </a:xfrm>
+          <a:prstGeom prst="line">
+            <a:avLst/>
+          </a:prstGeom>
+          <a:ln w="25400">
+            <a:solidFill>
+              <a:schemeClr val="tx1"/>
+            </a:solidFill>
+            <a:prstDash val="dash"/>
+          </a:ln>
+        </p:spPr>
+        <p:style>
+          <a:lnRef idx="1">
+            <a:schemeClr val="accent1"/>
+          </a:lnRef>
+          <a:fillRef idx="0">
+            <a:schemeClr val="accent1"/>
+          </a:fillRef>
+          <a:effectRef idx="0">
+            <a:schemeClr val="accent1"/>
+          </a:effectRef>
+          <a:fontRef idx="minor">
+            <a:schemeClr val="tx1"/>
+          </a:fontRef>
+        </p:style>
+      </p:cxnSp>
+      <p:sp>
+        <p:nvSpPr>
+          <p:cNvPr id="4" name="TextBox 3">
+            <a:extLst>
+              <a:ext uri="{FF2B5EF4-FFF2-40B4-BE49-F238E27FC236}">
+                <a16:creationId xmlns:a16="http://schemas.microsoft.com/office/drawing/2014/main" id="{865612E2-A691-BD44-B47D-151F0B9148EC}"/>
+              </a:ext>
+            </a:extLst>
+          </p:cNvPr>
+          <p:cNvSpPr txBox="1"/>
+          <p:nvPr/>
+        </p:nvSpPr>
+        <p:spPr>
+          <a:xfrm>
+            <a:off x="4007076" y="1168161"/>
+            <a:ext cx="1298753" cy="461665"/>
+          </a:xfrm>
+          <a:prstGeom prst="rect">
+            <a:avLst/>
+          </a:prstGeom>
+          <a:solidFill>
+            <a:schemeClr val="bg1"/>
+          </a:solidFill>
+          <a:ln w="19050">
+            <a:solidFill>
+              <a:schemeClr val="tx1"/>
+            </a:solidFill>
+          </a:ln>
+        </p:spPr>
+        <p:txBody>
+          <a:bodyPr wrap="none" rtlCol="0">
+            <a:spAutoFit/>
+          </a:bodyPr>
+          <a:lstStyle/>
+          <a:p>
+            <a:pPr algn="ctr"/>
+            <a:r>
+              <a:rPr lang="en-US" sz="2400" dirty="0"/>
+              <a:t>Baseline </a:t>
+            </a:r>
+          </a:p>
+        </p:txBody>
+      </p:sp>
+      <p:sp>
+        <p:nvSpPr>
+          <p:cNvPr id="5" name="TextBox 4">
+            <a:extLst>
+              <a:ext uri="{FF2B5EF4-FFF2-40B4-BE49-F238E27FC236}">
+                <a16:creationId xmlns:a16="http://schemas.microsoft.com/office/drawing/2014/main" id="{4E6F13CD-3371-9E4E-AD0F-971589D02200}"/>
+              </a:ext>
+            </a:extLst>
+          </p:cNvPr>
+          <p:cNvSpPr txBox="1"/>
+          <p:nvPr/>
+        </p:nvSpPr>
+        <p:spPr>
+          <a:xfrm>
+            <a:off x="8697275" y="1168161"/>
+            <a:ext cx="1799275" cy="461665"/>
+          </a:xfrm>
+          <a:prstGeom prst="rect">
+            <a:avLst/>
+          </a:prstGeom>
+          <a:solidFill>
+            <a:schemeClr val="bg1"/>
+          </a:solidFill>
+          <a:ln w="19050">
+            <a:solidFill>
+              <a:schemeClr val="tx1"/>
+            </a:solidFill>
+          </a:ln>
+        </p:spPr>
+        <p:txBody>
+          <a:bodyPr wrap="none" rtlCol="0">
+            <a:spAutoFit/>
+          </a:bodyPr>
+          <a:lstStyle/>
+          <a:p>
+            <a:pPr algn="ctr"/>
+            <a:r>
+              <a:rPr lang="en-US" sz="2400" dirty="0"/>
+              <a:t>Intervention </a:t>
+            </a:r>
+          </a:p>
+        </p:txBody>
+      </p:sp>
+      <p:sp>
+        <p:nvSpPr>
+          <p:cNvPr id="6" name="TextBox 5">
+            <a:extLst>
+              <a:ext uri="{FF2B5EF4-FFF2-40B4-BE49-F238E27FC236}">
+                <a16:creationId xmlns:a16="http://schemas.microsoft.com/office/drawing/2014/main" id="{53A15444-0740-4E41-A7D3-2DC4989B824E}"/>
+              </a:ext>
+            </a:extLst>
+          </p:cNvPr>
+          <p:cNvSpPr txBox="1"/>
+          <p:nvPr/>
+        </p:nvSpPr>
+        <p:spPr>
+          <a:xfrm>
+            <a:off x="9604959" y="6407220"/>
+            <a:ext cx="891591" cy="461665"/>
+          </a:xfrm>
+          <a:prstGeom prst="rect">
+            <a:avLst/>
+          </a:prstGeom>
+          <a:solidFill>
+            <a:schemeClr val="bg1"/>
+          </a:solidFill>
+          <a:ln w="19050">
+            <a:solidFill>
+              <a:schemeClr val="tx1"/>
+            </a:solidFill>
+          </a:ln>
+        </p:spPr>
+        <p:txBody>
+          <a:bodyPr wrap="none" rtlCol="0">
+            <a:spAutoFit/>
+          </a:bodyPr>
+          <a:lstStyle/>
+          <a:p>
+            <a:pPr algn="ctr"/>
+            <a:r>
+              <a:rPr lang="en-US" sz="2400" dirty="0"/>
+              <a:t>GIAD </a:t>
+            </a:r>
+          </a:p>
+        </p:txBody>
+      </p:sp>
+      <p:sp>
+        <p:nvSpPr>
+          <p:cNvPr id="7" name="Oval 6">
+            <a:extLst>
+              <a:ext uri="{FF2B5EF4-FFF2-40B4-BE49-F238E27FC236}">
+                <a16:creationId xmlns:a16="http://schemas.microsoft.com/office/drawing/2014/main" id="{9BC6A851-84AD-2B44-9795-EB79F330A6C3}"/>
+              </a:ext>
+            </a:extLst>
+          </p:cNvPr>
+          <p:cNvSpPr/>
+          <p:nvPr/>
+        </p:nvSpPr>
+        <p:spPr>
+          <a:xfrm>
+            <a:off x="3597274" y="2412705"/>
+            <a:ext cx="534986" cy="476250"/>
+          </a:xfrm>
+          <a:prstGeom prst="ellipse">
+            <a:avLst/>
+          </a:prstGeom>
+          <a:solidFill>
+            <a:srgbClr val="FF0000"/>
+          </a:solidFill>
+          <a:ln>
+            <a:noFill/>
+          </a:ln>
+        </p:spPr>
+        <p:style>
+          <a:lnRef idx="2">
+            <a:schemeClr val="accent1">
+              <a:shade val="50000"/>
+            </a:schemeClr>
+          </a:lnRef>
+          <a:fillRef idx="1">
+            <a:schemeClr val="accent1"/>
+          </a:fillRef>
+          <a:effectRef idx="0">
+            <a:schemeClr val="accent1"/>
+          </a:effectRef>
+          <a:fontRef idx="minor">
+            <a:schemeClr val="lt1"/>
+          </a:fontRef>
+        </p:style>
+        <p:txBody>
+          <a:bodyPr rtlCol="0" anchor="ctr"/>
+          <a:lstStyle/>
+          <a:p>
+            <a:pPr algn="ctr"/>
+            <a:endParaRPr lang="en-US"/>
+          </a:p>
+        </p:txBody>
+      </p:sp>
+      <p:cxnSp>
+        <p:nvCxnSpPr>
+          <p:cNvPr id="8" name="Straight Connector 7">
+            <a:extLst>
+              <a:ext uri="{FF2B5EF4-FFF2-40B4-BE49-F238E27FC236}">
+                <a16:creationId xmlns:a16="http://schemas.microsoft.com/office/drawing/2014/main" id="{B3669B4E-7CE1-7645-8F01-71C9A8BAD76E}"/>
+              </a:ext>
+            </a:extLst>
+          </p:cNvPr>
+          <p:cNvCxnSpPr/>
+          <p:nvPr/>
+        </p:nvCxnSpPr>
+        <p:spPr>
+          <a:xfrm>
+            <a:off x="4132260" y="2650830"/>
+            <a:ext cx="6364290" cy="0"/>
+          </a:xfrm>
+          <a:prstGeom prst="line">
+            <a:avLst/>
+          </a:prstGeom>
+          <a:ln w="63500">
+            <a:solidFill>
+              <a:srgbClr val="FF0000"/>
+            </a:solidFill>
+          </a:ln>
+        </p:spPr>
+        <p:style>
+          <a:lnRef idx="1">
+            <a:schemeClr val="accent1"/>
+          </a:lnRef>
+          <a:fillRef idx="0">
+            <a:schemeClr val="accent1"/>
+          </a:fillRef>
+          <a:effectRef idx="0">
+            <a:schemeClr val="accent1"/>
+          </a:effectRef>
+          <a:fontRef idx="minor">
+            <a:schemeClr val="tx1"/>
+          </a:fontRef>
+        </p:style>
+      </p:cxnSp>
+      <p:sp>
+        <p:nvSpPr>
+          <p:cNvPr id="9" name="Google Shape;209;p27">
+            <a:extLst>
+              <a:ext uri="{FF2B5EF4-FFF2-40B4-BE49-F238E27FC236}">
+                <a16:creationId xmlns:a16="http://schemas.microsoft.com/office/drawing/2014/main" id="{6B8295A7-A979-3442-B12C-87010C8A54A9}"/>
+              </a:ext>
+            </a:extLst>
+          </p:cNvPr>
+          <p:cNvSpPr txBox="1"/>
+          <p:nvPr/>
+        </p:nvSpPr>
+        <p:spPr>
+          <a:xfrm>
+            <a:off x="8763000" y="8058152"/>
+            <a:ext cx="1868478" cy="914397"/>
+          </a:xfrm>
+          <a:prstGeom prst="rect">
+            <a:avLst/>
+          </a:prstGeom>
+          <a:noFill/>
+          <a:ln w="9525" cap="flat" cmpd="sng">
+            <a:solidFill>
+              <a:srgbClr val="000000"/>
+            </a:solidFill>
+            <a:prstDash val="solid"/>
+            <a:round/>
+            <a:headEnd type="none" w="sm" len="sm"/>
+            <a:tailEnd type="none" w="sm" len="sm"/>
+          </a:ln>
+        </p:spPr>
+        <p:txBody>
+          <a:bodyPr spcFirstLastPara="1" wrap="square" lIns="91425" tIns="91425" rIns="91425" bIns="91425" anchor="t" anchorCtr="0">
+            <a:noAutofit/>
+          </a:bodyPr>
+          <a:lstStyle/>
+          <a:p>
+            <a:pPr marL="0" lvl="0" indent="0" algn="ctr" rtl="0">
+              <a:spcBef>
+                <a:spcPts val="0"/>
+              </a:spcBef>
+              <a:spcAft>
+                <a:spcPts val="0"/>
+              </a:spcAft>
+              <a:buNone/>
+            </a:pPr>
+            <a:r>
+              <a:rPr lang="en" sz="1600" dirty="0">
+                <a:latin typeface="Lato"/>
+                <a:ea typeface="Lato"/>
+                <a:cs typeface="Lato"/>
+                <a:sym typeface="Lato"/>
+              </a:rPr>
+              <a:t>Above line = 1</a:t>
+            </a:r>
+            <a:endParaRPr sz="1600" dirty="0">
+              <a:latin typeface="Lato"/>
+              <a:ea typeface="Lato"/>
+              <a:cs typeface="Lato"/>
+              <a:sym typeface="Lato"/>
+            </a:endParaRPr>
+          </a:p>
+          <a:p>
+            <a:pPr marL="0" lvl="0" indent="0" algn="ctr" rtl="0">
+              <a:spcBef>
+                <a:spcPts val="0"/>
+              </a:spcBef>
+              <a:spcAft>
+                <a:spcPts val="0"/>
+              </a:spcAft>
+              <a:buNone/>
+            </a:pPr>
+            <a:r>
+              <a:rPr lang="en" sz="1600" dirty="0">
+                <a:latin typeface="Lato"/>
+                <a:ea typeface="Lato"/>
+                <a:cs typeface="Lato"/>
+                <a:sym typeface="Lato"/>
+              </a:rPr>
+              <a:t>Phase N = 3</a:t>
+            </a:r>
+            <a:endParaRPr sz="1600" dirty="0">
+              <a:latin typeface="Lato"/>
+              <a:ea typeface="Lato"/>
+              <a:cs typeface="Lato"/>
+              <a:sym typeface="Lato"/>
+            </a:endParaRPr>
+          </a:p>
+          <a:p>
+            <a:pPr marL="0" lvl="0" indent="0" algn="ctr" rtl="0">
+              <a:spcBef>
+                <a:spcPts val="0"/>
+              </a:spcBef>
+              <a:spcAft>
+                <a:spcPts val="0"/>
+              </a:spcAft>
+              <a:buNone/>
+            </a:pPr>
+            <a:r>
+              <a:rPr lang="en" sz="1600" dirty="0">
+                <a:latin typeface="Lato"/>
+                <a:ea typeface="Lato"/>
+                <a:cs typeface="Lato"/>
+                <a:sym typeface="Lato"/>
+              </a:rPr>
+              <a:t>PND= 1/3 = 0.33</a:t>
+            </a:r>
+            <a:endParaRPr sz="1600" dirty="0">
+              <a:latin typeface="Lato"/>
+              <a:ea typeface="Lato"/>
+              <a:cs typeface="Lato"/>
+              <a:sym typeface="Lato"/>
+            </a:endParaRPr>
+          </a:p>
+        </p:txBody>
+      </p:sp>
+      <p:sp>
+        <p:nvSpPr>
+          <p:cNvPr id="10" name="TextBox 9">
+            <a:extLst>
+              <a:ext uri="{FF2B5EF4-FFF2-40B4-BE49-F238E27FC236}">
+                <a16:creationId xmlns:a16="http://schemas.microsoft.com/office/drawing/2014/main" id="{DB1A8871-7085-D24D-883C-408B4C61759C}"/>
+              </a:ext>
+            </a:extLst>
+          </p:cNvPr>
+          <p:cNvSpPr txBox="1"/>
+          <p:nvPr/>
+        </p:nvSpPr>
+        <p:spPr>
+          <a:xfrm>
+            <a:off x="9399721" y="7665304"/>
+            <a:ext cx="595035" cy="369332"/>
+          </a:xfrm>
+          <a:prstGeom prst="rect">
+            <a:avLst/>
+          </a:prstGeom>
+          <a:noFill/>
+        </p:spPr>
+        <p:txBody>
+          <a:bodyPr wrap="none" rtlCol="0">
+            <a:spAutoFit/>
+          </a:bodyPr>
+          <a:lstStyle/>
+          <a:p>
+            <a:r>
+              <a:rPr lang="en-US" dirty="0"/>
+              <a:t>PND</a:t>
+            </a:r>
+          </a:p>
+        </p:txBody>
+      </p:sp>
+    </p:spTree>
+    <p:extLst>
+      <p:ext uri="{BB962C8B-B14F-4D97-AF65-F5344CB8AC3E}">
+        <p14:creationId xmlns:p14="http://schemas.microsoft.com/office/powerpoint/2010/main" val="413927401"/>
+      </p:ext>
+    </p:extLst>
+  </p:cSld>
+  <p:clrMapOvr>
+    <a:masterClrMapping/>
+  </p:clrMapOvr>
+</p:sld>
+</file>
+
 <file path=ppt/slides/slide2.xml><?xml version="1.0" encoding="utf-8"?>
 <p:sld xmlns:a="http://schemas.openxmlformats.org/drawingml/2006/main" xmlns:r="http://schemas.openxmlformats.org/officeDocument/2006/relationships" xmlns:p="http://schemas.openxmlformats.org/presentationml/2006/main">
   <p:cSld>

</xml_diff>

<commit_message>
visual analysis updates with MBL design images
</commit_message>
<xml_diff>
--- a/visual_analysis.pptx
+++ b/visual_analysis.pptx
@@ -30,6 +30,8 @@
     <p:sldId id="278" r:id="rId24"/>
     <p:sldId id="279" r:id="rId25"/>
     <p:sldId id="280" r:id="rId26"/>
+    <p:sldId id="281" r:id="rId27"/>
+    <p:sldId id="282" r:id="rId28"/>
   </p:sldIdLst>
   <p:sldSz cx="12192000" cy="12188825"/>
   <p:notesSz cx="6858000" cy="9144000"/>
@@ -1339,7 +1341,7 @@
           <a:p>
             <a:fld id="{C0F591A4-A496-F649-9D1E-A72CB8E70ADD}" type="datetimeFigureOut">
               <a:rPr lang="en-US" smtClean="0"/>
-              <a:t>3/12/22</a:t>
+              <a:t>4/28/22</a:t>
             </a:fld>
             <a:endParaRPr lang="en-US"/>
           </a:p>
@@ -1509,7 +1511,7 @@
           <a:p>
             <a:fld id="{C0F591A4-A496-F649-9D1E-A72CB8E70ADD}" type="datetimeFigureOut">
               <a:rPr lang="en-US" smtClean="0"/>
-              <a:t>3/12/22</a:t>
+              <a:t>4/28/22</a:t>
             </a:fld>
             <a:endParaRPr lang="en-US"/>
           </a:p>
@@ -1689,7 +1691,7 @@
           <a:p>
             <a:fld id="{C0F591A4-A496-F649-9D1E-A72CB8E70ADD}" type="datetimeFigureOut">
               <a:rPr lang="en-US" smtClean="0"/>
-              <a:t>3/12/22</a:t>
+              <a:t>4/28/22</a:t>
             </a:fld>
             <a:endParaRPr lang="en-US"/>
           </a:p>
@@ -1859,7 +1861,7 @@
           <a:p>
             <a:fld id="{C0F591A4-A496-F649-9D1E-A72CB8E70ADD}" type="datetimeFigureOut">
               <a:rPr lang="en-US" smtClean="0"/>
-              <a:t>3/12/22</a:t>
+              <a:t>4/28/22</a:t>
             </a:fld>
             <a:endParaRPr lang="en-US"/>
           </a:p>
@@ -2103,7 +2105,7 @@
           <a:p>
             <a:fld id="{C0F591A4-A496-F649-9D1E-A72CB8E70ADD}" type="datetimeFigureOut">
               <a:rPr lang="en-US" smtClean="0"/>
-              <a:t>3/12/22</a:t>
+              <a:t>4/28/22</a:t>
             </a:fld>
             <a:endParaRPr lang="en-US"/>
           </a:p>
@@ -2335,7 +2337,7 @@
           <a:p>
             <a:fld id="{C0F591A4-A496-F649-9D1E-A72CB8E70ADD}" type="datetimeFigureOut">
               <a:rPr lang="en-US" smtClean="0"/>
-              <a:t>3/12/22</a:t>
+              <a:t>4/28/22</a:t>
             </a:fld>
             <a:endParaRPr lang="en-US"/>
           </a:p>
@@ -2702,7 +2704,7 @@
           <a:p>
             <a:fld id="{C0F591A4-A496-F649-9D1E-A72CB8E70ADD}" type="datetimeFigureOut">
               <a:rPr lang="en-US" smtClean="0"/>
-              <a:t>3/12/22</a:t>
+              <a:t>4/28/22</a:t>
             </a:fld>
             <a:endParaRPr lang="en-US"/>
           </a:p>
@@ -2820,7 +2822,7 @@
           <a:p>
             <a:fld id="{C0F591A4-A496-F649-9D1E-A72CB8E70ADD}" type="datetimeFigureOut">
               <a:rPr lang="en-US" smtClean="0"/>
-              <a:t>3/12/22</a:t>
+              <a:t>4/28/22</a:t>
             </a:fld>
             <a:endParaRPr lang="en-US"/>
           </a:p>
@@ -2915,7 +2917,7 @@
           <a:p>
             <a:fld id="{C0F591A4-A496-F649-9D1E-A72CB8E70ADD}" type="datetimeFigureOut">
               <a:rPr lang="en-US" smtClean="0"/>
-              <a:t>3/12/22</a:t>
+              <a:t>4/28/22</a:t>
             </a:fld>
             <a:endParaRPr lang="en-US"/>
           </a:p>
@@ -3192,7 +3194,7 @@
           <a:p>
             <a:fld id="{C0F591A4-A496-F649-9D1E-A72CB8E70ADD}" type="datetimeFigureOut">
               <a:rPr lang="en-US" smtClean="0"/>
-              <a:t>3/12/22</a:t>
+              <a:t>4/28/22</a:t>
             </a:fld>
             <a:endParaRPr lang="en-US"/>
           </a:p>
@@ -3449,7 +3451,7 @@
           <a:p>
             <a:fld id="{C0F591A4-A496-F649-9D1E-A72CB8E70ADD}" type="datetimeFigureOut">
               <a:rPr lang="en-US" smtClean="0"/>
-              <a:t>3/12/22</a:t>
+              <a:t>4/28/22</a:t>
             </a:fld>
             <a:endParaRPr lang="en-US"/>
           </a:p>
@@ -3662,7 +3664,7 @@
           <a:p>
             <a:fld id="{C0F591A4-A496-F649-9D1E-A72CB8E70ADD}" type="datetimeFigureOut">
               <a:rPr lang="en-US" smtClean="0"/>
-              <a:t>3/12/22</a:t>
+              <a:t>4/28/22</a:t>
             </a:fld>
             <a:endParaRPr lang="en-US"/>
           </a:p>
@@ -11836,6 +11838,1140 @@
 </p:sld>
 </file>
 
+<file path=ppt/slides/slide26.xml><?xml version="1.0" encoding="utf-8"?>
+<p:sld xmlns:a="http://schemas.openxmlformats.org/drawingml/2006/main" xmlns:r="http://schemas.openxmlformats.org/officeDocument/2006/relationships" xmlns:p="http://schemas.openxmlformats.org/presentationml/2006/main">
+  <p:cSld>
+    <p:spTree>
+      <p:nvGrpSpPr>
+        <p:cNvPr id="1" name=""/>
+        <p:cNvGrpSpPr/>
+        <p:nvPr/>
+      </p:nvGrpSpPr>
+      <p:grpSpPr>
+        <a:xfrm>
+          <a:off x="0" y="0"/>
+          <a:ext cx="0" cy="0"/>
+          <a:chOff x="0" y="0"/>
+          <a:chExt cx="0" cy="0"/>
+        </a:xfrm>
+      </p:grpSpPr>
+      <p:pic>
+        <p:nvPicPr>
+          <p:cNvPr id="3" name="Picture 2">
+            <a:extLst>
+              <a:ext uri="{FF2B5EF4-FFF2-40B4-BE49-F238E27FC236}">
+                <a16:creationId xmlns:a16="http://schemas.microsoft.com/office/drawing/2014/main" id="{48F9159F-90CE-B3BD-783C-26E82318F72C}"/>
+              </a:ext>
+            </a:extLst>
+          </p:cNvPr>
+          <p:cNvPicPr>
+            <a:picLocks noChangeAspect="1"/>
+          </p:cNvPicPr>
+          <p:nvPr/>
+        </p:nvPicPr>
+        <p:blipFill>
+          <a:blip r:embed="rId2"/>
+          <a:stretch>
+            <a:fillRect/>
+          </a:stretch>
+        </p:blipFill>
+        <p:spPr>
+          <a:xfrm>
+            <a:off x="1127051" y="1125463"/>
+            <a:ext cx="10015870" cy="10015870"/>
+          </a:xfrm>
+          <a:prstGeom prst="rect">
+            <a:avLst/>
+          </a:prstGeom>
+        </p:spPr>
+      </p:pic>
+      <p:sp>
+        <p:nvSpPr>
+          <p:cNvPr id="4" name="TextBox 3">
+            <a:extLst>
+              <a:ext uri="{FF2B5EF4-FFF2-40B4-BE49-F238E27FC236}">
+                <a16:creationId xmlns:a16="http://schemas.microsoft.com/office/drawing/2014/main" id="{ED12E0B1-C856-9291-02D2-D2FA8AF9E0B4}"/>
+              </a:ext>
+            </a:extLst>
+          </p:cNvPr>
+          <p:cNvSpPr txBox="1"/>
+          <p:nvPr/>
+        </p:nvSpPr>
+        <p:spPr>
+          <a:xfrm>
+            <a:off x="4401879" y="11141333"/>
+            <a:ext cx="4593265" cy="461665"/>
+          </a:xfrm>
+          <a:prstGeom prst="rect">
+            <a:avLst/>
+          </a:prstGeom>
+          <a:noFill/>
+        </p:spPr>
+        <p:txBody>
+          <a:bodyPr wrap="square" rtlCol="0">
+            <a:spAutoFit/>
+          </a:bodyPr>
+          <a:lstStyle/>
+          <a:p>
+            <a:pPr algn="ctr"/>
+            <a:r>
+              <a:rPr lang="en-US" sz="2400" dirty="0"/>
+              <a:t>Session</a:t>
+            </a:r>
+          </a:p>
+        </p:txBody>
+      </p:sp>
+      <p:sp>
+        <p:nvSpPr>
+          <p:cNvPr id="5" name="TextBox 4">
+            <a:extLst>
+              <a:ext uri="{FF2B5EF4-FFF2-40B4-BE49-F238E27FC236}">
+                <a16:creationId xmlns:a16="http://schemas.microsoft.com/office/drawing/2014/main" id="{D3CC973C-5871-9433-3DD9-5A4C4C190CBC}"/>
+              </a:ext>
+            </a:extLst>
+          </p:cNvPr>
+          <p:cNvSpPr txBox="1"/>
+          <p:nvPr/>
+        </p:nvSpPr>
+        <p:spPr>
+          <a:xfrm rot="16200000">
+            <a:off x="-1400414" y="5654012"/>
+            <a:ext cx="4593265" cy="461665"/>
+          </a:xfrm>
+          <a:prstGeom prst="rect">
+            <a:avLst/>
+          </a:prstGeom>
+          <a:noFill/>
+        </p:spPr>
+        <p:txBody>
+          <a:bodyPr wrap="square" rtlCol="0">
+            <a:spAutoFit/>
+          </a:bodyPr>
+          <a:lstStyle/>
+          <a:p>
+            <a:pPr algn="ctr"/>
+            <a:r>
+              <a:rPr lang="en-US" sz="2400" dirty="0"/>
+              <a:t>Digit Span</a:t>
+            </a:r>
+          </a:p>
+        </p:txBody>
+      </p:sp>
+      <p:sp>
+        <p:nvSpPr>
+          <p:cNvPr id="6" name="TextBox 5">
+            <a:extLst>
+              <a:ext uri="{FF2B5EF4-FFF2-40B4-BE49-F238E27FC236}">
+                <a16:creationId xmlns:a16="http://schemas.microsoft.com/office/drawing/2014/main" id="{B113C258-A2AA-954E-85ED-43BAFDCE4D79}"/>
+              </a:ext>
+            </a:extLst>
+          </p:cNvPr>
+          <p:cNvSpPr txBox="1"/>
+          <p:nvPr/>
+        </p:nvSpPr>
+        <p:spPr>
+          <a:xfrm>
+            <a:off x="3247802" y="659748"/>
+            <a:ext cx="1298753" cy="461665"/>
+          </a:xfrm>
+          <a:prstGeom prst="rect">
+            <a:avLst/>
+          </a:prstGeom>
+          <a:solidFill>
+            <a:schemeClr val="bg1"/>
+          </a:solidFill>
+          <a:ln w="19050">
+            <a:solidFill>
+              <a:schemeClr val="tx1"/>
+            </a:solidFill>
+          </a:ln>
+        </p:spPr>
+        <p:txBody>
+          <a:bodyPr wrap="none" rtlCol="0">
+            <a:spAutoFit/>
+          </a:bodyPr>
+          <a:lstStyle/>
+          <a:p>
+            <a:pPr algn="ctr"/>
+            <a:r>
+              <a:rPr lang="en-US" sz="2400" dirty="0"/>
+              <a:t>Baseline </a:t>
+            </a:r>
+          </a:p>
+        </p:txBody>
+      </p:sp>
+      <p:sp>
+        <p:nvSpPr>
+          <p:cNvPr id="7" name="TextBox 6">
+            <a:extLst>
+              <a:ext uri="{FF2B5EF4-FFF2-40B4-BE49-F238E27FC236}">
+                <a16:creationId xmlns:a16="http://schemas.microsoft.com/office/drawing/2014/main" id="{64A3AE77-5A75-F044-139F-95D2DCDE1587}"/>
+              </a:ext>
+            </a:extLst>
+          </p:cNvPr>
+          <p:cNvSpPr txBox="1"/>
+          <p:nvPr/>
+        </p:nvSpPr>
+        <p:spPr>
+          <a:xfrm>
+            <a:off x="6945100" y="659747"/>
+            <a:ext cx="1799275" cy="461665"/>
+          </a:xfrm>
+          <a:prstGeom prst="rect">
+            <a:avLst/>
+          </a:prstGeom>
+          <a:solidFill>
+            <a:schemeClr val="bg1"/>
+          </a:solidFill>
+          <a:ln w="19050">
+            <a:solidFill>
+              <a:schemeClr val="tx1"/>
+            </a:solidFill>
+          </a:ln>
+        </p:spPr>
+        <p:txBody>
+          <a:bodyPr wrap="none" rtlCol="0">
+            <a:spAutoFit/>
+          </a:bodyPr>
+          <a:lstStyle/>
+          <a:p>
+            <a:pPr algn="ctr"/>
+            <a:r>
+              <a:rPr lang="en-US" sz="2400" dirty="0"/>
+              <a:t>Intervention </a:t>
+            </a:r>
+          </a:p>
+        </p:txBody>
+      </p:sp>
+      <p:cxnSp>
+        <p:nvCxnSpPr>
+          <p:cNvPr id="8" name="Straight Connector 7">
+            <a:extLst>
+              <a:ext uri="{FF2B5EF4-FFF2-40B4-BE49-F238E27FC236}">
+                <a16:creationId xmlns:a16="http://schemas.microsoft.com/office/drawing/2014/main" id="{DBB72C1C-D88D-60D6-D090-8295348099DD}"/>
+              </a:ext>
+            </a:extLst>
+          </p:cNvPr>
+          <p:cNvCxnSpPr>
+            <a:cxnSpLocks/>
+          </p:cNvCxnSpPr>
+          <p:nvPr/>
+        </p:nvCxnSpPr>
+        <p:spPr>
+          <a:xfrm>
+            <a:off x="5827256" y="1425741"/>
+            <a:ext cx="0" cy="4166985"/>
+          </a:xfrm>
+          <a:prstGeom prst="line">
+            <a:avLst/>
+          </a:prstGeom>
+          <a:ln w="25400">
+            <a:solidFill>
+              <a:schemeClr val="tx1"/>
+            </a:solidFill>
+            <a:prstDash val="dash"/>
+          </a:ln>
+        </p:spPr>
+        <p:style>
+          <a:lnRef idx="1">
+            <a:schemeClr val="accent1"/>
+          </a:lnRef>
+          <a:fillRef idx="0">
+            <a:schemeClr val="accent1"/>
+          </a:fillRef>
+          <a:effectRef idx="0">
+            <a:schemeClr val="accent1"/>
+          </a:effectRef>
+          <a:fontRef idx="minor">
+            <a:schemeClr val="tx1"/>
+          </a:fontRef>
+        </p:style>
+      </p:cxnSp>
+      <p:cxnSp>
+        <p:nvCxnSpPr>
+          <p:cNvPr id="10" name="Straight Connector 9">
+            <a:extLst>
+              <a:ext uri="{FF2B5EF4-FFF2-40B4-BE49-F238E27FC236}">
+                <a16:creationId xmlns:a16="http://schemas.microsoft.com/office/drawing/2014/main" id="{E2202B5F-9290-CDE6-B9D9-A38764FC25AE}"/>
+              </a:ext>
+            </a:extLst>
+          </p:cNvPr>
+          <p:cNvCxnSpPr>
+            <a:cxnSpLocks/>
+          </p:cNvCxnSpPr>
+          <p:nvPr/>
+        </p:nvCxnSpPr>
+        <p:spPr>
+          <a:xfrm>
+            <a:off x="6945100" y="5549586"/>
+            <a:ext cx="0" cy="3509354"/>
+          </a:xfrm>
+          <a:prstGeom prst="line">
+            <a:avLst/>
+          </a:prstGeom>
+          <a:ln w="25400">
+            <a:solidFill>
+              <a:schemeClr val="tx1"/>
+            </a:solidFill>
+            <a:prstDash val="dash"/>
+          </a:ln>
+        </p:spPr>
+        <p:style>
+          <a:lnRef idx="1">
+            <a:schemeClr val="accent1"/>
+          </a:lnRef>
+          <a:fillRef idx="0">
+            <a:schemeClr val="accent1"/>
+          </a:fillRef>
+          <a:effectRef idx="0">
+            <a:schemeClr val="accent1"/>
+          </a:effectRef>
+          <a:fontRef idx="minor">
+            <a:schemeClr val="tx1"/>
+          </a:fontRef>
+        </p:style>
+      </p:cxnSp>
+      <p:cxnSp>
+        <p:nvCxnSpPr>
+          <p:cNvPr id="13" name="Straight Connector 12">
+            <a:extLst>
+              <a:ext uri="{FF2B5EF4-FFF2-40B4-BE49-F238E27FC236}">
+                <a16:creationId xmlns:a16="http://schemas.microsoft.com/office/drawing/2014/main" id="{CCF04668-5B99-1943-C55C-EB505C0F7C0A}"/>
+              </a:ext>
+            </a:extLst>
+          </p:cNvPr>
+          <p:cNvCxnSpPr>
+            <a:cxnSpLocks/>
+          </p:cNvCxnSpPr>
+          <p:nvPr/>
+        </p:nvCxnSpPr>
+        <p:spPr>
+          <a:xfrm>
+            <a:off x="5827256" y="5549586"/>
+            <a:ext cx="1117844" cy="0"/>
+          </a:xfrm>
+          <a:prstGeom prst="line">
+            <a:avLst/>
+          </a:prstGeom>
+          <a:ln w="25400">
+            <a:solidFill>
+              <a:schemeClr val="tx1"/>
+            </a:solidFill>
+            <a:prstDash val="dash"/>
+          </a:ln>
+        </p:spPr>
+        <p:style>
+          <a:lnRef idx="1">
+            <a:schemeClr val="accent1"/>
+          </a:lnRef>
+          <a:fillRef idx="0">
+            <a:schemeClr val="accent1"/>
+          </a:fillRef>
+          <a:effectRef idx="0">
+            <a:schemeClr val="accent1"/>
+          </a:effectRef>
+          <a:fontRef idx="minor">
+            <a:schemeClr val="tx1"/>
+          </a:fontRef>
+        </p:style>
+      </p:cxnSp>
+      <p:cxnSp>
+        <p:nvCxnSpPr>
+          <p:cNvPr id="16" name="Straight Connector 15">
+            <a:extLst>
+              <a:ext uri="{FF2B5EF4-FFF2-40B4-BE49-F238E27FC236}">
+                <a16:creationId xmlns:a16="http://schemas.microsoft.com/office/drawing/2014/main" id="{1A828C52-A5D1-6C84-7EBB-B5FF1E25AB9C}"/>
+              </a:ext>
+            </a:extLst>
+          </p:cNvPr>
+          <p:cNvCxnSpPr>
+            <a:cxnSpLocks/>
+          </p:cNvCxnSpPr>
+          <p:nvPr/>
+        </p:nvCxnSpPr>
+        <p:spPr>
+          <a:xfrm>
+            <a:off x="7884309" y="9058940"/>
+            <a:ext cx="0" cy="1360967"/>
+          </a:xfrm>
+          <a:prstGeom prst="line">
+            <a:avLst/>
+          </a:prstGeom>
+          <a:ln w="25400">
+            <a:solidFill>
+              <a:schemeClr val="tx1"/>
+            </a:solidFill>
+            <a:prstDash val="dash"/>
+          </a:ln>
+        </p:spPr>
+        <p:style>
+          <a:lnRef idx="1">
+            <a:schemeClr val="accent1"/>
+          </a:lnRef>
+          <a:fillRef idx="0">
+            <a:schemeClr val="accent1"/>
+          </a:fillRef>
+          <a:effectRef idx="0">
+            <a:schemeClr val="accent1"/>
+          </a:effectRef>
+          <a:fontRef idx="minor">
+            <a:schemeClr val="tx1"/>
+          </a:fontRef>
+        </p:style>
+      </p:cxnSp>
+      <p:cxnSp>
+        <p:nvCxnSpPr>
+          <p:cNvPr id="19" name="Straight Connector 18">
+            <a:extLst>
+              <a:ext uri="{FF2B5EF4-FFF2-40B4-BE49-F238E27FC236}">
+                <a16:creationId xmlns:a16="http://schemas.microsoft.com/office/drawing/2014/main" id="{7AED24DB-06CE-E160-72C1-736C59FEA0CD}"/>
+              </a:ext>
+            </a:extLst>
+          </p:cNvPr>
+          <p:cNvCxnSpPr>
+            <a:cxnSpLocks/>
+          </p:cNvCxnSpPr>
+          <p:nvPr/>
+        </p:nvCxnSpPr>
+        <p:spPr>
+          <a:xfrm flipH="1">
+            <a:off x="6945100" y="9058940"/>
+            <a:ext cx="939209" cy="0"/>
+          </a:xfrm>
+          <a:prstGeom prst="line">
+            <a:avLst/>
+          </a:prstGeom>
+          <a:ln w="25400">
+            <a:solidFill>
+              <a:schemeClr val="tx1"/>
+            </a:solidFill>
+            <a:prstDash val="dash"/>
+          </a:ln>
+        </p:spPr>
+        <p:style>
+          <a:lnRef idx="1">
+            <a:schemeClr val="accent1"/>
+          </a:lnRef>
+          <a:fillRef idx="0">
+            <a:schemeClr val="accent1"/>
+          </a:fillRef>
+          <a:effectRef idx="0">
+            <a:schemeClr val="accent1"/>
+          </a:effectRef>
+          <a:fontRef idx="minor">
+            <a:schemeClr val="tx1"/>
+          </a:fontRef>
+        </p:style>
+      </p:cxnSp>
+      <p:sp>
+        <p:nvSpPr>
+          <p:cNvPr id="22" name="TextBox 21">
+            <a:extLst>
+              <a:ext uri="{FF2B5EF4-FFF2-40B4-BE49-F238E27FC236}">
+                <a16:creationId xmlns:a16="http://schemas.microsoft.com/office/drawing/2014/main" id="{E8829CB0-323E-4539-F1D3-BC3BCE5A1D35}"/>
+              </a:ext>
+            </a:extLst>
+          </p:cNvPr>
+          <p:cNvSpPr txBox="1"/>
+          <p:nvPr/>
+        </p:nvSpPr>
+        <p:spPr>
+          <a:xfrm>
+            <a:off x="10912344" y="9508590"/>
+            <a:ext cx="577402" cy="461665"/>
+          </a:xfrm>
+          <a:prstGeom prst="rect">
+            <a:avLst/>
+          </a:prstGeom>
+          <a:solidFill>
+            <a:schemeClr val="bg1"/>
+          </a:solidFill>
+          <a:ln w="19050">
+            <a:solidFill>
+              <a:schemeClr val="tx1"/>
+            </a:solidFill>
+          </a:ln>
+        </p:spPr>
+        <p:txBody>
+          <a:bodyPr wrap="none" rtlCol="0">
+            <a:spAutoFit/>
+          </a:bodyPr>
+          <a:lstStyle/>
+          <a:p>
+            <a:pPr algn="ctr"/>
+            <a:r>
+              <a:rPr lang="en-US" sz="2400" dirty="0"/>
+              <a:t> IA </a:t>
+            </a:r>
+          </a:p>
+        </p:txBody>
+      </p:sp>
+      <p:sp>
+        <p:nvSpPr>
+          <p:cNvPr id="23" name="TextBox 22">
+            <a:extLst>
+              <a:ext uri="{FF2B5EF4-FFF2-40B4-BE49-F238E27FC236}">
+                <a16:creationId xmlns:a16="http://schemas.microsoft.com/office/drawing/2014/main" id="{56BA7FEA-4A72-4FF4-136C-D2924EB3B0E8}"/>
+              </a:ext>
+            </a:extLst>
+          </p:cNvPr>
+          <p:cNvSpPr txBox="1"/>
+          <p:nvPr/>
+        </p:nvSpPr>
+        <p:spPr>
+          <a:xfrm>
+            <a:off x="10875475" y="6432984"/>
+            <a:ext cx="550152" cy="461665"/>
+          </a:xfrm>
+          <a:prstGeom prst="rect">
+            <a:avLst/>
+          </a:prstGeom>
+          <a:solidFill>
+            <a:schemeClr val="bg1"/>
+          </a:solidFill>
+          <a:ln w="19050">
+            <a:solidFill>
+              <a:schemeClr val="tx1"/>
+            </a:solidFill>
+          </a:ln>
+        </p:spPr>
+        <p:txBody>
+          <a:bodyPr wrap="none" rtlCol="0">
+            <a:spAutoFit/>
+          </a:bodyPr>
+          <a:lstStyle/>
+          <a:p>
+            <a:pPr algn="ctr"/>
+            <a:r>
+              <a:rPr lang="en-US" sz="2400" dirty="0"/>
+              <a:t> EI </a:t>
+            </a:r>
+          </a:p>
+        </p:txBody>
+      </p:sp>
+      <p:sp>
+        <p:nvSpPr>
+          <p:cNvPr id="24" name="TextBox 23">
+            <a:extLst>
+              <a:ext uri="{FF2B5EF4-FFF2-40B4-BE49-F238E27FC236}">
+                <a16:creationId xmlns:a16="http://schemas.microsoft.com/office/drawing/2014/main" id="{20F87991-3D87-CEB7-E5C7-27335CB388E6}"/>
+              </a:ext>
+            </a:extLst>
+          </p:cNvPr>
+          <p:cNvSpPr txBox="1"/>
+          <p:nvPr/>
+        </p:nvSpPr>
+        <p:spPr>
+          <a:xfrm>
+            <a:off x="10875475" y="3357379"/>
+            <a:ext cx="651140" cy="461665"/>
+          </a:xfrm>
+          <a:prstGeom prst="rect">
+            <a:avLst/>
+          </a:prstGeom>
+          <a:solidFill>
+            <a:schemeClr val="bg1"/>
+          </a:solidFill>
+          <a:ln w="19050">
+            <a:solidFill>
+              <a:schemeClr val="tx1"/>
+            </a:solidFill>
+          </a:ln>
+        </p:spPr>
+        <p:txBody>
+          <a:bodyPr wrap="none" rtlCol="0">
+            <a:spAutoFit/>
+          </a:bodyPr>
+          <a:lstStyle/>
+          <a:p>
+            <a:pPr algn="ctr"/>
+            <a:r>
+              <a:rPr lang="en-US" sz="2400" dirty="0"/>
+              <a:t> AE </a:t>
+            </a:r>
+          </a:p>
+        </p:txBody>
+      </p:sp>
+    </p:spTree>
+    <p:extLst>
+      <p:ext uri="{BB962C8B-B14F-4D97-AF65-F5344CB8AC3E}">
+        <p14:creationId xmlns:p14="http://schemas.microsoft.com/office/powerpoint/2010/main" val="3601056754"/>
+      </p:ext>
+    </p:extLst>
+  </p:cSld>
+  <p:clrMapOvr>
+    <a:masterClrMapping/>
+  </p:clrMapOvr>
+</p:sld>
+</file>
+
+<file path=ppt/slides/slide27.xml><?xml version="1.0" encoding="utf-8"?>
+<p:sld xmlns:a="http://schemas.openxmlformats.org/drawingml/2006/main" xmlns:r="http://schemas.openxmlformats.org/officeDocument/2006/relationships" xmlns:p="http://schemas.openxmlformats.org/presentationml/2006/main">
+  <p:cSld>
+    <p:spTree>
+      <p:nvGrpSpPr>
+        <p:cNvPr id="1" name=""/>
+        <p:cNvGrpSpPr/>
+        <p:nvPr/>
+      </p:nvGrpSpPr>
+      <p:grpSpPr>
+        <a:xfrm>
+          <a:off x="0" y="0"/>
+          <a:ext cx="0" cy="0"/>
+          <a:chOff x="0" y="0"/>
+          <a:chExt cx="0" cy="0"/>
+        </a:xfrm>
+      </p:grpSpPr>
+      <p:pic>
+        <p:nvPicPr>
+          <p:cNvPr id="2" name="Picture 1">
+            <a:extLst>
+              <a:ext uri="{FF2B5EF4-FFF2-40B4-BE49-F238E27FC236}">
+                <a16:creationId xmlns:a16="http://schemas.microsoft.com/office/drawing/2014/main" id="{14753EBE-78D3-90BA-4EC6-9D5921A96746}"/>
+              </a:ext>
+            </a:extLst>
+          </p:cNvPr>
+          <p:cNvPicPr>
+            <a:picLocks noChangeAspect="1"/>
+          </p:cNvPicPr>
+          <p:nvPr/>
+        </p:nvPicPr>
+        <p:blipFill>
+          <a:blip r:embed="rId2"/>
+          <a:stretch>
+            <a:fillRect/>
+          </a:stretch>
+        </p:blipFill>
+        <p:spPr>
+          <a:xfrm>
+            <a:off x="935665" y="934077"/>
+            <a:ext cx="10357700" cy="10357700"/>
+          </a:xfrm>
+          <a:prstGeom prst="rect">
+            <a:avLst/>
+          </a:prstGeom>
+        </p:spPr>
+      </p:pic>
+      <p:sp>
+        <p:nvSpPr>
+          <p:cNvPr id="3" name="TextBox 2">
+            <a:extLst>
+              <a:ext uri="{FF2B5EF4-FFF2-40B4-BE49-F238E27FC236}">
+                <a16:creationId xmlns:a16="http://schemas.microsoft.com/office/drawing/2014/main" id="{9C8AE223-B8C4-3278-DA63-1E95E7CC78AD}"/>
+              </a:ext>
+            </a:extLst>
+          </p:cNvPr>
+          <p:cNvSpPr txBox="1"/>
+          <p:nvPr/>
+        </p:nvSpPr>
+        <p:spPr>
+          <a:xfrm>
+            <a:off x="4401879" y="11141333"/>
+            <a:ext cx="4593265" cy="461665"/>
+          </a:xfrm>
+          <a:prstGeom prst="rect">
+            <a:avLst/>
+          </a:prstGeom>
+          <a:noFill/>
+        </p:spPr>
+        <p:txBody>
+          <a:bodyPr wrap="square" rtlCol="0">
+            <a:spAutoFit/>
+          </a:bodyPr>
+          <a:lstStyle/>
+          <a:p>
+            <a:pPr algn="ctr"/>
+            <a:r>
+              <a:rPr lang="en-US" sz="2400" dirty="0"/>
+              <a:t>Session</a:t>
+            </a:r>
+          </a:p>
+        </p:txBody>
+      </p:sp>
+      <p:sp>
+        <p:nvSpPr>
+          <p:cNvPr id="4" name="TextBox 3">
+            <a:extLst>
+              <a:ext uri="{FF2B5EF4-FFF2-40B4-BE49-F238E27FC236}">
+                <a16:creationId xmlns:a16="http://schemas.microsoft.com/office/drawing/2014/main" id="{2C4A9F83-1E42-E6E6-3DC1-6692FBC2B96B}"/>
+              </a:ext>
+            </a:extLst>
+          </p:cNvPr>
+          <p:cNvSpPr txBox="1"/>
+          <p:nvPr/>
+        </p:nvSpPr>
+        <p:spPr>
+          <a:xfrm rot="16200000">
+            <a:off x="-1400414" y="5654012"/>
+            <a:ext cx="4593265" cy="461665"/>
+          </a:xfrm>
+          <a:prstGeom prst="rect">
+            <a:avLst/>
+          </a:prstGeom>
+          <a:noFill/>
+        </p:spPr>
+        <p:txBody>
+          <a:bodyPr wrap="square" rtlCol="0">
+            <a:spAutoFit/>
+          </a:bodyPr>
+          <a:lstStyle/>
+          <a:p>
+            <a:pPr algn="ctr"/>
+            <a:r>
+              <a:rPr lang="en-US" sz="2400" dirty="0"/>
+              <a:t>Sentences</a:t>
+            </a:r>
+          </a:p>
+        </p:txBody>
+      </p:sp>
+      <p:sp>
+        <p:nvSpPr>
+          <p:cNvPr id="5" name="TextBox 4">
+            <a:extLst>
+              <a:ext uri="{FF2B5EF4-FFF2-40B4-BE49-F238E27FC236}">
+                <a16:creationId xmlns:a16="http://schemas.microsoft.com/office/drawing/2014/main" id="{F71E0A07-026B-5C79-A91A-0E037A7EBDA0}"/>
+              </a:ext>
+            </a:extLst>
+          </p:cNvPr>
+          <p:cNvSpPr txBox="1"/>
+          <p:nvPr/>
+        </p:nvSpPr>
+        <p:spPr>
+          <a:xfrm>
+            <a:off x="3247802" y="659748"/>
+            <a:ext cx="1298753" cy="461665"/>
+          </a:xfrm>
+          <a:prstGeom prst="rect">
+            <a:avLst/>
+          </a:prstGeom>
+          <a:solidFill>
+            <a:schemeClr val="bg1"/>
+          </a:solidFill>
+          <a:ln w="19050">
+            <a:solidFill>
+              <a:schemeClr val="tx1"/>
+            </a:solidFill>
+          </a:ln>
+        </p:spPr>
+        <p:txBody>
+          <a:bodyPr wrap="none" rtlCol="0">
+            <a:spAutoFit/>
+          </a:bodyPr>
+          <a:lstStyle/>
+          <a:p>
+            <a:pPr algn="ctr"/>
+            <a:r>
+              <a:rPr lang="en-US" sz="2400" dirty="0"/>
+              <a:t>Baseline </a:t>
+            </a:r>
+          </a:p>
+        </p:txBody>
+      </p:sp>
+      <p:sp>
+        <p:nvSpPr>
+          <p:cNvPr id="6" name="TextBox 5">
+            <a:extLst>
+              <a:ext uri="{FF2B5EF4-FFF2-40B4-BE49-F238E27FC236}">
+                <a16:creationId xmlns:a16="http://schemas.microsoft.com/office/drawing/2014/main" id="{2C651AB5-53AF-FFA6-7D53-E89B8814C57B}"/>
+              </a:ext>
+            </a:extLst>
+          </p:cNvPr>
+          <p:cNvSpPr txBox="1"/>
+          <p:nvPr/>
+        </p:nvSpPr>
+        <p:spPr>
+          <a:xfrm>
+            <a:off x="6945100" y="659747"/>
+            <a:ext cx="1799275" cy="461665"/>
+          </a:xfrm>
+          <a:prstGeom prst="rect">
+            <a:avLst/>
+          </a:prstGeom>
+          <a:solidFill>
+            <a:schemeClr val="bg1"/>
+          </a:solidFill>
+          <a:ln w="19050">
+            <a:solidFill>
+              <a:schemeClr val="tx1"/>
+            </a:solidFill>
+          </a:ln>
+        </p:spPr>
+        <p:txBody>
+          <a:bodyPr wrap="none" rtlCol="0">
+            <a:spAutoFit/>
+          </a:bodyPr>
+          <a:lstStyle/>
+          <a:p>
+            <a:pPr algn="ctr"/>
+            <a:r>
+              <a:rPr lang="en-US" sz="2400" dirty="0"/>
+              <a:t>Intervention </a:t>
+            </a:r>
+          </a:p>
+        </p:txBody>
+      </p:sp>
+      <p:cxnSp>
+        <p:nvCxnSpPr>
+          <p:cNvPr id="7" name="Straight Connector 6">
+            <a:extLst>
+              <a:ext uri="{FF2B5EF4-FFF2-40B4-BE49-F238E27FC236}">
+                <a16:creationId xmlns:a16="http://schemas.microsoft.com/office/drawing/2014/main" id="{4AF6C1DD-85B3-AA55-6F44-C74D552D87A2}"/>
+              </a:ext>
+            </a:extLst>
+          </p:cNvPr>
+          <p:cNvCxnSpPr>
+            <a:cxnSpLocks/>
+          </p:cNvCxnSpPr>
+          <p:nvPr/>
+        </p:nvCxnSpPr>
+        <p:spPr>
+          <a:xfrm>
+            <a:off x="5827256" y="1425741"/>
+            <a:ext cx="0" cy="4166985"/>
+          </a:xfrm>
+          <a:prstGeom prst="line">
+            <a:avLst/>
+          </a:prstGeom>
+          <a:ln w="25400">
+            <a:solidFill>
+              <a:schemeClr val="tx1"/>
+            </a:solidFill>
+            <a:prstDash val="dash"/>
+          </a:ln>
+        </p:spPr>
+        <p:style>
+          <a:lnRef idx="1">
+            <a:schemeClr val="accent1"/>
+          </a:lnRef>
+          <a:fillRef idx="0">
+            <a:schemeClr val="accent1"/>
+          </a:fillRef>
+          <a:effectRef idx="0">
+            <a:schemeClr val="accent1"/>
+          </a:effectRef>
+          <a:fontRef idx="minor">
+            <a:schemeClr val="tx1"/>
+          </a:fontRef>
+        </p:style>
+      </p:cxnSp>
+      <p:cxnSp>
+        <p:nvCxnSpPr>
+          <p:cNvPr id="8" name="Straight Connector 7">
+            <a:extLst>
+              <a:ext uri="{FF2B5EF4-FFF2-40B4-BE49-F238E27FC236}">
+                <a16:creationId xmlns:a16="http://schemas.microsoft.com/office/drawing/2014/main" id="{5A60955F-BB52-1DD4-855F-092A96C509C1}"/>
+              </a:ext>
+            </a:extLst>
+          </p:cNvPr>
+          <p:cNvCxnSpPr>
+            <a:cxnSpLocks/>
+          </p:cNvCxnSpPr>
+          <p:nvPr/>
+        </p:nvCxnSpPr>
+        <p:spPr>
+          <a:xfrm>
+            <a:off x="6945100" y="5549586"/>
+            <a:ext cx="0" cy="3509354"/>
+          </a:xfrm>
+          <a:prstGeom prst="line">
+            <a:avLst/>
+          </a:prstGeom>
+          <a:ln w="25400">
+            <a:solidFill>
+              <a:schemeClr val="tx1"/>
+            </a:solidFill>
+            <a:prstDash val="dash"/>
+          </a:ln>
+        </p:spPr>
+        <p:style>
+          <a:lnRef idx="1">
+            <a:schemeClr val="accent1"/>
+          </a:lnRef>
+          <a:fillRef idx="0">
+            <a:schemeClr val="accent1"/>
+          </a:fillRef>
+          <a:effectRef idx="0">
+            <a:schemeClr val="accent1"/>
+          </a:effectRef>
+          <a:fontRef idx="minor">
+            <a:schemeClr val="tx1"/>
+          </a:fontRef>
+        </p:style>
+      </p:cxnSp>
+      <p:cxnSp>
+        <p:nvCxnSpPr>
+          <p:cNvPr id="9" name="Straight Connector 8">
+            <a:extLst>
+              <a:ext uri="{FF2B5EF4-FFF2-40B4-BE49-F238E27FC236}">
+                <a16:creationId xmlns:a16="http://schemas.microsoft.com/office/drawing/2014/main" id="{538762D4-333C-8D5D-4537-F711FAA443A3}"/>
+              </a:ext>
+            </a:extLst>
+          </p:cNvPr>
+          <p:cNvCxnSpPr>
+            <a:cxnSpLocks/>
+          </p:cNvCxnSpPr>
+          <p:nvPr/>
+        </p:nvCxnSpPr>
+        <p:spPr>
+          <a:xfrm>
+            <a:off x="5827256" y="5549586"/>
+            <a:ext cx="1117844" cy="0"/>
+          </a:xfrm>
+          <a:prstGeom prst="line">
+            <a:avLst/>
+          </a:prstGeom>
+          <a:ln w="25400">
+            <a:solidFill>
+              <a:schemeClr val="tx1"/>
+            </a:solidFill>
+            <a:prstDash val="dash"/>
+          </a:ln>
+        </p:spPr>
+        <p:style>
+          <a:lnRef idx="1">
+            <a:schemeClr val="accent1"/>
+          </a:lnRef>
+          <a:fillRef idx="0">
+            <a:schemeClr val="accent1"/>
+          </a:fillRef>
+          <a:effectRef idx="0">
+            <a:schemeClr val="accent1"/>
+          </a:effectRef>
+          <a:fontRef idx="minor">
+            <a:schemeClr val="tx1"/>
+          </a:fontRef>
+        </p:style>
+      </p:cxnSp>
+      <p:cxnSp>
+        <p:nvCxnSpPr>
+          <p:cNvPr id="10" name="Straight Connector 9">
+            <a:extLst>
+              <a:ext uri="{FF2B5EF4-FFF2-40B4-BE49-F238E27FC236}">
+                <a16:creationId xmlns:a16="http://schemas.microsoft.com/office/drawing/2014/main" id="{1FDCCCBE-2BD0-06E5-4947-A7D64B2E7DA2}"/>
+              </a:ext>
+            </a:extLst>
+          </p:cNvPr>
+          <p:cNvCxnSpPr>
+            <a:cxnSpLocks/>
+          </p:cNvCxnSpPr>
+          <p:nvPr/>
+        </p:nvCxnSpPr>
+        <p:spPr>
+          <a:xfrm>
+            <a:off x="7884309" y="9058940"/>
+            <a:ext cx="0" cy="1488558"/>
+          </a:xfrm>
+          <a:prstGeom prst="line">
+            <a:avLst/>
+          </a:prstGeom>
+          <a:ln w="25400">
+            <a:solidFill>
+              <a:schemeClr val="tx1"/>
+            </a:solidFill>
+            <a:prstDash val="dash"/>
+          </a:ln>
+        </p:spPr>
+        <p:style>
+          <a:lnRef idx="1">
+            <a:schemeClr val="accent1"/>
+          </a:lnRef>
+          <a:fillRef idx="0">
+            <a:schemeClr val="accent1"/>
+          </a:fillRef>
+          <a:effectRef idx="0">
+            <a:schemeClr val="accent1"/>
+          </a:effectRef>
+          <a:fontRef idx="minor">
+            <a:schemeClr val="tx1"/>
+          </a:fontRef>
+        </p:style>
+      </p:cxnSp>
+      <p:cxnSp>
+        <p:nvCxnSpPr>
+          <p:cNvPr id="11" name="Straight Connector 10">
+            <a:extLst>
+              <a:ext uri="{FF2B5EF4-FFF2-40B4-BE49-F238E27FC236}">
+                <a16:creationId xmlns:a16="http://schemas.microsoft.com/office/drawing/2014/main" id="{896CD613-57E1-950F-E7AB-78CCBF4D66C7}"/>
+              </a:ext>
+            </a:extLst>
+          </p:cNvPr>
+          <p:cNvCxnSpPr>
+            <a:cxnSpLocks/>
+          </p:cNvCxnSpPr>
+          <p:nvPr/>
+        </p:nvCxnSpPr>
+        <p:spPr>
+          <a:xfrm flipH="1">
+            <a:off x="6945100" y="9058940"/>
+            <a:ext cx="939209" cy="0"/>
+          </a:xfrm>
+          <a:prstGeom prst="line">
+            <a:avLst/>
+          </a:prstGeom>
+          <a:ln w="25400">
+            <a:solidFill>
+              <a:schemeClr val="tx1"/>
+            </a:solidFill>
+            <a:prstDash val="dash"/>
+          </a:ln>
+        </p:spPr>
+        <p:style>
+          <a:lnRef idx="1">
+            <a:schemeClr val="accent1"/>
+          </a:lnRef>
+          <a:fillRef idx="0">
+            <a:schemeClr val="accent1"/>
+          </a:fillRef>
+          <a:effectRef idx="0">
+            <a:schemeClr val="accent1"/>
+          </a:effectRef>
+          <a:fontRef idx="minor">
+            <a:schemeClr val="tx1"/>
+          </a:fontRef>
+        </p:style>
+      </p:cxnSp>
+      <p:sp>
+        <p:nvSpPr>
+          <p:cNvPr id="12" name="TextBox 11">
+            <a:extLst>
+              <a:ext uri="{FF2B5EF4-FFF2-40B4-BE49-F238E27FC236}">
+                <a16:creationId xmlns:a16="http://schemas.microsoft.com/office/drawing/2014/main" id="{03BD6A51-8539-9994-BF2C-B9AE8C698F43}"/>
+              </a:ext>
+            </a:extLst>
+          </p:cNvPr>
+          <p:cNvSpPr txBox="1"/>
+          <p:nvPr/>
+        </p:nvSpPr>
+        <p:spPr>
+          <a:xfrm>
+            <a:off x="10912344" y="9508590"/>
+            <a:ext cx="577402" cy="461665"/>
+          </a:xfrm>
+          <a:prstGeom prst="rect">
+            <a:avLst/>
+          </a:prstGeom>
+          <a:solidFill>
+            <a:schemeClr val="bg1"/>
+          </a:solidFill>
+          <a:ln w="19050">
+            <a:solidFill>
+              <a:schemeClr val="tx1"/>
+            </a:solidFill>
+          </a:ln>
+        </p:spPr>
+        <p:txBody>
+          <a:bodyPr wrap="none" rtlCol="0">
+            <a:spAutoFit/>
+          </a:bodyPr>
+          <a:lstStyle/>
+          <a:p>
+            <a:pPr algn="ctr"/>
+            <a:r>
+              <a:rPr lang="en-US" sz="2400" dirty="0"/>
+              <a:t> IA </a:t>
+            </a:r>
+          </a:p>
+        </p:txBody>
+      </p:sp>
+      <p:sp>
+        <p:nvSpPr>
+          <p:cNvPr id="13" name="TextBox 12">
+            <a:extLst>
+              <a:ext uri="{FF2B5EF4-FFF2-40B4-BE49-F238E27FC236}">
+                <a16:creationId xmlns:a16="http://schemas.microsoft.com/office/drawing/2014/main" id="{8452C6DD-C18F-3888-2E75-6273A039225F}"/>
+              </a:ext>
+            </a:extLst>
+          </p:cNvPr>
+          <p:cNvSpPr txBox="1"/>
+          <p:nvPr/>
+        </p:nvSpPr>
+        <p:spPr>
+          <a:xfrm>
+            <a:off x="10875475" y="6432984"/>
+            <a:ext cx="550152" cy="461665"/>
+          </a:xfrm>
+          <a:prstGeom prst="rect">
+            <a:avLst/>
+          </a:prstGeom>
+          <a:solidFill>
+            <a:schemeClr val="bg1"/>
+          </a:solidFill>
+          <a:ln w="19050">
+            <a:solidFill>
+              <a:schemeClr val="tx1"/>
+            </a:solidFill>
+          </a:ln>
+        </p:spPr>
+        <p:txBody>
+          <a:bodyPr wrap="none" rtlCol="0">
+            <a:spAutoFit/>
+          </a:bodyPr>
+          <a:lstStyle/>
+          <a:p>
+            <a:pPr algn="ctr"/>
+            <a:r>
+              <a:rPr lang="en-US" sz="2400" dirty="0"/>
+              <a:t> EI </a:t>
+            </a:r>
+          </a:p>
+        </p:txBody>
+      </p:sp>
+      <p:sp>
+        <p:nvSpPr>
+          <p:cNvPr id="14" name="TextBox 13">
+            <a:extLst>
+              <a:ext uri="{FF2B5EF4-FFF2-40B4-BE49-F238E27FC236}">
+                <a16:creationId xmlns:a16="http://schemas.microsoft.com/office/drawing/2014/main" id="{94E1334D-94AA-27C9-AC8A-BA31CD8D3A43}"/>
+              </a:ext>
+            </a:extLst>
+          </p:cNvPr>
+          <p:cNvSpPr txBox="1"/>
+          <p:nvPr/>
+        </p:nvSpPr>
+        <p:spPr>
+          <a:xfrm>
+            <a:off x="10875475" y="3357379"/>
+            <a:ext cx="651140" cy="461665"/>
+          </a:xfrm>
+          <a:prstGeom prst="rect">
+            <a:avLst/>
+          </a:prstGeom>
+          <a:solidFill>
+            <a:schemeClr val="bg1"/>
+          </a:solidFill>
+          <a:ln w="19050">
+            <a:solidFill>
+              <a:schemeClr val="tx1"/>
+            </a:solidFill>
+          </a:ln>
+        </p:spPr>
+        <p:txBody>
+          <a:bodyPr wrap="none" rtlCol="0">
+            <a:spAutoFit/>
+          </a:bodyPr>
+          <a:lstStyle/>
+          <a:p>
+            <a:pPr algn="ctr"/>
+            <a:r>
+              <a:rPr lang="en-US" sz="2400" dirty="0"/>
+              <a:t> AE </a:t>
+            </a:r>
+          </a:p>
+        </p:txBody>
+      </p:sp>
+    </p:spTree>
+    <p:extLst>
+      <p:ext uri="{BB962C8B-B14F-4D97-AF65-F5344CB8AC3E}">
+        <p14:creationId xmlns:p14="http://schemas.microsoft.com/office/powerpoint/2010/main" val="2881770120"/>
+      </p:ext>
+    </p:extLst>
+  </p:cSld>
+  <p:clrMapOvr>
+    <a:masterClrMapping/>
+  </p:clrMapOvr>
+</p:sld>
+</file>
+
 <file path=ppt/slides/slide3.xml><?xml version="1.0" encoding="utf-8"?>
 <p:sld xmlns:a="http://schemas.openxmlformats.org/drawingml/2006/main" xmlns:r="http://schemas.openxmlformats.org/officeDocument/2006/relationships" xmlns:p="http://schemas.openxmlformats.org/presentationml/2006/main">
   <p:cSld>

</xml_diff>